<commit_message>
prototype of listing most enriched cell lines working, but slowly
</commit_message>
<xml_diff>
--- a/Notebooks/patients/DMB006/DMB006.mtb_slides.pptx
+++ b/Notebooks/patients/DMB006/DMB006.mtb_slides.pptx
@@ -16,6 +16,8 @@
     <p:sldId id="264" r:id="rId15"/>
     <p:sldId id="265" r:id="rId16"/>
     <p:sldId id="266" r:id="rId17"/>
+    <p:sldId id="267" r:id="rId18"/>
+    <p:sldId id="268" r:id="rId19"/>
   </p:sldIdLst>
   <p:sldSz cx="9144000" cy="6858000" type="screen4x3"/>
   <p:notesSz cx="6858000" cy="9144000"/>
@@ -7235,6 +7237,2742 @@
 </p:sld>
 </file>
 
+<file path=ppt/slides/slide12.xml><?xml version="1.0" encoding="utf-8"?>
+<p:sld xmlns:a="http://schemas.openxmlformats.org/drawingml/2006/main" xmlns:p="http://schemas.openxmlformats.org/presentationml/2006/main" xmlns:r="http://schemas.openxmlformats.org/officeDocument/2006/relationships">
+  <p:cSld>
+    <p:spTree>
+      <p:nvGrpSpPr>
+        <p:cNvPr id="1" name=""/>
+        <p:cNvGrpSpPr/>
+        <p:nvPr/>
+      </p:nvGrpSpPr>
+      <p:grpSpPr/>
+      <p:sp>
+        <p:nvSpPr>
+          <p:cNvPr id="2" name="TextBox 1"/>
+          <p:cNvSpPr txBox="1"/>
+          <p:nvPr/>
+        </p:nvSpPr>
+        <p:spPr>
+          <a:xfrm>
+            <a:off x="0" y="0"/>
+            <a:ext cx="9144000" cy="685800"/>
+          </a:xfrm>
+          <a:prstGeom prst="rect">
+            <a:avLst/>
+          </a:prstGeom>
+          <a:noFill/>
+        </p:spPr>
+        <p:txBody>
+          <a:bodyPr wrap="none">
+            <a:spAutoFit/>
+          </a:bodyPr>
+          <a:lstStyle/>
+          <a:p/>
+          <a:p>
+            <a:pPr>
+              <a:defRPr sz="2600"/>
+            </a:pPr>
+            <a:r>
+              <a:t>DiSCoVER: top drugs (cerebellar stem cell control)</a:t>
+            </a:r>
+          </a:p>
+        </p:txBody>
+      </p:sp>
+      <p:graphicFrame>
+        <p:nvGraphicFramePr>
+          <p:cNvPr id="3" name="Table 2"/>
+          <p:cNvGraphicFramePr>
+            <a:graphicFrameLocks noGrp="1"/>
+          </p:cNvGraphicFramePr>
+          <p:nvPr/>
+        </p:nvGraphicFramePr>
+        <p:xfrm>
+          <a:off x="411480" y="777240"/>
+          <a:ext cx="8275320" cy="4114800"/>
+        </p:xfrm>
+        <a:graphic>
+          <a:graphicData uri="http://schemas.openxmlformats.org/drawingml/2006/table">
+            <a:tbl>
+              <a:tblPr firstRow="1" bandRow="1">
+                <a:tableStyleId>{5C22544A-7EE6-4342-B048-85BDC9FD1C3A}</a:tableStyleId>
+              </a:tblPr>
+              <a:tblGrid>
+                <a:gridCol w="1005840"/>
+                <a:gridCol w="731520"/>
+                <a:gridCol w="1051560"/>
+                <a:gridCol w="5486400"/>
+              </a:tblGrid>
+              <a:tr h="195942">
+                <a:tc>
+                  <a:txBody>
+                    <a:bodyPr/>
+                    <a:lstStyle/>
+                    <a:p>
+                      <a:r>
+                        <a:t>Drug</a:t>
+                      </a:r>
+                    </a:p>
+                  </a:txBody>
+                  <a:tcPr/>
+                </a:tc>
+                <a:tc>
+                  <a:txBody>
+                    <a:bodyPr/>
+                    <a:lstStyle/>
+                    <a:p>
+                      <a:r>
+                        <a:t>Score</a:t>
+                      </a:r>
+                    </a:p>
+                  </a:txBody>
+                  <a:tcPr/>
+                </a:tc>
+                <a:tc>
+                  <a:txBody>
+                    <a:bodyPr/>
+                    <a:lstStyle/>
+                    <a:p>
+                      <a:r>
+                        <a:t>Evidence</a:t>
+                      </a:r>
+                    </a:p>
+                  </a:txBody>
+                  <a:tcPr/>
+                </a:tc>
+                <a:tc>
+                  <a:txBody>
+                    <a:bodyPr/>
+                    <a:lstStyle/>
+                    <a:p>
+                      <a:r>
+                        <a:t>Mechanism of action</a:t>
+                      </a:r>
+                    </a:p>
+                  </a:txBody>
+                  <a:tcPr/>
+                </a:tc>
+              </a:tr>
+              <a:tr h="195942">
+                <a:tc>
+                  <a:txBody>
+                    <a:bodyPr/>
+                    <a:lstStyle/>
+                    <a:p>
+                      <a:pPr>
+                        <a:defRPr sz="1050"/>
+                      </a:pPr>
+                      <a:r>
+                        <a:t>tl-2-105</a:t>
+                      </a:r>
+                    </a:p>
+                  </a:txBody>
+                  <a:tcPr/>
+                </a:tc>
+                <a:tc>
+                  <a:txBody>
+                    <a:bodyPr/>
+                    <a:lstStyle/>
+                    <a:p>
+                      <a:pPr>
+                        <a:defRPr sz="1050"/>
+                      </a:pPr>
+                      <a:r>
+                        <a:t>0.69</a:t>
+                      </a:r>
+                    </a:p>
+                  </a:txBody>
+                  <a:tcPr/>
+                </a:tc>
+                <a:tc>
+                  <a:txBody>
+                    <a:bodyPr/>
+                    <a:lstStyle/>
+                    <a:p>
+                      <a:pPr>
+                        <a:defRPr sz="1050"/>
+                      </a:pPr>
+                      <a:r>
+                        <a:t>+..</a:t>
+                      </a:r>
+                    </a:p>
+                  </a:txBody>
+                  <a:tcPr/>
+                </a:tc>
+                <a:tc>
+                  <a:txBody>
+                    <a:bodyPr/>
+                    <a:lstStyle/>
+                    <a:p>
+                      <a:pPr>
+                        <a:defRPr sz="1050"/>
+                      </a:pPr>
+                      <a:r>
+                        <a:t>Not Clinically Relevant</a:t>
+                      </a:r>
+                    </a:p>
+                  </a:txBody>
+                  <a:tcPr/>
+                </a:tc>
+              </a:tr>
+              <a:tr h="195942">
+                <a:tc>
+                  <a:txBody>
+                    <a:bodyPr/>
+                    <a:lstStyle/>
+                    <a:p>
+                      <a:pPr>
+                        <a:defRPr sz="1050"/>
+                      </a:pPr>
+                      <a:r>
+                        <a:t>sb52334</a:t>
+                      </a:r>
+                    </a:p>
+                  </a:txBody>
+                  <a:tcPr/>
+                </a:tc>
+                <a:tc>
+                  <a:txBody>
+                    <a:bodyPr/>
+                    <a:lstStyle/>
+                    <a:p>
+                      <a:pPr>
+                        <a:defRPr sz="1050"/>
+                      </a:pPr>
+                      <a:r>
+                        <a:t>0.66</a:t>
+                      </a:r>
+                    </a:p>
+                  </a:txBody>
+                  <a:tcPr/>
+                </a:tc>
+                <a:tc>
+                  <a:txBody>
+                    <a:bodyPr/>
+                    <a:lstStyle/>
+                    <a:p>
+                      <a:pPr>
+                        <a:defRPr sz="1050"/>
+                      </a:pPr>
+                      <a:r>
+                        <a:t>+..</a:t>
+                      </a:r>
+                    </a:p>
+                  </a:txBody>
+                  <a:tcPr/>
+                </a:tc>
+                <a:tc>
+                  <a:txBody>
+                    <a:bodyPr/>
+                    <a:lstStyle/>
+                    <a:p>
+                      <a:pPr>
+                        <a:defRPr sz="1050"/>
+                      </a:pPr>
+                      <a:r>
+                        <a:t>Not Clinically Relevant</a:t>
+                      </a:r>
+                    </a:p>
+                  </a:txBody>
+                  <a:tcPr/>
+                </a:tc>
+              </a:tr>
+              <a:tr h="195942">
+                <a:tc>
+                  <a:txBody>
+                    <a:bodyPr/>
+                    <a:lstStyle/>
+                    <a:p>
+                      <a:pPr>
+                        <a:defRPr sz="1050"/>
+                      </a:pPr>
+                      <a:r>
+                        <a:t>gsk1070916</a:t>
+                      </a:r>
+                    </a:p>
+                  </a:txBody>
+                  <a:tcPr/>
+                </a:tc>
+                <a:tc>
+                  <a:txBody>
+                    <a:bodyPr/>
+                    <a:lstStyle/>
+                    <a:p>
+                      <a:pPr>
+                        <a:defRPr sz="1050"/>
+                      </a:pPr>
+                      <a:r>
+                        <a:t>0.63</a:t>
+                      </a:r>
+                    </a:p>
+                  </a:txBody>
+                  <a:tcPr/>
+                </a:tc>
+                <a:tc>
+                  <a:txBody>
+                    <a:bodyPr/>
+                    <a:lstStyle/>
+                    <a:p>
+                      <a:pPr>
+                        <a:defRPr sz="1050"/>
+                      </a:pPr>
+                      <a:r>
+                        <a:t>+..</a:t>
+                      </a:r>
+                    </a:p>
+                  </a:txBody>
+                  <a:tcPr/>
+                </a:tc>
+                <a:tc>
+                  <a:txBody>
+                    <a:bodyPr/>
+                    <a:lstStyle/>
+                    <a:p>
+                      <a:pPr>
+                        <a:defRPr sz="1050"/>
+                      </a:pPr>
+                      <a:r>
+                        <a:t>Not Clinically Relevant</a:t>
+                      </a:r>
+                    </a:p>
+                  </a:txBody>
+                  <a:tcPr/>
+                </a:tc>
+              </a:tr>
+              <a:tr h="195942">
+                <a:tc>
+                  <a:txBody>
+                    <a:bodyPr/>
+                    <a:lstStyle/>
+                    <a:p>
+                      <a:pPr>
+                        <a:defRPr sz="1050"/>
+                      </a:pPr>
+                      <a:r>
+                        <a:t>gw-2580</a:t>
+                      </a:r>
+                    </a:p>
+                  </a:txBody>
+                  <a:tcPr/>
+                </a:tc>
+                <a:tc>
+                  <a:txBody>
+                    <a:bodyPr/>
+                    <a:lstStyle/>
+                    <a:p>
+                      <a:pPr>
+                        <a:defRPr sz="1050"/>
+                      </a:pPr>
+                      <a:r>
+                        <a:t>0.62</a:t>
+                      </a:r>
+                    </a:p>
+                  </a:txBody>
+                  <a:tcPr/>
+                </a:tc>
+                <a:tc>
+                  <a:txBody>
+                    <a:bodyPr/>
+                    <a:lstStyle/>
+                    <a:p>
+                      <a:pPr>
+                        <a:defRPr sz="1050"/>
+                      </a:pPr>
+                      <a:r>
+                        <a:t>+..</a:t>
+                      </a:r>
+                    </a:p>
+                  </a:txBody>
+                  <a:tcPr/>
+                </a:tc>
+                <a:tc>
+                  <a:txBody>
+                    <a:bodyPr/>
+                    <a:lstStyle/>
+                    <a:p>
+                      <a:pPr>
+                        <a:defRPr sz="1050"/>
+                      </a:pPr>
+                      <a:r>
+                        <a:t>Not Clinically Relevant</a:t>
+                      </a:r>
+                    </a:p>
+                  </a:txBody>
+                  <a:tcPr/>
+                </a:tc>
+              </a:tr>
+              <a:tr h="195942">
+                <a:tc>
+                  <a:txBody>
+                    <a:bodyPr/>
+                    <a:lstStyle/>
+                    <a:p>
+                      <a:pPr>
+                        <a:defRPr sz="1050"/>
+                      </a:pPr>
+                      <a:r>
+                        <a:t>linsitinib</a:t>
+                      </a:r>
+                    </a:p>
+                  </a:txBody>
+                  <a:tcPr/>
+                </a:tc>
+                <a:tc>
+                  <a:txBody>
+                    <a:bodyPr/>
+                    <a:lstStyle/>
+                    <a:p>
+                      <a:pPr>
+                        <a:defRPr sz="1050"/>
+                      </a:pPr>
+                      <a:r>
+                        <a:t>0.58</a:t>
+                      </a:r>
+                    </a:p>
+                  </a:txBody>
+                  <a:tcPr/>
+                </a:tc>
+                <a:tc>
+                  <a:txBody>
+                    <a:bodyPr/>
+                    <a:lstStyle/>
+                    <a:p>
+                      <a:pPr>
+                        <a:defRPr sz="1050"/>
+                      </a:pPr>
+                      <a:r>
+                        <a:t>++.</a:t>
+                      </a:r>
+                    </a:p>
+                  </a:txBody>
+                  <a:tcPr/>
+                </a:tc>
+                <a:tc>
+                  <a:txBody>
+                    <a:bodyPr/>
+                    <a:lstStyle/>
+                    <a:p>
+                      <a:pPr>
+                        <a:defRPr sz="1050"/>
+                      </a:pPr>
+                      <a:r>
+                        <a:t>IGF-1R inhibitor</a:t>
+                      </a:r>
+                    </a:p>
+                  </a:txBody>
+                  <a:tcPr/>
+                </a:tc>
+              </a:tr>
+              <a:tr h="195942">
+                <a:tc>
+                  <a:txBody>
+                    <a:bodyPr/>
+                    <a:lstStyle/>
+                    <a:p>
+                      <a:pPr>
+                        <a:defRPr sz="1050"/>
+                      </a:pPr>
+                      <a:r>
+                        <a:t>vx-702</a:t>
+                      </a:r>
+                    </a:p>
+                  </a:txBody>
+                  <a:tcPr/>
+                </a:tc>
+                <a:tc>
+                  <a:txBody>
+                    <a:bodyPr/>
+                    <a:lstStyle/>
+                    <a:p>
+                      <a:pPr>
+                        <a:defRPr sz="1050"/>
+                      </a:pPr>
+                      <a:r>
+                        <a:t>0.57</a:t>
+                      </a:r>
+                    </a:p>
+                  </a:txBody>
+                  <a:tcPr/>
+                </a:tc>
+                <a:tc>
+                  <a:txBody>
+                    <a:bodyPr/>
+                    <a:lstStyle/>
+                    <a:p>
+                      <a:pPr>
+                        <a:defRPr sz="1050"/>
+                      </a:pPr>
+                      <a:r>
+                        <a:t>+..</a:t>
+                      </a:r>
+                    </a:p>
+                  </a:txBody>
+                  <a:tcPr/>
+                </a:tc>
+                <a:tc>
+                  <a:txBody>
+                    <a:bodyPr/>
+                    <a:lstStyle/>
+                    <a:p>
+                      <a:pPr>
+                        <a:defRPr sz="1050"/>
+                      </a:pPr>
+                      <a:r>
+                        <a:t>Not Clinically Relevant</a:t>
+                      </a:r>
+                    </a:p>
+                  </a:txBody>
+                  <a:tcPr/>
+                </a:tc>
+              </a:tr>
+              <a:tr h="195942">
+                <a:tc>
+                  <a:txBody>
+                    <a:bodyPr/>
+                    <a:lstStyle/>
+                    <a:p>
+                      <a:pPr>
+                        <a:defRPr sz="1050"/>
+                      </a:pPr>
+                      <a:r>
+                        <a:t>bx-912</a:t>
+                      </a:r>
+                    </a:p>
+                  </a:txBody>
+                  <a:tcPr/>
+                </a:tc>
+                <a:tc>
+                  <a:txBody>
+                    <a:bodyPr/>
+                    <a:lstStyle/>
+                    <a:p>
+                      <a:pPr>
+                        <a:defRPr sz="1050"/>
+                      </a:pPr>
+                      <a:r>
+                        <a:t>0.54</a:t>
+                      </a:r>
+                    </a:p>
+                  </a:txBody>
+                  <a:tcPr/>
+                </a:tc>
+                <a:tc>
+                  <a:txBody>
+                    <a:bodyPr/>
+                    <a:lstStyle/>
+                    <a:p>
+                      <a:pPr>
+                        <a:defRPr sz="1050"/>
+                      </a:pPr>
+                      <a:r>
+                        <a:t>+..</a:t>
+                      </a:r>
+                    </a:p>
+                  </a:txBody>
+                  <a:tcPr/>
+                </a:tc>
+                <a:tc>
+                  <a:txBody>
+                    <a:bodyPr/>
+                    <a:lstStyle/>
+                    <a:p>
+                      <a:pPr>
+                        <a:defRPr sz="1050"/>
+                      </a:pPr>
+                      <a:r>
+                        <a:t>Not Clinically Relevant</a:t>
+                      </a:r>
+                    </a:p>
+                  </a:txBody>
+                  <a:tcPr/>
+                </a:tc>
+              </a:tr>
+              <a:tr h="195942">
+                <a:tc>
+                  <a:txBody>
+                    <a:bodyPr/>
+                    <a:lstStyle/>
+                    <a:p>
+                      <a:pPr>
+                        <a:defRPr sz="1050"/>
+                      </a:pPr>
+                      <a:r>
+                        <a:t>tubastatin a</a:t>
+                      </a:r>
+                    </a:p>
+                  </a:txBody>
+                  <a:tcPr/>
+                </a:tc>
+                <a:tc>
+                  <a:txBody>
+                    <a:bodyPr/>
+                    <a:lstStyle/>
+                    <a:p>
+                      <a:pPr>
+                        <a:defRPr sz="1050"/>
+                      </a:pPr>
+                      <a:r>
+                        <a:t>0.54</a:t>
+                      </a:r>
+                    </a:p>
+                  </a:txBody>
+                  <a:tcPr/>
+                </a:tc>
+                <a:tc>
+                  <a:txBody>
+                    <a:bodyPr/>
+                    <a:lstStyle/>
+                    <a:p>
+                      <a:pPr>
+                        <a:defRPr sz="1050"/>
+                      </a:pPr>
+                      <a:r>
+                        <a:t>++.</a:t>
+                      </a:r>
+                    </a:p>
+                  </a:txBody>
+                  <a:tcPr/>
+                </a:tc>
+                <a:tc>
+                  <a:txBody>
+                    <a:bodyPr/>
+                    <a:lstStyle/>
+                    <a:p>
+                      <a:pPr>
+                        <a:defRPr sz="1050"/>
+                      </a:pPr>
+                      <a:r>
+                        <a:t>Not Clinically Relevant</a:t>
+                      </a:r>
+                    </a:p>
+                  </a:txBody>
+                  <a:tcPr/>
+                </a:tc>
+              </a:tr>
+              <a:tr h="195942">
+                <a:tc>
+                  <a:txBody>
+                    <a:bodyPr/>
+                    <a:lstStyle/>
+                    <a:p>
+                      <a:pPr>
+                        <a:defRPr sz="1050"/>
+                      </a:pPr>
+                      <a:r>
+                        <a:t>navitoclax</a:t>
+                      </a:r>
+                    </a:p>
+                  </a:txBody>
+                  <a:tcPr/>
+                </a:tc>
+                <a:tc>
+                  <a:txBody>
+                    <a:bodyPr/>
+                    <a:lstStyle/>
+                    <a:p>
+                      <a:pPr>
+                        <a:defRPr sz="1050"/>
+                      </a:pPr>
+                      <a:r>
+                        <a:t>0.51</a:t>
+                      </a:r>
+                    </a:p>
+                  </a:txBody>
+                  <a:tcPr/>
+                </a:tc>
+                <a:tc>
+                  <a:txBody>
+                    <a:bodyPr/>
+                    <a:lstStyle/>
+                    <a:p>
+                      <a:pPr>
+                        <a:defRPr sz="1050"/>
+                      </a:pPr>
+                      <a:r>
+                        <a:t>++.</a:t>
+                      </a:r>
+                    </a:p>
+                  </a:txBody>
+                  <a:tcPr/>
+                </a:tc>
+                <a:tc>
+                  <a:txBody>
+                    <a:bodyPr/>
+                    <a:lstStyle/>
+                    <a:p>
+                      <a:pPr>
+                        <a:defRPr sz="1050"/>
+                      </a:pPr>
+                      <a:r>
+                        <a:t>Bcl-2 family inhibitor: esp Bcl-xL, Bcl-2 and Bcl-w</a:t>
+                      </a:r>
+                    </a:p>
+                  </a:txBody>
+                  <a:tcPr/>
+                </a:tc>
+              </a:tr>
+              <a:tr h="195942">
+                <a:tc>
+                  <a:txBody>
+                    <a:bodyPr/>
+                    <a:lstStyle/>
+                    <a:p>
+                      <a:pPr>
+                        <a:defRPr sz="1050"/>
+                      </a:pPr>
+                      <a:r>
+                        <a:t>amuvatinib</a:t>
+                      </a:r>
+                    </a:p>
+                  </a:txBody>
+                  <a:tcPr/>
+                </a:tc>
+                <a:tc>
+                  <a:txBody>
+                    <a:bodyPr/>
+                    <a:lstStyle/>
+                    <a:p>
+                      <a:pPr>
+                        <a:defRPr sz="1050"/>
+                      </a:pPr>
+                      <a:r>
+                        <a:t>0.51</a:t>
+                      </a:r>
+                    </a:p>
+                  </a:txBody>
+                  <a:tcPr/>
+                </a:tc>
+                <a:tc>
+                  <a:txBody>
+                    <a:bodyPr/>
+                    <a:lstStyle/>
+                    <a:p>
+                      <a:pPr>
+                        <a:defRPr sz="1050"/>
+                      </a:pPr>
+                      <a:r>
+                        <a:t>+..</a:t>
+                      </a:r>
+                    </a:p>
+                  </a:txBody>
+                  <a:tcPr/>
+                </a:tc>
+                <a:tc>
+                  <a:txBody>
+                    <a:bodyPr/>
+                    <a:lstStyle/>
+                    <a:p>
+                      <a:pPr>
+                        <a:defRPr sz="1050"/>
+                      </a:pPr>
+                      <a:r>
+                        <a:t>Not Clinically Relevant</a:t>
+                      </a:r>
+                    </a:p>
+                  </a:txBody>
+                  <a:tcPr/>
+                </a:tc>
+              </a:tr>
+              <a:tr h="195942">
+                <a:tc>
+                  <a:txBody>
+                    <a:bodyPr/>
+                    <a:lstStyle/>
+                    <a:p>
+                      <a:pPr>
+                        <a:defRPr sz="1050"/>
+                      </a:pPr>
+                      <a:r>
+                        <a:t>rucaparib</a:t>
+                      </a:r>
+                    </a:p>
+                  </a:txBody>
+                  <a:tcPr/>
+                </a:tc>
+                <a:tc>
+                  <a:txBody>
+                    <a:bodyPr/>
+                    <a:lstStyle/>
+                    <a:p>
+                      <a:pPr>
+                        <a:defRPr sz="1050"/>
+                      </a:pPr>
+                      <a:r>
+                        <a:t>0.5</a:t>
+                      </a:r>
+                    </a:p>
+                  </a:txBody>
+                  <a:tcPr/>
+                </a:tc>
+                <a:tc>
+                  <a:txBody>
+                    <a:bodyPr/>
+                    <a:lstStyle/>
+                    <a:p>
+                      <a:pPr>
+                        <a:defRPr sz="1050"/>
+                      </a:pPr>
+                      <a:r>
+                        <a:t>+..</a:t>
+                      </a:r>
+                    </a:p>
+                  </a:txBody>
+                  <a:tcPr/>
+                </a:tc>
+                <a:tc>
+                  <a:txBody>
+                    <a:bodyPr/>
+                    <a:lstStyle/>
+                    <a:p>
+                      <a:pPr>
+                        <a:defRPr sz="1050"/>
+                      </a:pPr>
+                      <a:r>
+                        <a:t>PARP inhibitor, inhibits DNA repair</a:t>
+                      </a:r>
+                    </a:p>
+                  </a:txBody>
+                  <a:tcPr/>
+                </a:tc>
+              </a:tr>
+              <a:tr h="195942">
+                <a:tc>
+                  <a:txBody>
+                    <a:bodyPr/>
+                    <a:lstStyle/>
+                    <a:p>
+                      <a:pPr>
+                        <a:defRPr sz="1050"/>
+                      </a:pPr>
+                      <a:r>
+                        <a:t>avrainvillamide</a:t>
+                      </a:r>
+                    </a:p>
+                  </a:txBody>
+                  <a:tcPr/>
+                </a:tc>
+                <a:tc>
+                  <a:txBody>
+                    <a:bodyPr/>
+                    <a:lstStyle/>
+                    <a:p>
+                      <a:pPr>
+                        <a:defRPr sz="1050"/>
+                      </a:pPr>
+                      <a:r>
+                        <a:t>0.48</a:t>
+                      </a:r>
+                    </a:p>
+                  </a:txBody>
+                  <a:tcPr/>
+                </a:tc>
+                <a:tc>
+                  <a:txBody>
+                    <a:bodyPr/>
+                    <a:lstStyle/>
+                    <a:p>
+                      <a:pPr>
+                        <a:defRPr sz="1050"/>
+                      </a:pPr>
+                      <a:r>
+                        <a:t>.+.</a:t>
+                      </a:r>
+                    </a:p>
+                  </a:txBody>
+                  <a:tcPr/>
+                </a:tc>
+                <a:tc>
+                  <a:txBody>
+                    <a:bodyPr/>
+                    <a:lstStyle/>
+                    <a:p>
+                      <a:pPr>
+                        <a:defRPr sz="1050"/>
+                      </a:pPr>
+                      <a:r>
+                        <a:t>Not Clinically Relevant</a:t>
+                      </a:r>
+                    </a:p>
+                  </a:txBody>
+                  <a:tcPr/>
+                </a:tc>
+              </a:tr>
+              <a:tr h="195942">
+                <a:tc>
+                  <a:txBody>
+                    <a:bodyPr/>
+                    <a:lstStyle/>
+                    <a:p>
+                      <a:pPr>
+                        <a:defRPr sz="1050"/>
+                      </a:pPr>
+                      <a:r>
+                        <a:t>gsk319347a</a:t>
+                      </a:r>
+                    </a:p>
+                  </a:txBody>
+                  <a:tcPr/>
+                </a:tc>
+                <a:tc>
+                  <a:txBody>
+                    <a:bodyPr/>
+                    <a:lstStyle/>
+                    <a:p>
+                      <a:pPr>
+                        <a:defRPr sz="1050"/>
+                      </a:pPr>
+                      <a:r>
+                        <a:t>0.48</a:t>
+                      </a:r>
+                    </a:p>
+                  </a:txBody>
+                  <a:tcPr/>
+                </a:tc>
+                <a:tc>
+                  <a:txBody>
+                    <a:bodyPr/>
+                    <a:lstStyle/>
+                    <a:p>
+                      <a:pPr>
+                        <a:defRPr sz="1050"/>
+                      </a:pPr>
+                      <a:r>
+                        <a:t>+..</a:t>
+                      </a:r>
+                    </a:p>
+                  </a:txBody>
+                  <a:tcPr/>
+                </a:tc>
+                <a:tc>
+                  <a:txBody>
+                    <a:bodyPr/>
+                    <a:lstStyle/>
+                    <a:p>
+                      <a:pPr>
+                        <a:defRPr sz="1050"/>
+                      </a:pPr>
+                      <a:r>
+                        <a:t>Not Clinically Relevant</a:t>
+                      </a:r>
+                    </a:p>
+                  </a:txBody>
+                  <a:tcPr/>
+                </a:tc>
+              </a:tr>
+              <a:tr h="195942">
+                <a:tc>
+                  <a:txBody>
+                    <a:bodyPr/>
+                    <a:lstStyle/>
+                    <a:p>
+                      <a:pPr>
+                        <a:defRPr sz="1050"/>
+                      </a:pPr>
+                      <a:r>
+                        <a:t>nsc-87877</a:t>
+                      </a:r>
+                    </a:p>
+                  </a:txBody>
+                  <a:tcPr/>
+                </a:tc>
+                <a:tc>
+                  <a:txBody>
+                    <a:bodyPr/>
+                    <a:lstStyle/>
+                    <a:p>
+                      <a:pPr>
+                        <a:defRPr sz="1050"/>
+                      </a:pPr>
+                      <a:r>
+                        <a:t>0.47</a:t>
+                      </a:r>
+                    </a:p>
+                  </a:txBody>
+                  <a:tcPr/>
+                </a:tc>
+                <a:tc>
+                  <a:txBody>
+                    <a:bodyPr/>
+                    <a:lstStyle/>
+                    <a:p>
+                      <a:pPr>
+                        <a:defRPr sz="1050"/>
+                      </a:pPr>
+                      <a:r>
+                        <a:t>+..</a:t>
+                      </a:r>
+                    </a:p>
+                  </a:txBody>
+                  <a:tcPr/>
+                </a:tc>
+                <a:tc>
+                  <a:txBody>
+                    <a:bodyPr/>
+                    <a:lstStyle/>
+                    <a:p>
+                      <a:pPr>
+                        <a:defRPr sz="1050"/>
+                      </a:pPr>
+                      <a:r>
+                        <a:t>Not Clinically Relevant</a:t>
+                      </a:r>
+                    </a:p>
+                  </a:txBody>
+                  <a:tcPr/>
+                </a:tc>
+              </a:tr>
+              <a:tr h="195942">
+                <a:tc>
+                  <a:txBody>
+                    <a:bodyPr/>
+                    <a:lstStyle/>
+                    <a:p>
+                      <a:pPr>
+                        <a:defRPr sz="1050"/>
+                      </a:pPr>
+                      <a:r>
+                        <a:t>axitinib</a:t>
+                      </a:r>
+                    </a:p>
+                  </a:txBody>
+                  <a:tcPr/>
+                </a:tc>
+                <a:tc>
+                  <a:txBody>
+                    <a:bodyPr/>
+                    <a:lstStyle/>
+                    <a:p>
+                      <a:pPr>
+                        <a:defRPr sz="1050"/>
+                      </a:pPr>
+                      <a:r>
+                        <a:t>0.46</a:t>
+                      </a:r>
+                    </a:p>
+                  </a:txBody>
+                  <a:tcPr/>
+                </a:tc>
+                <a:tc>
+                  <a:txBody>
+                    <a:bodyPr/>
+                    <a:lstStyle/>
+                    <a:p>
+                      <a:pPr>
+                        <a:defRPr sz="1050"/>
+                      </a:pPr>
+                      <a:r>
+                        <a:t>++.</a:t>
+                      </a:r>
+                    </a:p>
+                  </a:txBody>
+                  <a:tcPr/>
+                </a:tc>
+                <a:tc>
+                  <a:txBody>
+                    <a:bodyPr/>
+                    <a:lstStyle/>
+                    <a:p>
+                      <a:pPr>
+                        <a:defRPr sz="1050"/>
+                      </a:pPr>
+                      <a:r>
+                        <a:t>VEGFR, c-KIT and PDGFR inhibitor</a:t>
+                      </a:r>
+                    </a:p>
+                  </a:txBody>
+                  <a:tcPr/>
+                </a:tc>
+              </a:tr>
+              <a:tr h="195942">
+                <a:tc>
+                  <a:txBody>
+                    <a:bodyPr/>
+                    <a:lstStyle/>
+                    <a:p>
+                      <a:pPr>
+                        <a:defRPr sz="1050"/>
+                      </a:pPr>
+                      <a:r>
+                        <a:t>xmd13-2</a:t>
+                      </a:r>
+                    </a:p>
+                  </a:txBody>
+                  <a:tcPr/>
+                </a:tc>
+                <a:tc>
+                  <a:txBody>
+                    <a:bodyPr/>
+                    <a:lstStyle/>
+                    <a:p>
+                      <a:pPr>
+                        <a:defRPr sz="1050"/>
+                      </a:pPr>
+                      <a:r>
+                        <a:t>0.46</a:t>
+                      </a:r>
+                    </a:p>
+                  </a:txBody>
+                  <a:tcPr/>
+                </a:tc>
+                <a:tc>
+                  <a:txBody>
+                    <a:bodyPr/>
+                    <a:lstStyle/>
+                    <a:p>
+                      <a:pPr>
+                        <a:defRPr sz="1050"/>
+                      </a:pPr>
+                      <a:r>
+                        <a:t>+..</a:t>
+                      </a:r>
+                    </a:p>
+                  </a:txBody>
+                  <a:tcPr/>
+                </a:tc>
+                <a:tc>
+                  <a:txBody>
+                    <a:bodyPr/>
+                    <a:lstStyle/>
+                    <a:p>
+                      <a:pPr>
+                        <a:defRPr sz="1050"/>
+                      </a:pPr>
+                      <a:r>
+                        <a:t>Not Clinically Relevant</a:t>
+                      </a:r>
+                    </a:p>
+                  </a:txBody>
+                  <a:tcPr/>
+                </a:tc>
+              </a:tr>
+              <a:tr h="195942">
+                <a:tc>
+                  <a:txBody>
+                    <a:bodyPr/>
+                    <a:lstStyle/>
+                    <a:p>
+                      <a:pPr>
+                        <a:defRPr sz="1050"/>
+                      </a:pPr>
+                      <a:r>
+                        <a:t>ml239</a:t>
+                      </a:r>
+                    </a:p>
+                  </a:txBody>
+                  <a:tcPr/>
+                </a:tc>
+                <a:tc>
+                  <a:txBody>
+                    <a:bodyPr/>
+                    <a:lstStyle/>
+                    <a:p>
+                      <a:pPr>
+                        <a:defRPr sz="1050"/>
+                      </a:pPr>
+                      <a:r>
+                        <a:t>0.44</a:t>
+                      </a:r>
+                    </a:p>
+                  </a:txBody>
+                  <a:tcPr/>
+                </a:tc>
+                <a:tc>
+                  <a:txBody>
+                    <a:bodyPr/>
+                    <a:lstStyle/>
+                    <a:p>
+                      <a:pPr>
+                        <a:defRPr sz="1050"/>
+                      </a:pPr>
+                      <a:r>
+                        <a:t>.+.</a:t>
+                      </a:r>
+                    </a:p>
+                  </a:txBody>
+                  <a:tcPr/>
+                </a:tc>
+                <a:tc>
+                  <a:txBody>
+                    <a:bodyPr/>
+                    <a:lstStyle/>
+                    <a:p>
+                      <a:pPr>
+                        <a:defRPr sz="1050"/>
+                      </a:pPr>
+                      <a:r>
+                        <a:t>Not Clinically Relevant</a:t>
+                      </a:r>
+                    </a:p>
+                  </a:txBody>
+                  <a:tcPr/>
+                </a:tc>
+              </a:tr>
+              <a:tr h="195942">
+                <a:tc>
+                  <a:txBody>
+                    <a:bodyPr/>
+                    <a:lstStyle/>
+                    <a:p>
+                      <a:pPr>
+                        <a:defRPr sz="1050"/>
+                      </a:pPr>
+                      <a:r>
+                        <a:t>abt-737</a:t>
+                      </a:r>
+                    </a:p>
+                  </a:txBody>
+                  <a:tcPr/>
+                </a:tc>
+                <a:tc>
+                  <a:txBody>
+                    <a:bodyPr/>
+                    <a:lstStyle/>
+                    <a:p>
+                      <a:pPr>
+                        <a:defRPr sz="1050"/>
+                      </a:pPr>
+                      <a:r>
+                        <a:t>0.44</a:t>
+                      </a:r>
+                    </a:p>
+                  </a:txBody>
+                  <a:tcPr/>
+                </a:tc>
+                <a:tc>
+                  <a:txBody>
+                    <a:bodyPr/>
+                    <a:lstStyle/>
+                    <a:p>
+                      <a:pPr>
+                        <a:defRPr sz="1050"/>
+                      </a:pPr>
+                      <a:r>
+                        <a:t>.+.</a:t>
+                      </a:r>
+                    </a:p>
+                  </a:txBody>
+                  <a:tcPr/>
+                </a:tc>
+                <a:tc>
+                  <a:txBody>
+                    <a:bodyPr/>
+                    <a:lstStyle/>
+                    <a:p>
+                      <a:pPr>
+                        <a:defRPr sz="1050"/>
+                      </a:pPr>
+                      <a:r>
+                        <a:t>Bcl-2/Bcl-xL inhibitor</a:t>
+                      </a:r>
+                    </a:p>
+                  </a:txBody>
+                  <a:tcPr/>
+                </a:tc>
+              </a:tr>
+              <a:tr h="195942">
+                <a:tc>
+                  <a:txBody>
+                    <a:bodyPr/>
+                    <a:lstStyle/>
+                    <a:p>
+                      <a:pPr>
+                        <a:defRPr sz="1050"/>
+                      </a:pPr>
+                      <a:r>
+                        <a:t>brd-k99006945</a:t>
+                      </a:r>
+                    </a:p>
+                  </a:txBody>
+                  <a:tcPr/>
+                </a:tc>
+                <a:tc>
+                  <a:txBody>
+                    <a:bodyPr/>
+                    <a:lstStyle/>
+                    <a:p>
+                      <a:pPr>
+                        <a:defRPr sz="1050"/>
+                      </a:pPr>
+                      <a:r>
+                        <a:t>0.44</a:t>
+                      </a:r>
+                    </a:p>
+                  </a:txBody>
+                  <a:tcPr/>
+                </a:tc>
+                <a:tc>
+                  <a:txBody>
+                    <a:bodyPr/>
+                    <a:lstStyle/>
+                    <a:p>
+                      <a:pPr>
+                        <a:defRPr sz="1050"/>
+                      </a:pPr>
+                      <a:r>
+                        <a:t>.+.</a:t>
+                      </a:r>
+                    </a:p>
+                  </a:txBody>
+                  <a:tcPr/>
+                </a:tc>
+                <a:tc>
+                  <a:txBody>
+                    <a:bodyPr/>
+                    <a:lstStyle/>
+                    <a:p>
+                      <a:pPr>
+                        <a:defRPr sz="1050"/>
+                      </a:pPr>
+                      <a:r>
+                        <a:t>Not Clinically Relevant</a:t>
+                      </a:r>
+                    </a:p>
+                  </a:txBody>
+                  <a:tcPr/>
+                </a:tc>
+              </a:tr>
+              <a:tr h="195960">
+                <a:tc>
+                  <a:txBody>
+                    <a:bodyPr/>
+                    <a:lstStyle/>
+                    <a:p>
+                      <a:pPr>
+                        <a:defRPr sz="1050"/>
+                      </a:pPr>
+                      <a:r>
+                        <a:t>brd-k51490254</a:t>
+                      </a:r>
+                    </a:p>
+                  </a:txBody>
+                  <a:tcPr/>
+                </a:tc>
+                <a:tc>
+                  <a:txBody>
+                    <a:bodyPr/>
+                    <a:lstStyle/>
+                    <a:p>
+                      <a:pPr>
+                        <a:defRPr sz="1050"/>
+                      </a:pPr>
+                      <a:r>
+                        <a:t>0.44</a:t>
+                      </a:r>
+                    </a:p>
+                  </a:txBody>
+                  <a:tcPr/>
+                </a:tc>
+                <a:tc>
+                  <a:txBody>
+                    <a:bodyPr/>
+                    <a:lstStyle/>
+                    <a:p>
+                      <a:pPr>
+                        <a:defRPr sz="1050"/>
+                      </a:pPr>
+                      <a:r>
+                        <a:t>.+.</a:t>
+                      </a:r>
+                    </a:p>
+                  </a:txBody>
+                  <a:tcPr/>
+                </a:tc>
+                <a:tc>
+                  <a:txBody>
+                    <a:bodyPr/>
+                    <a:lstStyle/>
+                    <a:p>
+                      <a:pPr>
+                        <a:defRPr sz="1050"/>
+                      </a:pPr>
+                      <a:r>
+                        <a:t>Not Clinically Relevant</a:t>
+                      </a:r>
+                    </a:p>
+                  </a:txBody>
+                  <a:tcPr/>
+                </a:tc>
+              </a:tr>
+            </a:tbl>
+          </a:graphicData>
+        </a:graphic>
+      </p:graphicFrame>
+    </p:spTree>
+  </p:cSld>
+  <p:clrMapOvr>
+    <a:masterClrMapping/>
+  </p:clrMapOvr>
+</p:sld>
+</file>
+
+<file path=ppt/slides/slide13.xml><?xml version="1.0" encoding="utf-8"?>
+<p:sld xmlns:a="http://schemas.openxmlformats.org/drawingml/2006/main" xmlns:p="http://schemas.openxmlformats.org/presentationml/2006/main" xmlns:r="http://schemas.openxmlformats.org/officeDocument/2006/relationships">
+  <p:cSld>
+    <p:spTree>
+      <p:nvGrpSpPr>
+        <p:cNvPr id="1" name=""/>
+        <p:cNvGrpSpPr/>
+        <p:nvPr/>
+      </p:nvGrpSpPr>
+      <p:grpSpPr/>
+      <p:sp>
+        <p:nvSpPr>
+          <p:cNvPr id="2" name="TextBox 1"/>
+          <p:cNvSpPr txBox="1"/>
+          <p:nvPr/>
+        </p:nvSpPr>
+        <p:spPr>
+          <a:xfrm>
+            <a:off x="0" y="0"/>
+            <a:ext cx="9144000" cy="685800"/>
+          </a:xfrm>
+          <a:prstGeom prst="rect">
+            <a:avLst/>
+          </a:prstGeom>
+          <a:noFill/>
+        </p:spPr>
+        <p:txBody>
+          <a:bodyPr wrap="none">
+            <a:spAutoFit/>
+          </a:bodyPr>
+          <a:lstStyle/>
+          <a:p/>
+          <a:p>
+            <a:pPr>
+              <a:defRPr sz="2600"/>
+            </a:pPr>
+            <a:r>
+              <a:t>DiSCoVER: top drugs (cerebellar stem cell control)</a:t>
+            </a:r>
+          </a:p>
+        </p:txBody>
+      </p:sp>
+      <p:graphicFrame>
+        <p:nvGraphicFramePr>
+          <p:cNvPr id="3" name="Table 2"/>
+          <p:cNvGraphicFramePr>
+            <a:graphicFrameLocks noGrp="1"/>
+          </p:cNvGraphicFramePr>
+          <p:nvPr/>
+        </p:nvGraphicFramePr>
+        <p:xfrm>
+          <a:off x="411480" y="777240"/>
+          <a:ext cx="8275320" cy="4114800"/>
+        </p:xfrm>
+        <a:graphic>
+          <a:graphicData uri="http://schemas.openxmlformats.org/drawingml/2006/table">
+            <a:tbl>
+              <a:tblPr firstRow="1" bandRow="1">
+                <a:tableStyleId>{5C22544A-7EE6-4342-B048-85BDC9FD1C3A}</a:tableStyleId>
+              </a:tblPr>
+              <a:tblGrid>
+                <a:gridCol w="1005840"/>
+                <a:gridCol w="731520"/>
+                <a:gridCol w="1051560"/>
+                <a:gridCol w="5486400"/>
+              </a:tblGrid>
+              <a:tr h="195942">
+                <a:tc>
+                  <a:txBody>
+                    <a:bodyPr/>
+                    <a:lstStyle/>
+                    <a:p>
+                      <a:r>
+                        <a:t>Drug</a:t>
+                      </a:r>
+                    </a:p>
+                  </a:txBody>
+                  <a:tcPr/>
+                </a:tc>
+                <a:tc>
+                  <a:txBody>
+                    <a:bodyPr/>
+                    <a:lstStyle/>
+                    <a:p>
+                      <a:r>
+                        <a:t>Score</a:t>
+                      </a:r>
+                    </a:p>
+                  </a:txBody>
+                  <a:tcPr/>
+                </a:tc>
+                <a:tc>
+                  <a:txBody>
+                    <a:bodyPr/>
+                    <a:lstStyle/>
+                    <a:p>
+                      <a:r>
+                        <a:t>Evidence</a:t>
+                      </a:r>
+                    </a:p>
+                  </a:txBody>
+                  <a:tcPr/>
+                </a:tc>
+                <a:tc>
+                  <a:txBody>
+                    <a:bodyPr/>
+                    <a:lstStyle/>
+                    <a:p>
+                      <a:r>
+                        <a:t>Mechanism of action</a:t>
+                      </a:r>
+                    </a:p>
+                  </a:txBody>
+                  <a:tcPr/>
+                </a:tc>
+              </a:tr>
+              <a:tr h="195942">
+                <a:tc>
+                  <a:txBody>
+                    <a:bodyPr/>
+                    <a:lstStyle/>
+                    <a:p>
+                      <a:pPr>
+                        <a:defRPr sz="1050"/>
+                      </a:pPr>
+                      <a:r>
+                        <a:t>tl-2-105</a:t>
+                      </a:r>
+                    </a:p>
+                  </a:txBody>
+                  <a:tcPr/>
+                </a:tc>
+                <a:tc>
+                  <a:txBody>
+                    <a:bodyPr/>
+                    <a:lstStyle/>
+                    <a:p>
+                      <a:pPr>
+                        <a:defRPr sz="1050"/>
+                      </a:pPr>
+                      <a:r>
+                        <a:t>0.69</a:t>
+                      </a:r>
+                    </a:p>
+                  </a:txBody>
+                  <a:tcPr/>
+                </a:tc>
+                <a:tc>
+                  <a:txBody>
+                    <a:bodyPr/>
+                    <a:lstStyle/>
+                    <a:p>
+                      <a:pPr>
+                        <a:defRPr sz="1050"/>
+                      </a:pPr>
+                      <a:r>
+                        <a:t>+..</a:t>
+                      </a:r>
+                    </a:p>
+                  </a:txBody>
+                  <a:tcPr/>
+                </a:tc>
+                <a:tc>
+                  <a:txBody>
+                    <a:bodyPr/>
+                    <a:lstStyle/>
+                    <a:p>
+                      <a:pPr>
+                        <a:defRPr sz="1050"/>
+                      </a:pPr>
+                      <a:r>
+                        <a:t>Not Clinically Relevant</a:t>
+                      </a:r>
+                    </a:p>
+                  </a:txBody>
+                  <a:tcPr/>
+                </a:tc>
+              </a:tr>
+              <a:tr h="195942">
+                <a:tc>
+                  <a:txBody>
+                    <a:bodyPr/>
+                    <a:lstStyle/>
+                    <a:p>
+                      <a:pPr>
+                        <a:defRPr sz="1050"/>
+                      </a:pPr>
+                      <a:r>
+                        <a:t>sb52334</a:t>
+                      </a:r>
+                    </a:p>
+                  </a:txBody>
+                  <a:tcPr/>
+                </a:tc>
+                <a:tc>
+                  <a:txBody>
+                    <a:bodyPr/>
+                    <a:lstStyle/>
+                    <a:p>
+                      <a:pPr>
+                        <a:defRPr sz="1050"/>
+                      </a:pPr>
+                      <a:r>
+                        <a:t>0.66</a:t>
+                      </a:r>
+                    </a:p>
+                  </a:txBody>
+                  <a:tcPr/>
+                </a:tc>
+                <a:tc>
+                  <a:txBody>
+                    <a:bodyPr/>
+                    <a:lstStyle/>
+                    <a:p>
+                      <a:pPr>
+                        <a:defRPr sz="1050"/>
+                      </a:pPr>
+                      <a:r>
+                        <a:t>+..</a:t>
+                      </a:r>
+                    </a:p>
+                  </a:txBody>
+                  <a:tcPr/>
+                </a:tc>
+                <a:tc>
+                  <a:txBody>
+                    <a:bodyPr/>
+                    <a:lstStyle/>
+                    <a:p>
+                      <a:pPr>
+                        <a:defRPr sz="1050"/>
+                      </a:pPr>
+                      <a:r>
+                        <a:t>Not Clinically Relevant</a:t>
+                      </a:r>
+                    </a:p>
+                  </a:txBody>
+                  <a:tcPr/>
+                </a:tc>
+              </a:tr>
+              <a:tr h="195942">
+                <a:tc>
+                  <a:txBody>
+                    <a:bodyPr/>
+                    <a:lstStyle/>
+                    <a:p>
+                      <a:pPr>
+                        <a:defRPr sz="1050"/>
+                      </a:pPr>
+                      <a:r>
+                        <a:t>gsk1070916</a:t>
+                      </a:r>
+                    </a:p>
+                  </a:txBody>
+                  <a:tcPr/>
+                </a:tc>
+                <a:tc>
+                  <a:txBody>
+                    <a:bodyPr/>
+                    <a:lstStyle/>
+                    <a:p>
+                      <a:pPr>
+                        <a:defRPr sz="1050"/>
+                      </a:pPr>
+                      <a:r>
+                        <a:t>0.63</a:t>
+                      </a:r>
+                    </a:p>
+                  </a:txBody>
+                  <a:tcPr/>
+                </a:tc>
+                <a:tc>
+                  <a:txBody>
+                    <a:bodyPr/>
+                    <a:lstStyle/>
+                    <a:p>
+                      <a:pPr>
+                        <a:defRPr sz="1050"/>
+                      </a:pPr>
+                      <a:r>
+                        <a:t>+..</a:t>
+                      </a:r>
+                    </a:p>
+                  </a:txBody>
+                  <a:tcPr/>
+                </a:tc>
+                <a:tc>
+                  <a:txBody>
+                    <a:bodyPr/>
+                    <a:lstStyle/>
+                    <a:p>
+                      <a:pPr>
+                        <a:defRPr sz="1050"/>
+                      </a:pPr>
+                      <a:r>
+                        <a:t>Not Clinically Relevant</a:t>
+                      </a:r>
+                    </a:p>
+                  </a:txBody>
+                  <a:tcPr/>
+                </a:tc>
+              </a:tr>
+              <a:tr h="195942">
+                <a:tc>
+                  <a:txBody>
+                    <a:bodyPr/>
+                    <a:lstStyle/>
+                    <a:p>
+                      <a:pPr>
+                        <a:defRPr sz="1050"/>
+                      </a:pPr>
+                      <a:r>
+                        <a:t>gw-2580</a:t>
+                      </a:r>
+                    </a:p>
+                  </a:txBody>
+                  <a:tcPr/>
+                </a:tc>
+                <a:tc>
+                  <a:txBody>
+                    <a:bodyPr/>
+                    <a:lstStyle/>
+                    <a:p>
+                      <a:pPr>
+                        <a:defRPr sz="1050"/>
+                      </a:pPr>
+                      <a:r>
+                        <a:t>0.62</a:t>
+                      </a:r>
+                    </a:p>
+                  </a:txBody>
+                  <a:tcPr/>
+                </a:tc>
+                <a:tc>
+                  <a:txBody>
+                    <a:bodyPr/>
+                    <a:lstStyle/>
+                    <a:p>
+                      <a:pPr>
+                        <a:defRPr sz="1050"/>
+                      </a:pPr>
+                      <a:r>
+                        <a:t>+..</a:t>
+                      </a:r>
+                    </a:p>
+                  </a:txBody>
+                  <a:tcPr/>
+                </a:tc>
+                <a:tc>
+                  <a:txBody>
+                    <a:bodyPr/>
+                    <a:lstStyle/>
+                    <a:p>
+                      <a:pPr>
+                        <a:defRPr sz="1050"/>
+                      </a:pPr>
+                      <a:r>
+                        <a:t>Not Clinically Relevant</a:t>
+                      </a:r>
+                    </a:p>
+                  </a:txBody>
+                  <a:tcPr/>
+                </a:tc>
+              </a:tr>
+              <a:tr h="195942">
+                <a:tc>
+                  <a:txBody>
+                    <a:bodyPr/>
+                    <a:lstStyle/>
+                    <a:p>
+                      <a:pPr>
+                        <a:defRPr sz="1050"/>
+                      </a:pPr>
+                      <a:r>
+                        <a:t>linsitinib</a:t>
+                      </a:r>
+                    </a:p>
+                  </a:txBody>
+                  <a:tcPr/>
+                </a:tc>
+                <a:tc>
+                  <a:txBody>
+                    <a:bodyPr/>
+                    <a:lstStyle/>
+                    <a:p>
+                      <a:pPr>
+                        <a:defRPr sz="1050"/>
+                      </a:pPr>
+                      <a:r>
+                        <a:t>0.58</a:t>
+                      </a:r>
+                    </a:p>
+                  </a:txBody>
+                  <a:tcPr/>
+                </a:tc>
+                <a:tc>
+                  <a:txBody>
+                    <a:bodyPr/>
+                    <a:lstStyle/>
+                    <a:p>
+                      <a:pPr>
+                        <a:defRPr sz="1050"/>
+                      </a:pPr>
+                      <a:r>
+                        <a:t>++.</a:t>
+                      </a:r>
+                    </a:p>
+                  </a:txBody>
+                  <a:tcPr/>
+                </a:tc>
+                <a:tc>
+                  <a:txBody>
+                    <a:bodyPr/>
+                    <a:lstStyle/>
+                    <a:p>
+                      <a:pPr>
+                        <a:defRPr sz="1050"/>
+                      </a:pPr>
+                      <a:r>
+                        <a:t>IGF-1R inhibitor</a:t>
+                      </a:r>
+                    </a:p>
+                  </a:txBody>
+                  <a:tcPr/>
+                </a:tc>
+              </a:tr>
+              <a:tr h="195942">
+                <a:tc>
+                  <a:txBody>
+                    <a:bodyPr/>
+                    <a:lstStyle/>
+                    <a:p>
+                      <a:pPr>
+                        <a:defRPr sz="1050"/>
+                      </a:pPr>
+                      <a:r>
+                        <a:t>vx-702</a:t>
+                      </a:r>
+                    </a:p>
+                  </a:txBody>
+                  <a:tcPr/>
+                </a:tc>
+                <a:tc>
+                  <a:txBody>
+                    <a:bodyPr/>
+                    <a:lstStyle/>
+                    <a:p>
+                      <a:pPr>
+                        <a:defRPr sz="1050"/>
+                      </a:pPr>
+                      <a:r>
+                        <a:t>0.57</a:t>
+                      </a:r>
+                    </a:p>
+                  </a:txBody>
+                  <a:tcPr/>
+                </a:tc>
+                <a:tc>
+                  <a:txBody>
+                    <a:bodyPr/>
+                    <a:lstStyle/>
+                    <a:p>
+                      <a:pPr>
+                        <a:defRPr sz="1050"/>
+                      </a:pPr>
+                      <a:r>
+                        <a:t>+..</a:t>
+                      </a:r>
+                    </a:p>
+                  </a:txBody>
+                  <a:tcPr/>
+                </a:tc>
+                <a:tc>
+                  <a:txBody>
+                    <a:bodyPr/>
+                    <a:lstStyle/>
+                    <a:p>
+                      <a:pPr>
+                        <a:defRPr sz="1050"/>
+                      </a:pPr>
+                      <a:r>
+                        <a:t>Not Clinically Relevant</a:t>
+                      </a:r>
+                    </a:p>
+                  </a:txBody>
+                  <a:tcPr/>
+                </a:tc>
+              </a:tr>
+              <a:tr h="195942">
+                <a:tc>
+                  <a:txBody>
+                    <a:bodyPr/>
+                    <a:lstStyle/>
+                    <a:p>
+                      <a:pPr>
+                        <a:defRPr sz="1050"/>
+                      </a:pPr>
+                      <a:r>
+                        <a:t>bx-912</a:t>
+                      </a:r>
+                    </a:p>
+                  </a:txBody>
+                  <a:tcPr/>
+                </a:tc>
+                <a:tc>
+                  <a:txBody>
+                    <a:bodyPr/>
+                    <a:lstStyle/>
+                    <a:p>
+                      <a:pPr>
+                        <a:defRPr sz="1050"/>
+                      </a:pPr>
+                      <a:r>
+                        <a:t>0.54</a:t>
+                      </a:r>
+                    </a:p>
+                  </a:txBody>
+                  <a:tcPr/>
+                </a:tc>
+                <a:tc>
+                  <a:txBody>
+                    <a:bodyPr/>
+                    <a:lstStyle/>
+                    <a:p>
+                      <a:pPr>
+                        <a:defRPr sz="1050"/>
+                      </a:pPr>
+                      <a:r>
+                        <a:t>+..</a:t>
+                      </a:r>
+                    </a:p>
+                  </a:txBody>
+                  <a:tcPr/>
+                </a:tc>
+                <a:tc>
+                  <a:txBody>
+                    <a:bodyPr/>
+                    <a:lstStyle/>
+                    <a:p>
+                      <a:pPr>
+                        <a:defRPr sz="1050"/>
+                      </a:pPr>
+                      <a:r>
+                        <a:t>Not Clinically Relevant</a:t>
+                      </a:r>
+                    </a:p>
+                  </a:txBody>
+                  <a:tcPr/>
+                </a:tc>
+              </a:tr>
+              <a:tr h="195942">
+                <a:tc>
+                  <a:txBody>
+                    <a:bodyPr/>
+                    <a:lstStyle/>
+                    <a:p>
+                      <a:pPr>
+                        <a:defRPr sz="1050"/>
+                      </a:pPr>
+                      <a:r>
+                        <a:t>tubastatin a</a:t>
+                      </a:r>
+                    </a:p>
+                  </a:txBody>
+                  <a:tcPr/>
+                </a:tc>
+                <a:tc>
+                  <a:txBody>
+                    <a:bodyPr/>
+                    <a:lstStyle/>
+                    <a:p>
+                      <a:pPr>
+                        <a:defRPr sz="1050"/>
+                      </a:pPr>
+                      <a:r>
+                        <a:t>0.54</a:t>
+                      </a:r>
+                    </a:p>
+                  </a:txBody>
+                  <a:tcPr/>
+                </a:tc>
+                <a:tc>
+                  <a:txBody>
+                    <a:bodyPr/>
+                    <a:lstStyle/>
+                    <a:p>
+                      <a:pPr>
+                        <a:defRPr sz="1050"/>
+                      </a:pPr>
+                      <a:r>
+                        <a:t>++.</a:t>
+                      </a:r>
+                    </a:p>
+                  </a:txBody>
+                  <a:tcPr/>
+                </a:tc>
+                <a:tc>
+                  <a:txBody>
+                    <a:bodyPr/>
+                    <a:lstStyle/>
+                    <a:p>
+                      <a:pPr>
+                        <a:defRPr sz="1050"/>
+                      </a:pPr>
+                      <a:r>
+                        <a:t>Not Clinically Relevant</a:t>
+                      </a:r>
+                    </a:p>
+                  </a:txBody>
+                  <a:tcPr/>
+                </a:tc>
+              </a:tr>
+              <a:tr h="195942">
+                <a:tc>
+                  <a:txBody>
+                    <a:bodyPr/>
+                    <a:lstStyle/>
+                    <a:p>
+                      <a:pPr>
+                        <a:defRPr sz="1050"/>
+                      </a:pPr>
+                      <a:r>
+                        <a:t>navitoclax</a:t>
+                      </a:r>
+                    </a:p>
+                  </a:txBody>
+                  <a:tcPr/>
+                </a:tc>
+                <a:tc>
+                  <a:txBody>
+                    <a:bodyPr/>
+                    <a:lstStyle/>
+                    <a:p>
+                      <a:pPr>
+                        <a:defRPr sz="1050"/>
+                      </a:pPr>
+                      <a:r>
+                        <a:t>0.51</a:t>
+                      </a:r>
+                    </a:p>
+                  </a:txBody>
+                  <a:tcPr/>
+                </a:tc>
+                <a:tc>
+                  <a:txBody>
+                    <a:bodyPr/>
+                    <a:lstStyle/>
+                    <a:p>
+                      <a:pPr>
+                        <a:defRPr sz="1050"/>
+                      </a:pPr>
+                      <a:r>
+                        <a:t>++.</a:t>
+                      </a:r>
+                    </a:p>
+                  </a:txBody>
+                  <a:tcPr/>
+                </a:tc>
+                <a:tc>
+                  <a:txBody>
+                    <a:bodyPr/>
+                    <a:lstStyle/>
+                    <a:p>
+                      <a:pPr>
+                        <a:defRPr sz="1050"/>
+                      </a:pPr>
+                      <a:r>
+                        <a:t>Bcl-2 family inhibitor: esp Bcl-xL, Bcl-2 and Bcl-w</a:t>
+                      </a:r>
+                    </a:p>
+                  </a:txBody>
+                  <a:tcPr/>
+                </a:tc>
+              </a:tr>
+              <a:tr h="195942">
+                <a:tc>
+                  <a:txBody>
+                    <a:bodyPr/>
+                    <a:lstStyle/>
+                    <a:p>
+                      <a:pPr>
+                        <a:defRPr sz="1050"/>
+                      </a:pPr>
+                      <a:r>
+                        <a:t>amuvatinib</a:t>
+                      </a:r>
+                    </a:p>
+                  </a:txBody>
+                  <a:tcPr/>
+                </a:tc>
+                <a:tc>
+                  <a:txBody>
+                    <a:bodyPr/>
+                    <a:lstStyle/>
+                    <a:p>
+                      <a:pPr>
+                        <a:defRPr sz="1050"/>
+                      </a:pPr>
+                      <a:r>
+                        <a:t>0.51</a:t>
+                      </a:r>
+                    </a:p>
+                  </a:txBody>
+                  <a:tcPr/>
+                </a:tc>
+                <a:tc>
+                  <a:txBody>
+                    <a:bodyPr/>
+                    <a:lstStyle/>
+                    <a:p>
+                      <a:pPr>
+                        <a:defRPr sz="1050"/>
+                      </a:pPr>
+                      <a:r>
+                        <a:t>+..</a:t>
+                      </a:r>
+                    </a:p>
+                  </a:txBody>
+                  <a:tcPr/>
+                </a:tc>
+                <a:tc>
+                  <a:txBody>
+                    <a:bodyPr/>
+                    <a:lstStyle/>
+                    <a:p>
+                      <a:pPr>
+                        <a:defRPr sz="1050"/>
+                      </a:pPr>
+                      <a:r>
+                        <a:t>Not Clinically Relevant</a:t>
+                      </a:r>
+                    </a:p>
+                  </a:txBody>
+                  <a:tcPr/>
+                </a:tc>
+              </a:tr>
+              <a:tr h="195942">
+                <a:tc>
+                  <a:txBody>
+                    <a:bodyPr/>
+                    <a:lstStyle/>
+                    <a:p>
+                      <a:pPr>
+                        <a:defRPr sz="1050"/>
+                      </a:pPr>
+                      <a:r>
+                        <a:t>rucaparib</a:t>
+                      </a:r>
+                    </a:p>
+                  </a:txBody>
+                  <a:tcPr/>
+                </a:tc>
+                <a:tc>
+                  <a:txBody>
+                    <a:bodyPr/>
+                    <a:lstStyle/>
+                    <a:p>
+                      <a:pPr>
+                        <a:defRPr sz="1050"/>
+                      </a:pPr>
+                      <a:r>
+                        <a:t>0.5</a:t>
+                      </a:r>
+                    </a:p>
+                  </a:txBody>
+                  <a:tcPr/>
+                </a:tc>
+                <a:tc>
+                  <a:txBody>
+                    <a:bodyPr/>
+                    <a:lstStyle/>
+                    <a:p>
+                      <a:pPr>
+                        <a:defRPr sz="1050"/>
+                      </a:pPr>
+                      <a:r>
+                        <a:t>+..</a:t>
+                      </a:r>
+                    </a:p>
+                  </a:txBody>
+                  <a:tcPr/>
+                </a:tc>
+                <a:tc>
+                  <a:txBody>
+                    <a:bodyPr/>
+                    <a:lstStyle/>
+                    <a:p>
+                      <a:pPr>
+                        <a:defRPr sz="1050"/>
+                      </a:pPr>
+                      <a:r>
+                        <a:t>PARP inhibitor, inhibits DNA repair</a:t>
+                      </a:r>
+                    </a:p>
+                  </a:txBody>
+                  <a:tcPr/>
+                </a:tc>
+              </a:tr>
+              <a:tr h="195942">
+                <a:tc>
+                  <a:txBody>
+                    <a:bodyPr/>
+                    <a:lstStyle/>
+                    <a:p>
+                      <a:pPr>
+                        <a:defRPr sz="1050"/>
+                      </a:pPr>
+                      <a:r>
+                        <a:t>avrainvillamide</a:t>
+                      </a:r>
+                    </a:p>
+                  </a:txBody>
+                  <a:tcPr/>
+                </a:tc>
+                <a:tc>
+                  <a:txBody>
+                    <a:bodyPr/>
+                    <a:lstStyle/>
+                    <a:p>
+                      <a:pPr>
+                        <a:defRPr sz="1050"/>
+                      </a:pPr>
+                      <a:r>
+                        <a:t>0.48</a:t>
+                      </a:r>
+                    </a:p>
+                  </a:txBody>
+                  <a:tcPr/>
+                </a:tc>
+                <a:tc>
+                  <a:txBody>
+                    <a:bodyPr/>
+                    <a:lstStyle/>
+                    <a:p>
+                      <a:pPr>
+                        <a:defRPr sz="1050"/>
+                      </a:pPr>
+                      <a:r>
+                        <a:t>.+.</a:t>
+                      </a:r>
+                    </a:p>
+                  </a:txBody>
+                  <a:tcPr/>
+                </a:tc>
+                <a:tc>
+                  <a:txBody>
+                    <a:bodyPr/>
+                    <a:lstStyle/>
+                    <a:p>
+                      <a:pPr>
+                        <a:defRPr sz="1050"/>
+                      </a:pPr>
+                      <a:r>
+                        <a:t>Not Clinically Relevant</a:t>
+                      </a:r>
+                    </a:p>
+                  </a:txBody>
+                  <a:tcPr/>
+                </a:tc>
+              </a:tr>
+              <a:tr h="195942">
+                <a:tc>
+                  <a:txBody>
+                    <a:bodyPr/>
+                    <a:lstStyle/>
+                    <a:p>
+                      <a:pPr>
+                        <a:defRPr sz="1050"/>
+                      </a:pPr>
+                      <a:r>
+                        <a:t>gsk319347a</a:t>
+                      </a:r>
+                    </a:p>
+                  </a:txBody>
+                  <a:tcPr/>
+                </a:tc>
+                <a:tc>
+                  <a:txBody>
+                    <a:bodyPr/>
+                    <a:lstStyle/>
+                    <a:p>
+                      <a:pPr>
+                        <a:defRPr sz="1050"/>
+                      </a:pPr>
+                      <a:r>
+                        <a:t>0.48</a:t>
+                      </a:r>
+                    </a:p>
+                  </a:txBody>
+                  <a:tcPr/>
+                </a:tc>
+                <a:tc>
+                  <a:txBody>
+                    <a:bodyPr/>
+                    <a:lstStyle/>
+                    <a:p>
+                      <a:pPr>
+                        <a:defRPr sz="1050"/>
+                      </a:pPr>
+                      <a:r>
+                        <a:t>+..</a:t>
+                      </a:r>
+                    </a:p>
+                  </a:txBody>
+                  <a:tcPr/>
+                </a:tc>
+                <a:tc>
+                  <a:txBody>
+                    <a:bodyPr/>
+                    <a:lstStyle/>
+                    <a:p>
+                      <a:pPr>
+                        <a:defRPr sz="1050"/>
+                      </a:pPr>
+                      <a:r>
+                        <a:t>Not Clinically Relevant</a:t>
+                      </a:r>
+                    </a:p>
+                  </a:txBody>
+                  <a:tcPr/>
+                </a:tc>
+              </a:tr>
+              <a:tr h="195942">
+                <a:tc>
+                  <a:txBody>
+                    <a:bodyPr/>
+                    <a:lstStyle/>
+                    <a:p>
+                      <a:pPr>
+                        <a:defRPr sz="1050"/>
+                      </a:pPr>
+                      <a:r>
+                        <a:t>nsc-87877</a:t>
+                      </a:r>
+                    </a:p>
+                  </a:txBody>
+                  <a:tcPr/>
+                </a:tc>
+                <a:tc>
+                  <a:txBody>
+                    <a:bodyPr/>
+                    <a:lstStyle/>
+                    <a:p>
+                      <a:pPr>
+                        <a:defRPr sz="1050"/>
+                      </a:pPr>
+                      <a:r>
+                        <a:t>0.47</a:t>
+                      </a:r>
+                    </a:p>
+                  </a:txBody>
+                  <a:tcPr/>
+                </a:tc>
+                <a:tc>
+                  <a:txBody>
+                    <a:bodyPr/>
+                    <a:lstStyle/>
+                    <a:p>
+                      <a:pPr>
+                        <a:defRPr sz="1050"/>
+                      </a:pPr>
+                      <a:r>
+                        <a:t>+..</a:t>
+                      </a:r>
+                    </a:p>
+                  </a:txBody>
+                  <a:tcPr/>
+                </a:tc>
+                <a:tc>
+                  <a:txBody>
+                    <a:bodyPr/>
+                    <a:lstStyle/>
+                    <a:p>
+                      <a:pPr>
+                        <a:defRPr sz="1050"/>
+                      </a:pPr>
+                      <a:r>
+                        <a:t>Not Clinically Relevant</a:t>
+                      </a:r>
+                    </a:p>
+                  </a:txBody>
+                  <a:tcPr/>
+                </a:tc>
+              </a:tr>
+              <a:tr h="195942">
+                <a:tc>
+                  <a:txBody>
+                    <a:bodyPr/>
+                    <a:lstStyle/>
+                    <a:p>
+                      <a:pPr>
+                        <a:defRPr sz="1050"/>
+                      </a:pPr>
+                      <a:r>
+                        <a:t>axitinib</a:t>
+                      </a:r>
+                    </a:p>
+                  </a:txBody>
+                  <a:tcPr/>
+                </a:tc>
+                <a:tc>
+                  <a:txBody>
+                    <a:bodyPr/>
+                    <a:lstStyle/>
+                    <a:p>
+                      <a:pPr>
+                        <a:defRPr sz="1050"/>
+                      </a:pPr>
+                      <a:r>
+                        <a:t>0.46</a:t>
+                      </a:r>
+                    </a:p>
+                  </a:txBody>
+                  <a:tcPr/>
+                </a:tc>
+                <a:tc>
+                  <a:txBody>
+                    <a:bodyPr/>
+                    <a:lstStyle/>
+                    <a:p>
+                      <a:pPr>
+                        <a:defRPr sz="1050"/>
+                      </a:pPr>
+                      <a:r>
+                        <a:t>++.</a:t>
+                      </a:r>
+                    </a:p>
+                  </a:txBody>
+                  <a:tcPr/>
+                </a:tc>
+                <a:tc>
+                  <a:txBody>
+                    <a:bodyPr/>
+                    <a:lstStyle/>
+                    <a:p>
+                      <a:pPr>
+                        <a:defRPr sz="1050"/>
+                      </a:pPr>
+                      <a:r>
+                        <a:t>VEGFR, c-KIT and PDGFR inhibitor</a:t>
+                      </a:r>
+                    </a:p>
+                  </a:txBody>
+                  <a:tcPr/>
+                </a:tc>
+              </a:tr>
+              <a:tr h="195942">
+                <a:tc>
+                  <a:txBody>
+                    <a:bodyPr/>
+                    <a:lstStyle/>
+                    <a:p>
+                      <a:pPr>
+                        <a:defRPr sz="1050"/>
+                      </a:pPr>
+                      <a:r>
+                        <a:t>xmd13-2</a:t>
+                      </a:r>
+                    </a:p>
+                  </a:txBody>
+                  <a:tcPr/>
+                </a:tc>
+                <a:tc>
+                  <a:txBody>
+                    <a:bodyPr/>
+                    <a:lstStyle/>
+                    <a:p>
+                      <a:pPr>
+                        <a:defRPr sz="1050"/>
+                      </a:pPr>
+                      <a:r>
+                        <a:t>0.46</a:t>
+                      </a:r>
+                    </a:p>
+                  </a:txBody>
+                  <a:tcPr/>
+                </a:tc>
+                <a:tc>
+                  <a:txBody>
+                    <a:bodyPr/>
+                    <a:lstStyle/>
+                    <a:p>
+                      <a:pPr>
+                        <a:defRPr sz="1050"/>
+                      </a:pPr>
+                      <a:r>
+                        <a:t>+..</a:t>
+                      </a:r>
+                    </a:p>
+                  </a:txBody>
+                  <a:tcPr/>
+                </a:tc>
+                <a:tc>
+                  <a:txBody>
+                    <a:bodyPr/>
+                    <a:lstStyle/>
+                    <a:p>
+                      <a:pPr>
+                        <a:defRPr sz="1050"/>
+                      </a:pPr>
+                      <a:r>
+                        <a:t>Not Clinically Relevant</a:t>
+                      </a:r>
+                    </a:p>
+                  </a:txBody>
+                  <a:tcPr/>
+                </a:tc>
+              </a:tr>
+              <a:tr h="195942">
+                <a:tc>
+                  <a:txBody>
+                    <a:bodyPr/>
+                    <a:lstStyle/>
+                    <a:p>
+                      <a:pPr>
+                        <a:defRPr sz="1050"/>
+                      </a:pPr>
+                      <a:r>
+                        <a:t>ml239</a:t>
+                      </a:r>
+                    </a:p>
+                  </a:txBody>
+                  <a:tcPr/>
+                </a:tc>
+                <a:tc>
+                  <a:txBody>
+                    <a:bodyPr/>
+                    <a:lstStyle/>
+                    <a:p>
+                      <a:pPr>
+                        <a:defRPr sz="1050"/>
+                      </a:pPr>
+                      <a:r>
+                        <a:t>0.44</a:t>
+                      </a:r>
+                    </a:p>
+                  </a:txBody>
+                  <a:tcPr/>
+                </a:tc>
+                <a:tc>
+                  <a:txBody>
+                    <a:bodyPr/>
+                    <a:lstStyle/>
+                    <a:p>
+                      <a:pPr>
+                        <a:defRPr sz="1050"/>
+                      </a:pPr>
+                      <a:r>
+                        <a:t>.+.</a:t>
+                      </a:r>
+                    </a:p>
+                  </a:txBody>
+                  <a:tcPr/>
+                </a:tc>
+                <a:tc>
+                  <a:txBody>
+                    <a:bodyPr/>
+                    <a:lstStyle/>
+                    <a:p>
+                      <a:pPr>
+                        <a:defRPr sz="1050"/>
+                      </a:pPr>
+                      <a:r>
+                        <a:t>Not Clinically Relevant</a:t>
+                      </a:r>
+                    </a:p>
+                  </a:txBody>
+                  <a:tcPr/>
+                </a:tc>
+              </a:tr>
+              <a:tr h="195942">
+                <a:tc>
+                  <a:txBody>
+                    <a:bodyPr/>
+                    <a:lstStyle/>
+                    <a:p>
+                      <a:pPr>
+                        <a:defRPr sz="1050"/>
+                      </a:pPr>
+                      <a:r>
+                        <a:t>abt-737</a:t>
+                      </a:r>
+                    </a:p>
+                  </a:txBody>
+                  <a:tcPr/>
+                </a:tc>
+                <a:tc>
+                  <a:txBody>
+                    <a:bodyPr/>
+                    <a:lstStyle/>
+                    <a:p>
+                      <a:pPr>
+                        <a:defRPr sz="1050"/>
+                      </a:pPr>
+                      <a:r>
+                        <a:t>0.44</a:t>
+                      </a:r>
+                    </a:p>
+                  </a:txBody>
+                  <a:tcPr/>
+                </a:tc>
+                <a:tc>
+                  <a:txBody>
+                    <a:bodyPr/>
+                    <a:lstStyle/>
+                    <a:p>
+                      <a:pPr>
+                        <a:defRPr sz="1050"/>
+                      </a:pPr>
+                      <a:r>
+                        <a:t>.+.</a:t>
+                      </a:r>
+                    </a:p>
+                  </a:txBody>
+                  <a:tcPr/>
+                </a:tc>
+                <a:tc>
+                  <a:txBody>
+                    <a:bodyPr/>
+                    <a:lstStyle/>
+                    <a:p>
+                      <a:pPr>
+                        <a:defRPr sz="1050"/>
+                      </a:pPr>
+                      <a:r>
+                        <a:t>Bcl-2/Bcl-xL inhibitor</a:t>
+                      </a:r>
+                    </a:p>
+                  </a:txBody>
+                  <a:tcPr/>
+                </a:tc>
+              </a:tr>
+              <a:tr h="195942">
+                <a:tc>
+                  <a:txBody>
+                    <a:bodyPr/>
+                    <a:lstStyle/>
+                    <a:p>
+                      <a:pPr>
+                        <a:defRPr sz="1050"/>
+                      </a:pPr>
+                      <a:r>
+                        <a:t>brd-k99006945</a:t>
+                      </a:r>
+                    </a:p>
+                  </a:txBody>
+                  <a:tcPr/>
+                </a:tc>
+                <a:tc>
+                  <a:txBody>
+                    <a:bodyPr/>
+                    <a:lstStyle/>
+                    <a:p>
+                      <a:pPr>
+                        <a:defRPr sz="1050"/>
+                      </a:pPr>
+                      <a:r>
+                        <a:t>0.44</a:t>
+                      </a:r>
+                    </a:p>
+                  </a:txBody>
+                  <a:tcPr/>
+                </a:tc>
+                <a:tc>
+                  <a:txBody>
+                    <a:bodyPr/>
+                    <a:lstStyle/>
+                    <a:p>
+                      <a:pPr>
+                        <a:defRPr sz="1050"/>
+                      </a:pPr>
+                      <a:r>
+                        <a:t>.+.</a:t>
+                      </a:r>
+                    </a:p>
+                  </a:txBody>
+                  <a:tcPr/>
+                </a:tc>
+                <a:tc>
+                  <a:txBody>
+                    <a:bodyPr/>
+                    <a:lstStyle/>
+                    <a:p>
+                      <a:pPr>
+                        <a:defRPr sz="1050"/>
+                      </a:pPr>
+                      <a:r>
+                        <a:t>Not Clinically Relevant</a:t>
+                      </a:r>
+                    </a:p>
+                  </a:txBody>
+                  <a:tcPr/>
+                </a:tc>
+              </a:tr>
+              <a:tr h="195960">
+                <a:tc>
+                  <a:txBody>
+                    <a:bodyPr/>
+                    <a:lstStyle/>
+                    <a:p>
+                      <a:pPr>
+                        <a:defRPr sz="1050"/>
+                      </a:pPr>
+                      <a:r>
+                        <a:t>brd-k51490254</a:t>
+                      </a:r>
+                    </a:p>
+                  </a:txBody>
+                  <a:tcPr/>
+                </a:tc>
+                <a:tc>
+                  <a:txBody>
+                    <a:bodyPr/>
+                    <a:lstStyle/>
+                    <a:p>
+                      <a:pPr>
+                        <a:defRPr sz="1050"/>
+                      </a:pPr>
+                      <a:r>
+                        <a:t>0.44</a:t>
+                      </a:r>
+                    </a:p>
+                  </a:txBody>
+                  <a:tcPr/>
+                </a:tc>
+                <a:tc>
+                  <a:txBody>
+                    <a:bodyPr/>
+                    <a:lstStyle/>
+                    <a:p>
+                      <a:pPr>
+                        <a:defRPr sz="1050"/>
+                      </a:pPr>
+                      <a:r>
+                        <a:t>.+.</a:t>
+                      </a:r>
+                    </a:p>
+                  </a:txBody>
+                  <a:tcPr/>
+                </a:tc>
+                <a:tc>
+                  <a:txBody>
+                    <a:bodyPr/>
+                    <a:lstStyle/>
+                    <a:p>
+                      <a:pPr>
+                        <a:defRPr sz="1050"/>
+                      </a:pPr>
+                      <a:r>
+                        <a:t>Not Clinically Relevant</a:t>
+                      </a:r>
+                    </a:p>
+                  </a:txBody>
+                  <a:tcPr/>
+                </a:tc>
+              </a:tr>
+            </a:tbl>
+          </a:graphicData>
+        </a:graphic>
+      </p:graphicFrame>
+    </p:spTree>
+  </p:cSld>
+  <p:clrMapOvr>
+    <a:masterClrMapping/>
+  </p:clrMapOvr>
+</p:sld>
+</file>
+
 <file path=ppt/slides/slide2.xml><?xml version="1.0" encoding="utf-8"?>
 <p:sld xmlns:a="http://schemas.openxmlformats.org/drawingml/2006/main" xmlns:p="http://schemas.openxmlformats.org/presentationml/2006/main" xmlns:r="http://schemas.openxmlformats.org/officeDocument/2006/relationships">
   <p:cSld>

</xml_diff>

<commit_message>
DiSCoVER rerun after implementing the cell line ranking output
</commit_message>
<xml_diff>
--- a/Notebooks/patients/DMB006/DMB006.mtb_slides.pptx
+++ b/Notebooks/patients/DMB006/DMB006.mtb_slides.pptx
@@ -18,6 +18,9 @@
     <p:sldId id="266" r:id="rId17"/>
     <p:sldId id="267" r:id="rId18"/>
     <p:sldId id="268" r:id="rId19"/>
+    <p:sldId id="269" r:id="rId20"/>
+    <p:sldId id="270" r:id="rId21"/>
+    <p:sldId id="271" r:id="rId22"/>
   </p:sldIdLst>
   <p:sldSz cx="9144000" cy="6858000" type="screen4x3"/>
   <p:notesSz cx="6858000" cy="9144000"/>
@@ -9973,6 +9976,4441 @@
 </p:sld>
 </file>
 
+<file path=ppt/slides/slide14.xml><?xml version="1.0" encoding="utf-8"?>
+<p:sld xmlns:a="http://schemas.openxmlformats.org/drawingml/2006/main" xmlns:p="http://schemas.openxmlformats.org/presentationml/2006/main" xmlns:r="http://schemas.openxmlformats.org/officeDocument/2006/relationships">
+  <p:cSld>
+    <p:spTree>
+      <p:nvGrpSpPr>
+        <p:cNvPr id="1" name=""/>
+        <p:cNvGrpSpPr/>
+        <p:nvPr/>
+      </p:nvGrpSpPr>
+      <p:grpSpPr/>
+      <p:sp>
+        <p:nvSpPr>
+          <p:cNvPr id="2" name="TextBox 1"/>
+          <p:cNvSpPr txBox="1"/>
+          <p:nvPr/>
+        </p:nvSpPr>
+        <p:spPr>
+          <a:xfrm>
+            <a:off x="0" y="0"/>
+            <a:ext cx="9144000" cy="685800"/>
+          </a:xfrm>
+          <a:prstGeom prst="rect">
+            <a:avLst/>
+          </a:prstGeom>
+          <a:noFill/>
+        </p:spPr>
+        <p:txBody>
+          <a:bodyPr wrap="none">
+            <a:spAutoFit/>
+          </a:bodyPr>
+          <a:lstStyle/>
+          <a:p/>
+          <a:p>
+            <a:pPr>
+              <a:defRPr sz="2600"/>
+            </a:pPr>
+            <a:r>
+              <a:t>DiSCoVER: top drugs (cerebellar stem cell control)</a:t>
+            </a:r>
+          </a:p>
+        </p:txBody>
+      </p:sp>
+      <p:graphicFrame>
+        <p:nvGraphicFramePr>
+          <p:cNvPr id="3" name="Table 2"/>
+          <p:cNvGraphicFramePr>
+            <a:graphicFrameLocks noGrp="1"/>
+          </p:cNvGraphicFramePr>
+          <p:nvPr/>
+        </p:nvGraphicFramePr>
+        <p:xfrm>
+          <a:off x="411480" y="777240"/>
+          <a:ext cx="8275320" cy="4114800"/>
+        </p:xfrm>
+        <a:graphic>
+          <a:graphicData uri="http://schemas.openxmlformats.org/drawingml/2006/table">
+            <a:tbl>
+              <a:tblPr firstRow="1" bandRow="1">
+                <a:tableStyleId>{5C22544A-7EE6-4342-B048-85BDC9FD1C3A}</a:tableStyleId>
+              </a:tblPr>
+              <a:tblGrid>
+                <a:gridCol w="1005840"/>
+                <a:gridCol w="731520"/>
+                <a:gridCol w="1051560"/>
+                <a:gridCol w="5486400"/>
+              </a:tblGrid>
+              <a:tr h="195942">
+                <a:tc>
+                  <a:txBody>
+                    <a:bodyPr/>
+                    <a:lstStyle/>
+                    <a:p>
+                      <a:r>
+                        <a:t>Drug</a:t>
+                      </a:r>
+                    </a:p>
+                  </a:txBody>
+                  <a:tcPr/>
+                </a:tc>
+                <a:tc>
+                  <a:txBody>
+                    <a:bodyPr/>
+                    <a:lstStyle/>
+                    <a:p>
+                      <a:r>
+                        <a:t>Score</a:t>
+                      </a:r>
+                    </a:p>
+                  </a:txBody>
+                  <a:tcPr/>
+                </a:tc>
+                <a:tc>
+                  <a:txBody>
+                    <a:bodyPr/>
+                    <a:lstStyle/>
+                    <a:p>
+                      <a:r>
+                        <a:t>Evidence</a:t>
+                      </a:r>
+                    </a:p>
+                  </a:txBody>
+                  <a:tcPr/>
+                </a:tc>
+                <a:tc>
+                  <a:txBody>
+                    <a:bodyPr/>
+                    <a:lstStyle/>
+                    <a:p>
+                      <a:r>
+                        <a:t>Mechanism of action</a:t>
+                      </a:r>
+                    </a:p>
+                  </a:txBody>
+                  <a:tcPr/>
+                </a:tc>
+              </a:tr>
+              <a:tr h="195942">
+                <a:tc>
+                  <a:txBody>
+                    <a:bodyPr/>
+                    <a:lstStyle/>
+                    <a:p>
+                      <a:pPr>
+                        <a:defRPr sz="1050"/>
+                      </a:pPr>
+                      <a:r>
+                        <a:t>tl-2-105</a:t>
+                      </a:r>
+                    </a:p>
+                  </a:txBody>
+                  <a:tcPr/>
+                </a:tc>
+                <a:tc>
+                  <a:txBody>
+                    <a:bodyPr/>
+                    <a:lstStyle/>
+                    <a:p>
+                      <a:pPr>
+                        <a:defRPr sz="1050"/>
+                      </a:pPr>
+                      <a:r>
+                        <a:t>0.69</a:t>
+                      </a:r>
+                    </a:p>
+                  </a:txBody>
+                  <a:tcPr/>
+                </a:tc>
+                <a:tc>
+                  <a:txBody>
+                    <a:bodyPr/>
+                    <a:lstStyle/>
+                    <a:p>
+                      <a:pPr>
+                        <a:defRPr sz="1050"/>
+                      </a:pPr>
+                      <a:r>
+                        <a:t>+..</a:t>
+                      </a:r>
+                    </a:p>
+                  </a:txBody>
+                  <a:tcPr/>
+                </a:tc>
+                <a:tc>
+                  <a:txBody>
+                    <a:bodyPr/>
+                    <a:lstStyle/>
+                    <a:p>
+                      <a:pPr>
+                        <a:defRPr sz="1050"/>
+                      </a:pPr>
+                      <a:r>
+                        <a:t>Not Clinically Relevant</a:t>
+                      </a:r>
+                    </a:p>
+                  </a:txBody>
+                  <a:tcPr/>
+                </a:tc>
+              </a:tr>
+              <a:tr h="195942">
+                <a:tc>
+                  <a:txBody>
+                    <a:bodyPr/>
+                    <a:lstStyle/>
+                    <a:p>
+                      <a:pPr>
+                        <a:defRPr sz="1050"/>
+                      </a:pPr>
+                      <a:r>
+                        <a:t>sb52334</a:t>
+                      </a:r>
+                    </a:p>
+                  </a:txBody>
+                  <a:tcPr/>
+                </a:tc>
+                <a:tc>
+                  <a:txBody>
+                    <a:bodyPr/>
+                    <a:lstStyle/>
+                    <a:p>
+                      <a:pPr>
+                        <a:defRPr sz="1050"/>
+                      </a:pPr>
+                      <a:r>
+                        <a:t>0.66</a:t>
+                      </a:r>
+                    </a:p>
+                  </a:txBody>
+                  <a:tcPr/>
+                </a:tc>
+                <a:tc>
+                  <a:txBody>
+                    <a:bodyPr/>
+                    <a:lstStyle/>
+                    <a:p>
+                      <a:pPr>
+                        <a:defRPr sz="1050"/>
+                      </a:pPr>
+                      <a:r>
+                        <a:t>+..</a:t>
+                      </a:r>
+                    </a:p>
+                  </a:txBody>
+                  <a:tcPr/>
+                </a:tc>
+                <a:tc>
+                  <a:txBody>
+                    <a:bodyPr/>
+                    <a:lstStyle/>
+                    <a:p>
+                      <a:pPr>
+                        <a:defRPr sz="1050"/>
+                      </a:pPr>
+                      <a:r>
+                        <a:t>Not Clinically Relevant</a:t>
+                      </a:r>
+                    </a:p>
+                  </a:txBody>
+                  <a:tcPr/>
+                </a:tc>
+              </a:tr>
+              <a:tr h="195942">
+                <a:tc>
+                  <a:txBody>
+                    <a:bodyPr/>
+                    <a:lstStyle/>
+                    <a:p>
+                      <a:pPr>
+                        <a:defRPr sz="1050"/>
+                      </a:pPr>
+                      <a:r>
+                        <a:t>gsk1070916</a:t>
+                      </a:r>
+                    </a:p>
+                  </a:txBody>
+                  <a:tcPr/>
+                </a:tc>
+                <a:tc>
+                  <a:txBody>
+                    <a:bodyPr/>
+                    <a:lstStyle/>
+                    <a:p>
+                      <a:pPr>
+                        <a:defRPr sz="1050"/>
+                      </a:pPr>
+                      <a:r>
+                        <a:t>0.63</a:t>
+                      </a:r>
+                    </a:p>
+                  </a:txBody>
+                  <a:tcPr/>
+                </a:tc>
+                <a:tc>
+                  <a:txBody>
+                    <a:bodyPr/>
+                    <a:lstStyle/>
+                    <a:p>
+                      <a:pPr>
+                        <a:defRPr sz="1050"/>
+                      </a:pPr>
+                      <a:r>
+                        <a:t>+..</a:t>
+                      </a:r>
+                    </a:p>
+                  </a:txBody>
+                  <a:tcPr/>
+                </a:tc>
+                <a:tc>
+                  <a:txBody>
+                    <a:bodyPr/>
+                    <a:lstStyle/>
+                    <a:p>
+                      <a:pPr>
+                        <a:defRPr sz="1050"/>
+                      </a:pPr>
+                      <a:r>
+                        <a:t>Not Clinically Relevant</a:t>
+                      </a:r>
+                    </a:p>
+                  </a:txBody>
+                  <a:tcPr/>
+                </a:tc>
+              </a:tr>
+              <a:tr h="195942">
+                <a:tc>
+                  <a:txBody>
+                    <a:bodyPr/>
+                    <a:lstStyle/>
+                    <a:p>
+                      <a:pPr>
+                        <a:defRPr sz="1050"/>
+                      </a:pPr>
+                      <a:r>
+                        <a:t>gw-2580</a:t>
+                      </a:r>
+                    </a:p>
+                  </a:txBody>
+                  <a:tcPr/>
+                </a:tc>
+                <a:tc>
+                  <a:txBody>
+                    <a:bodyPr/>
+                    <a:lstStyle/>
+                    <a:p>
+                      <a:pPr>
+                        <a:defRPr sz="1050"/>
+                      </a:pPr>
+                      <a:r>
+                        <a:t>0.62</a:t>
+                      </a:r>
+                    </a:p>
+                  </a:txBody>
+                  <a:tcPr/>
+                </a:tc>
+                <a:tc>
+                  <a:txBody>
+                    <a:bodyPr/>
+                    <a:lstStyle/>
+                    <a:p>
+                      <a:pPr>
+                        <a:defRPr sz="1050"/>
+                      </a:pPr>
+                      <a:r>
+                        <a:t>+..</a:t>
+                      </a:r>
+                    </a:p>
+                  </a:txBody>
+                  <a:tcPr/>
+                </a:tc>
+                <a:tc>
+                  <a:txBody>
+                    <a:bodyPr/>
+                    <a:lstStyle/>
+                    <a:p>
+                      <a:pPr>
+                        <a:defRPr sz="1050"/>
+                      </a:pPr>
+                      <a:r>
+                        <a:t>Not Clinically Relevant</a:t>
+                      </a:r>
+                    </a:p>
+                  </a:txBody>
+                  <a:tcPr/>
+                </a:tc>
+              </a:tr>
+              <a:tr h="195942">
+                <a:tc>
+                  <a:txBody>
+                    <a:bodyPr/>
+                    <a:lstStyle/>
+                    <a:p>
+                      <a:pPr>
+                        <a:defRPr sz="1050"/>
+                      </a:pPr>
+                      <a:r>
+                        <a:t>linsitinib</a:t>
+                      </a:r>
+                    </a:p>
+                  </a:txBody>
+                  <a:tcPr/>
+                </a:tc>
+                <a:tc>
+                  <a:txBody>
+                    <a:bodyPr/>
+                    <a:lstStyle/>
+                    <a:p>
+                      <a:pPr>
+                        <a:defRPr sz="1050"/>
+                      </a:pPr>
+                      <a:r>
+                        <a:t>0.58</a:t>
+                      </a:r>
+                    </a:p>
+                  </a:txBody>
+                  <a:tcPr/>
+                </a:tc>
+                <a:tc>
+                  <a:txBody>
+                    <a:bodyPr/>
+                    <a:lstStyle/>
+                    <a:p>
+                      <a:pPr>
+                        <a:defRPr sz="1050"/>
+                      </a:pPr>
+                      <a:r>
+                        <a:t>++.</a:t>
+                      </a:r>
+                    </a:p>
+                  </a:txBody>
+                  <a:tcPr/>
+                </a:tc>
+                <a:tc>
+                  <a:txBody>
+                    <a:bodyPr/>
+                    <a:lstStyle/>
+                    <a:p>
+                      <a:pPr>
+                        <a:defRPr sz="1050"/>
+                      </a:pPr>
+                      <a:r>
+                        <a:t>IGF-1R inhibitor</a:t>
+                      </a:r>
+                    </a:p>
+                  </a:txBody>
+                  <a:tcPr/>
+                </a:tc>
+              </a:tr>
+              <a:tr h="195942">
+                <a:tc>
+                  <a:txBody>
+                    <a:bodyPr/>
+                    <a:lstStyle/>
+                    <a:p>
+                      <a:pPr>
+                        <a:defRPr sz="1050"/>
+                      </a:pPr>
+                      <a:r>
+                        <a:t>vx-702</a:t>
+                      </a:r>
+                    </a:p>
+                  </a:txBody>
+                  <a:tcPr/>
+                </a:tc>
+                <a:tc>
+                  <a:txBody>
+                    <a:bodyPr/>
+                    <a:lstStyle/>
+                    <a:p>
+                      <a:pPr>
+                        <a:defRPr sz="1050"/>
+                      </a:pPr>
+                      <a:r>
+                        <a:t>0.57</a:t>
+                      </a:r>
+                    </a:p>
+                  </a:txBody>
+                  <a:tcPr/>
+                </a:tc>
+                <a:tc>
+                  <a:txBody>
+                    <a:bodyPr/>
+                    <a:lstStyle/>
+                    <a:p>
+                      <a:pPr>
+                        <a:defRPr sz="1050"/>
+                      </a:pPr>
+                      <a:r>
+                        <a:t>+..</a:t>
+                      </a:r>
+                    </a:p>
+                  </a:txBody>
+                  <a:tcPr/>
+                </a:tc>
+                <a:tc>
+                  <a:txBody>
+                    <a:bodyPr/>
+                    <a:lstStyle/>
+                    <a:p>
+                      <a:pPr>
+                        <a:defRPr sz="1050"/>
+                      </a:pPr>
+                      <a:r>
+                        <a:t>Not Clinically Relevant</a:t>
+                      </a:r>
+                    </a:p>
+                  </a:txBody>
+                  <a:tcPr/>
+                </a:tc>
+              </a:tr>
+              <a:tr h="195942">
+                <a:tc>
+                  <a:txBody>
+                    <a:bodyPr/>
+                    <a:lstStyle/>
+                    <a:p>
+                      <a:pPr>
+                        <a:defRPr sz="1050"/>
+                      </a:pPr>
+                      <a:r>
+                        <a:t>bx-912</a:t>
+                      </a:r>
+                    </a:p>
+                  </a:txBody>
+                  <a:tcPr/>
+                </a:tc>
+                <a:tc>
+                  <a:txBody>
+                    <a:bodyPr/>
+                    <a:lstStyle/>
+                    <a:p>
+                      <a:pPr>
+                        <a:defRPr sz="1050"/>
+                      </a:pPr>
+                      <a:r>
+                        <a:t>0.54</a:t>
+                      </a:r>
+                    </a:p>
+                  </a:txBody>
+                  <a:tcPr/>
+                </a:tc>
+                <a:tc>
+                  <a:txBody>
+                    <a:bodyPr/>
+                    <a:lstStyle/>
+                    <a:p>
+                      <a:pPr>
+                        <a:defRPr sz="1050"/>
+                      </a:pPr>
+                      <a:r>
+                        <a:t>+..</a:t>
+                      </a:r>
+                    </a:p>
+                  </a:txBody>
+                  <a:tcPr/>
+                </a:tc>
+                <a:tc>
+                  <a:txBody>
+                    <a:bodyPr/>
+                    <a:lstStyle/>
+                    <a:p>
+                      <a:pPr>
+                        <a:defRPr sz="1050"/>
+                      </a:pPr>
+                      <a:r>
+                        <a:t>Not Clinically Relevant</a:t>
+                      </a:r>
+                    </a:p>
+                  </a:txBody>
+                  <a:tcPr/>
+                </a:tc>
+              </a:tr>
+              <a:tr h="195942">
+                <a:tc>
+                  <a:txBody>
+                    <a:bodyPr/>
+                    <a:lstStyle/>
+                    <a:p>
+                      <a:pPr>
+                        <a:defRPr sz="1050"/>
+                      </a:pPr>
+                      <a:r>
+                        <a:t>tubastatin a</a:t>
+                      </a:r>
+                    </a:p>
+                  </a:txBody>
+                  <a:tcPr/>
+                </a:tc>
+                <a:tc>
+                  <a:txBody>
+                    <a:bodyPr/>
+                    <a:lstStyle/>
+                    <a:p>
+                      <a:pPr>
+                        <a:defRPr sz="1050"/>
+                      </a:pPr>
+                      <a:r>
+                        <a:t>0.54</a:t>
+                      </a:r>
+                    </a:p>
+                  </a:txBody>
+                  <a:tcPr/>
+                </a:tc>
+                <a:tc>
+                  <a:txBody>
+                    <a:bodyPr/>
+                    <a:lstStyle/>
+                    <a:p>
+                      <a:pPr>
+                        <a:defRPr sz="1050"/>
+                      </a:pPr>
+                      <a:r>
+                        <a:t>++.</a:t>
+                      </a:r>
+                    </a:p>
+                  </a:txBody>
+                  <a:tcPr/>
+                </a:tc>
+                <a:tc>
+                  <a:txBody>
+                    <a:bodyPr/>
+                    <a:lstStyle/>
+                    <a:p>
+                      <a:pPr>
+                        <a:defRPr sz="1050"/>
+                      </a:pPr>
+                      <a:r>
+                        <a:t>Not Clinically Relevant</a:t>
+                      </a:r>
+                    </a:p>
+                  </a:txBody>
+                  <a:tcPr/>
+                </a:tc>
+              </a:tr>
+              <a:tr h="195942">
+                <a:tc>
+                  <a:txBody>
+                    <a:bodyPr/>
+                    <a:lstStyle/>
+                    <a:p>
+                      <a:pPr>
+                        <a:defRPr sz="1050"/>
+                      </a:pPr>
+                      <a:r>
+                        <a:t>navitoclax</a:t>
+                      </a:r>
+                    </a:p>
+                  </a:txBody>
+                  <a:tcPr/>
+                </a:tc>
+                <a:tc>
+                  <a:txBody>
+                    <a:bodyPr/>
+                    <a:lstStyle/>
+                    <a:p>
+                      <a:pPr>
+                        <a:defRPr sz="1050"/>
+                      </a:pPr>
+                      <a:r>
+                        <a:t>0.51</a:t>
+                      </a:r>
+                    </a:p>
+                  </a:txBody>
+                  <a:tcPr/>
+                </a:tc>
+                <a:tc>
+                  <a:txBody>
+                    <a:bodyPr/>
+                    <a:lstStyle/>
+                    <a:p>
+                      <a:pPr>
+                        <a:defRPr sz="1050"/>
+                      </a:pPr>
+                      <a:r>
+                        <a:t>++.</a:t>
+                      </a:r>
+                    </a:p>
+                  </a:txBody>
+                  <a:tcPr/>
+                </a:tc>
+                <a:tc>
+                  <a:txBody>
+                    <a:bodyPr/>
+                    <a:lstStyle/>
+                    <a:p>
+                      <a:pPr>
+                        <a:defRPr sz="1050"/>
+                      </a:pPr>
+                      <a:r>
+                        <a:t>Bcl-2 family inhibitor: esp Bcl-xL, Bcl-2 and Bcl-w</a:t>
+                      </a:r>
+                    </a:p>
+                  </a:txBody>
+                  <a:tcPr/>
+                </a:tc>
+              </a:tr>
+              <a:tr h="195942">
+                <a:tc>
+                  <a:txBody>
+                    <a:bodyPr/>
+                    <a:lstStyle/>
+                    <a:p>
+                      <a:pPr>
+                        <a:defRPr sz="1050"/>
+                      </a:pPr>
+                      <a:r>
+                        <a:t>amuvatinib</a:t>
+                      </a:r>
+                    </a:p>
+                  </a:txBody>
+                  <a:tcPr/>
+                </a:tc>
+                <a:tc>
+                  <a:txBody>
+                    <a:bodyPr/>
+                    <a:lstStyle/>
+                    <a:p>
+                      <a:pPr>
+                        <a:defRPr sz="1050"/>
+                      </a:pPr>
+                      <a:r>
+                        <a:t>0.51</a:t>
+                      </a:r>
+                    </a:p>
+                  </a:txBody>
+                  <a:tcPr/>
+                </a:tc>
+                <a:tc>
+                  <a:txBody>
+                    <a:bodyPr/>
+                    <a:lstStyle/>
+                    <a:p>
+                      <a:pPr>
+                        <a:defRPr sz="1050"/>
+                      </a:pPr>
+                      <a:r>
+                        <a:t>+..</a:t>
+                      </a:r>
+                    </a:p>
+                  </a:txBody>
+                  <a:tcPr/>
+                </a:tc>
+                <a:tc>
+                  <a:txBody>
+                    <a:bodyPr/>
+                    <a:lstStyle/>
+                    <a:p>
+                      <a:pPr>
+                        <a:defRPr sz="1050"/>
+                      </a:pPr>
+                      <a:r>
+                        <a:t>Not Clinically Relevant</a:t>
+                      </a:r>
+                    </a:p>
+                  </a:txBody>
+                  <a:tcPr/>
+                </a:tc>
+              </a:tr>
+              <a:tr h="195942">
+                <a:tc>
+                  <a:txBody>
+                    <a:bodyPr/>
+                    <a:lstStyle/>
+                    <a:p>
+                      <a:pPr>
+                        <a:defRPr sz="1050"/>
+                      </a:pPr>
+                      <a:r>
+                        <a:t>rucaparib</a:t>
+                      </a:r>
+                    </a:p>
+                  </a:txBody>
+                  <a:tcPr/>
+                </a:tc>
+                <a:tc>
+                  <a:txBody>
+                    <a:bodyPr/>
+                    <a:lstStyle/>
+                    <a:p>
+                      <a:pPr>
+                        <a:defRPr sz="1050"/>
+                      </a:pPr>
+                      <a:r>
+                        <a:t>0.5</a:t>
+                      </a:r>
+                    </a:p>
+                  </a:txBody>
+                  <a:tcPr/>
+                </a:tc>
+                <a:tc>
+                  <a:txBody>
+                    <a:bodyPr/>
+                    <a:lstStyle/>
+                    <a:p>
+                      <a:pPr>
+                        <a:defRPr sz="1050"/>
+                      </a:pPr>
+                      <a:r>
+                        <a:t>+..</a:t>
+                      </a:r>
+                    </a:p>
+                  </a:txBody>
+                  <a:tcPr/>
+                </a:tc>
+                <a:tc>
+                  <a:txBody>
+                    <a:bodyPr/>
+                    <a:lstStyle/>
+                    <a:p>
+                      <a:pPr>
+                        <a:defRPr sz="1050"/>
+                      </a:pPr>
+                      <a:r>
+                        <a:t>PARP inhibitor, inhibits DNA repair</a:t>
+                      </a:r>
+                    </a:p>
+                  </a:txBody>
+                  <a:tcPr/>
+                </a:tc>
+              </a:tr>
+              <a:tr h="195942">
+                <a:tc>
+                  <a:txBody>
+                    <a:bodyPr/>
+                    <a:lstStyle/>
+                    <a:p>
+                      <a:pPr>
+                        <a:defRPr sz="1050"/>
+                      </a:pPr>
+                      <a:r>
+                        <a:t>avrainvillamide</a:t>
+                      </a:r>
+                    </a:p>
+                  </a:txBody>
+                  <a:tcPr/>
+                </a:tc>
+                <a:tc>
+                  <a:txBody>
+                    <a:bodyPr/>
+                    <a:lstStyle/>
+                    <a:p>
+                      <a:pPr>
+                        <a:defRPr sz="1050"/>
+                      </a:pPr>
+                      <a:r>
+                        <a:t>0.48</a:t>
+                      </a:r>
+                    </a:p>
+                  </a:txBody>
+                  <a:tcPr/>
+                </a:tc>
+                <a:tc>
+                  <a:txBody>
+                    <a:bodyPr/>
+                    <a:lstStyle/>
+                    <a:p>
+                      <a:pPr>
+                        <a:defRPr sz="1050"/>
+                      </a:pPr>
+                      <a:r>
+                        <a:t>.+.</a:t>
+                      </a:r>
+                    </a:p>
+                  </a:txBody>
+                  <a:tcPr/>
+                </a:tc>
+                <a:tc>
+                  <a:txBody>
+                    <a:bodyPr/>
+                    <a:lstStyle/>
+                    <a:p>
+                      <a:pPr>
+                        <a:defRPr sz="1050"/>
+                      </a:pPr>
+                      <a:r>
+                        <a:t>Not Clinically Relevant</a:t>
+                      </a:r>
+                    </a:p>
+                  </a:txBody>
+                  <a:tcPr/>
+                </a:tc>
+              </a:tr>
+              <a:tr h="195942">
+                <a:tc>
+                  <a:txBody>
+                    <a:bodyPr/>
+                    <a:lstStyle/>
+                    <a:p>
+                      <a:pPr>
+                        <a:defRPr sz="1050"/>
+                      </a:pPr>
+                      <a:r>
+                        <a:t>gsk319347a</a:t>
+                      </a:r>
+                    </a:p>
+                  </a:txBody>
+                  <a:tcPr/>
+                </a:tc>
+                <a:tc>
+                  <a:txBody>
+                    <a:bodyPr/>
+                    <a:lstStyle/>
+                    <a:p>
+                      <a:pPr>
+                        <a:defRPr sz="1050"/>
+                      </a:pPr>
+                      <a:r>
+                        <a:t>0.48</a:t>
+                      </a:r>
+                    </a:p>
+                  </a:txBody>
+                  <a:tcPr/>
+                </a:tc>
+                <a:tc>
+                  <a:txBody>
+                    <a:bodyPr/>
+                    <a:lstStyle/>
+                    <a:p>
+                      <a:pPr>
+                        <a:defRPr sz="1050"/>
+                      </a:pPr>
+                      <a:r>
+                        <a:t>+..</a:t>
+                      </a:r>
+                    </a:p>
+                  </a:txBody>
+                  <a:tcPr/>
+                </a:tc>
+                <a:tc>
+                  <a:txBody>
+                    <a:bodyPr/>
+                    <a:lstStyle/>
+                    <a:p>
+                      <a:pPr>
+                        <a:defRPr sz="1050"/>
+                      </a:pPr>
+                      <a:r>
+                        <a:t>Not Clinically Relevant</a:t>
+                      </a:r>
+                    </a:p>
+                  </a:txBody>
+                  <a:tcPr/>
+                </a:tc>
+              </a:tr>
+              <a:tr h="195942">
+                <a:tc>
+                  <a:txBody>
+                    <a:bodyPr/>
+                    <a:lstStyle/>
+                    <a:p>
+                      <a:pPr>
+                        <a:defRPr sz="1050"/>
+                      </a:pPr>
+                      <a:r>
+                        <a:t>nsc-87877</a:t>
+                      </a:r>
+                    </a:p>
+                  </a:txBody>
+                  <a:tcPr/>
+                </a:tc>
+                <a:tc>
+                  <a:txBody>
+                    <a:bodyPr/>
+                    <a:lstStyle/>
+                    <a:p>
+                      <a:pPr>
+                        <a:defRPr sz="1050"/>
+                      </a:pPr>
+                      <a:r>
+                        <a:t>0.47</a:t>
+                      </a:r>
+                    </a:p>
+                  </a:txBody>
+                  <a:tcPr/>
+                </a:tc>
+                <a:tc>
+                  <a:txBody>
+                    <a:bodyPr/>
+                    <a:lstStyle/>
+                    <a:p>
+                      <a:pPr>
+                        <a:defRPr sz="1050"/>
+                      </a:pPr>
+                      <a:r>
+                        <a:t>+..</a:t>
+                      </a:r>
+                    </a:p>
+                  </a:txBody>
+                  <a:tcPr/>
+                </a:tc>
+                <a:tc>
+                  <a:txBody>
+                    <a:bodyPr/>
+                    <a:lstStyle/>
+                    <a:p>
+                      <a:pPr>
+                        <a:defRPr sz="1050"/>
+                      </a:pPr>
+                      <a:r>
+                        <a:t>Not Clinically Relevant</a:t>
+                      </a:r>
+                    </a:p>
+                  </a:txBody>
+                  <a:tcPr/>
+                </a:tc>
+              </a:tr>
+              <a:tr h="195942">
+                <a:tc>
+                  <a:txBody>
+                    <a:bodyPr/>
+                    <a:lstStyle/>
+                    <a:p>
+                      <a:pPr>
+                        <a:defRPr sz="1050"/>
+                      </a:pPr>
+                      <a:r>
+                        <a:t>axitinib</a:t>
+                      </a:r>
+                    </a:p>
+                  </a:txBody>
+                  <a:tcPr/>
+                </a:tc>
+                <a:tc>
+                  <a:txBody>
+                    <a:bodyPr/>
+                    <a:lstStyle/>
+                    <a:p>
+                      <a:pPr>
+                        <a:defRPr sz="1050"/>
+                      </a:pPr>
+                      <a:r>
+                        <a:t>0.46</a:t>
+                      </a:r>
+                    </a:p>
+                  </a:txBody>
+                  <a:tcPr/>
+                </a:tc>
+                <a:tc>
+                  <a:txBody>
+                    <a:bodyPr/>
+                    <a:lstStyle/>
+                    <a:p>
+                      <a:pPr>
+                        <a:defRPr sz="1050"/>
+                      </a:pPr>
+                      <a:r>
+                        <a:t>++.</a:t>
+                      </a:r>
+                    </a:p>
+                  </a:txBody>
+                  <a:tcPr/>
+                </a:tc>
+                <a:tc>
+                  <a:txBody>
+                    <a:bodyPr/>
+                    <a:lstStyle/>
+                    <a:p>
+                      <a:pPr>
+                        <a:defRPr sz="1050"/>
+                      </a:pPr>
+                      <a:r>
+                        <a:t>VEGFR, c-KIT and PDGFR inhibitor</a:t>
+                      </a:r>
+                    </a:p>
+                  </a:txBody>
+                  <a:tcPr/>
+                </a:tc>
+              </a:tr>
+              <a:tr h="195942">
+                <a:tc>
+                  <a:txBody>
+                    <a:bodyPr/>
+                    <a:lstStyle/>
+                    <a:p>
+                      <a:pPr>
+                        <a:defRPr sz="1050"/>
+                      </a:pPr>
+                      <a:r>
+                        <a:t>xmd13-2</a:t>
+                      </a:r>
+                    </a:p>
+                  </a:txBody>
+                  <a:tcPr/>
+                </a:tc>
+                <a:tc>
+                  <a:txBody>
+                    <a:bodyPr/>
+                    <a:lstStyle/>
+                    <a:p>
+                      <a:pPr>
+                        <a:defRPr sz="1050"/>
+                      </a:pPr>
+                      <a:r>
+                        <a:t>0.46</a:t>
+                      </a:r>
+                    </a:p>
+                  </a:txBody>
+                  <a:tcPr/>
+                </a:tc>
+                <a:tc>
+                  <a:txBody>
+                    <a:bodyPr/>
+                    <a:lstStyle/>
+                    <a:p>
+                      <a:pPr>
+                        <a:defRPr sz="1050"/>
+                      </a:pPr>
+                      <a:r>
+                        <a:t>+..</a:t>
+                      </a:r>
+                    </a:p>
+                  </a:txBody>
+                  <a:tcPr/>
+                </a:tc>
+                <a:tc>
+                  <a:txBody>
+                    <a:bodyPr/>
+                    <a:lstStyle/>
+                    <a:p>
+                      <a:pPr>
+                        <a:defRPr sz="1050"/>
+                      </a:pPr>
+                      <a:r>
+                        <a:t>Not Clinically Relevant</a:t>
+                      </a:r>
+                    </a:p>
+                  </a:txBody>
+                  <a:tcPr/>
+                </a:tc>
+              </a:tr>
+              <a:tr h="195942">
+                <a:tc>
+                  <a:txBody>
+                    <a:bodyPr/>
+                    <a:lstStyle/>
+                    <a:p>
+                      <a:pPr>
+                        <a:defRPr sz="1050"/>
+                      </a:pPr>
+                      <a:r>
+                        <a:t>ml239</a:t>
+                      </a:r>
+                    </a:p>
+                  </a:txBody>
+                  <a:tcPr/>
+                </a:tc>
+                <a:tc>
+                  <a:txBody>
+                    <a:bodyPr/>
+                    <a:lstStyle/>
+                    <a:p>
+                      <a:pPr>
+                        <a:defRPr sz="1050"/>
+                      </a:pPr>
+                      <a:r>
+                        <a:t>0.44</a:t>
+                      </a:r>
+                    </a:p>
+                  </a:txBody>
+                  <a:tcPr/>
+                </a:tc>
+                <a:tc>
+                  <a:txBody>
+                    <a:bodyPr/>
+                    <a:lstStyle/>
+                    <a:p>
+                      <a:pPr>
+                        <a:defRPr sz="1050"/>
+                      </a:pPr>
+                      <a:r>
+                        <a:t>.+.</a:t>
+                      </a:r>
+                    </a:p>
+                  </a:txBody>
+                  <a:tcPr/>
+                </a:tc>
+                <a:tc>
+                  <a:txBody>
+                    <a:bodyPr/>
+                    <a:lstStyle/>
+                    <a:p>
+                      <a:pPr>
+                        <a:defRPr sz="1050"/>
+                      </a:pPr>
+                      <a:r>
+                        <a:t>Not Clinically Relevant</a:t>
+                      </a:r>
+                    </a:p>
+                  </a:txBody>
+                  <a:tcPr/>
+                </a:tc>
+              </a:tr>
+              <a:tr h="195942">
+                <a:tc>
+                  <a:txBody>
+                    <a:bodyPr/>
+                    <a:lstStyle/>
+                    <a:p>
+                      <a:pPr>
+                        <a:defRPr sz="1050"/>
+                      </a:pPr>
+                      <a:r>
+                        <a:t>abt-737</a:t>
+                      </a:r>
+                    </a:p>
+                  </a:txBody>
+                  <a:tcPr/>
+                </a:tc>
+                <a:tc>
+                  <a:txBody>
+                    <a:bodyPr/>
+                    <a:lstStyle/>
+                    <a:p>
+                      <a:pPr>
+                        <a:defRPr sz="1050"/>
+                      </a:pPr>
+                      <a:r>
+                        <a:t>0.44</a:t>
+                      </a:r>
+                    </a:p>
+                  </a:txBody>
+                  <a:tcPr/>
+                </a:tc>
+                <a:tc>
+                  <a:txBody>
+                    <a:bodyPr/>
+                    <a:lstStyle/>
+                    <a:p>
+                      <a:pPr>
+                        <a:defRPr sz="1050"/>
+                      </a:pPr>
+                      <a:r>
+                        <a:t>.+.</a:t>
+                      </a:r>
+                    </a:p>
+                  </a:txBody>
+                  <a:tcPr/>
+                </a:tc>
+                <a:tc>
+                  <a:txBody>
+                    <a:bodyPr/>
+                    <a:lstStyle/>
+                    <a:p>
+                      <a:pPr>
+                        <a:defRPr sz="1050"/>
+                      </a:pPr>
+                      <a:r>
+                        <a:t>Bcl-2/Bcl-xL inhibitor</a:t>
+                      </a:r>
+                    </a:p>
+                  </a:txBody>
+                  <a:tcPr/>
+                </a:tc>
+              </a:tr>
+              <a:tr h="195942">
+                <a:tc>
+                  <a:txBody>
+                    <a:bodyPr/>
+                    <a:lstStyle/>
+                    <a:p>
+                      <a:pPr>
+                        <a:defRPr sz="1050"/>
+                      </a:pPr>
+                      <a:r>
+                        <a:t>brd-k99006945</a:t>
+                      </a:r>
+                    </a:p>
+                  </a:txBody>
+                  <a:tcPr/>
+                </a:tc>
+                <a:tc>
+                  <a:txBody>
+                    <a:bodyPr/>
+                    <a:lstStyle/>
+                    <a:p>
+                      <a:pPr>
+                        <a:defRPr sz="1050"/>
+                      </a:pPr>
+                      <a:r>
+                        <a:t>0.44</a:t>
+                      </a:r>
+                    </a:p>
+                  </a:txBody>
+                  <a:tcPr/>
+                </a:tc>
+                <a:tc>
+                  <a:txBody>
+                    <a:bodyPr/>
+                    <a:lstStyle/>
+                    <a:p>
+                      <a:pPr>
+                        <a:defRPr sz="1050"/>
+                      </a:pPr>
+                      <a:r>
+                        <a:t>.+.</a:t>
+                      </a:r>
+                    </a:p>
+                  </a:txBody>
+                  <a:tcPr/>
+                </a:tc>
+                <a:tc>
+                  <a:txBody>
+                    <a:bodyPr/>
+                    <a:lstStyle/>
+                    <a:p>
+                      <a:pPr>
+                        <a:defRPr sz="1050"/>
+                      </a:pPr>
+                      <a:r>
+                        <a:t>Not Clinically Relevant</a:t>
+                      </a:r>
+                    </a:p>
+                  </a:txBody>
+                  <a:tcPr/>
+                </a:tc>
+              </a:tr>
+              <a:tr h="195960">
+                <a:tc>
+                  <a:txBody>
+                    <a:bodyPr/>
+                    <a:lstStyle/>
+                    <a:p>
+                      <a:pPr>
+                        <a:defRPr sz="1050"/>
+                      </a:pPr>
+                      <a:r>
+                        <a:t>brd-k51490254</a:t>
+                      </a:r>
+                    </a:p>
+                  </a:txBody>
+                  <a:tcPr/>
+                </a:tc>
+                <a:tc>
+                  <a:txBody>
+                    <a:bodyPr/>
+                    <a:lstStyle/>
+                    <a:p>
+                      <a:pPr>
+                        <a:defRPr sz="1050"/>
+                      </a:pPr>
+                      <a:r>
+                        <a:t>0.44</a:t>
+                      </a:r>
+                    </a:p>
+                  </a:txBody>
+                  <a:tcPr/>
+                </a:tc>
+                <a:tc>
+                  <a:txBody>
+                    <a:bodyPr/>
+                    <a:lstStyle/>
+                    <a:p>
+                      <a:pPr>
+                        <a:defRPr sz="1050"/>
+                      </a:pPr>
+                      <a:r>
+                        <a:t>.+.</a:t>
+                      </a:r>
+                    </a:p>
+                  </a:txBody>
+                  <a:tcPr/>
+                </a:tc>
+                <a:tc>
+                  <a:txBody>
+                    <a:bodyPr/>
+                    <a:lstStyle/>
+                    <a:p>
+                      <a:pPr>
+                        <a:defRPr sz="1050"/>
+                      </a:pPr>
+                      <a:r>
+                        <a:t>Not Clinically Relevant</a:t>
+                      </a:r>
+                    </a:p>
+                  </a:txBody>
+                  <a:tcPr/>
+                </a:tc>
+              </a:tr>
+            </a:tbl>
+          </a:graphicData>
+        </a:graphic>
+      </p:graphicFrame>
+    </p:spTree>
+  </p:cSld>
+  <p:clrMapOvr>
+    <a:masterClrMapping/>
+  </p:clrMapOvr>
+</p:sld>
+</file>
+
+<file path=ppt/slides/slide15.xml><?xml version="1.0" encoding="utf-8"?>
+<p:sld xmlns:a="http://schemas.openxmlformats.org/drawingml/2006/main" xmlns:p="http://schemas.openxmlformats.org/presentationml/2006/main" xmlns:r="http://schemas.openxmlformats.org/officeDocument/2006/relationships">
+  <p:cSld>
+    <p:spTree>
+      <p:nvGrpSpPr>
+        <p:cNvPr id="1" name=""/>
+        <p:cNvGrpSpPr/>
+        <p:nvPr/>
+      </p:nvGrpSpPr>
+      <p:grpSpPr/>
+      <p:sp>
+        <p:nvSpPr>
+          <p:cNvPr id="2" name="TextBox 1"/>
+          <p:cNvSpPr txBox="1"/>
+          <p:nvPr/>
+        </p:nvSpPr>
+        <p:spPr>
+          <a:xfrm>
+            <a:off x="0" y="0"/>
+            <a:ext cx="9144000" cy="685800"/>
+          </a:xfrm>
+          <a:prstGeom prst="rect">
+            <a:avLst/>
+          </a:prstGeom>
+          <a:noFill/>
+        </p:spPr>
+        <p:txBody>
+          <a:bodyPr wrap="none">
+            <a:spAutoFit/>
+          </a:bodyPr>
+          <a:lstStyle/>
+          <a:p/>
+          <a:p>
+            <a:pPr>
+              <a:defRPr sz="2600"/>
+            </a:pPr>
+            <a:r>
+              <a:t>CMap: top drugs (cerebellar stem cell control)</a:t>
+            </a:r>
+          </a:p>
+        </p:txBody>
+      </p:sp>
+      <p:graphicFrame>
+        <p:nvGraphicFramePr>
+          <p:cNvPr id="3" name="Table 2"/>
+          <p:cNvGraphicFramePr>
+            <a:graphicFrameLocks noGrp="1"/>
+          </p:cNvGraphicFramePr>
+          <p:nvPr/>
+        </p:nvGraphicFramePr>
+        <p:xfrm>
+          <a:off x="411480" y="777240"/>
+          <a:ext cx="8138160" cy="4114800"/>
+        </p:xfrm>
+        <a:graphic>
+          <a:graphicData uri="http://schemas.openxmlformats.org/drawingml/2006/table">
+            <a:tbl>
+              <a:tblPr firstRow="1" bandRow="1">
+                <a:tableStyleId>{5C22544A-7EE6-4342-B048-85BDC9FD1C3A}</a:tableStyleId>
+              </a:tblPr>
+              <a:tblGrid>
+                <a:gridCol w="1005840"/>
+                <a:gridCol w="731520"/>
+                <a:gridCol w="6400800"/>
+              </a:tblGrid>
+              <a:tr h="195942">
+                <a:tc>
+                  <a:txBody>
+                    <a:bodyPr/>
+                    <a:lstStyle/>
+                    <a:p>
+                      <a:r>
+                        <a:t>Drug</a:t>
+                      </a:r>
+                    </a:p>
+                  </a:txBody>
+                  <a:tcPr/>
+                </a:tc>
+                <a:tc>
+                  <a:txBody>
+                    <a:bodyPr/>
+                    <a:lstStyle/>
+                    <a:p>
+                      <a:r>
+                        <a:t>Score</a:t>
+                      </a:r>
+                    </a:p>
+                  </a:txBody>
+                  <a:tcPr/>
+                </a:tc>
+                <a:tc>
+                  <a:txBody>
+                    <a:bodyPr/>
+                    <a:lstStyle/>
+                    <a:p>
+                      <a:r>
+                        <a:t>Mechanism of action</a:t>
+                      </a:r>
+                    </a:p>
+                  </a:txBody>
+                  <a:tcPr/>
+                </a:tc>
+              </a:tr>
+              <a:tr h="195942">
+                <a:tc>
+                  <a:txBody>
+                    <a:bodyPr/>
+                    <a:lstStyle/>
+                    <a:p>
+                      <a:pPr>
+                        <a:defRPr sz="1050"/>
+                      </a:pPr>
+                      <a:r>
+                        <a:t>lenalidomide</a:t>
+                      </a:r>
+                    </a:p>
+                  </a:txBody>
+                  <a:tcPr/>
+                </a:tc>
+                <a:tc>
+                  <a:txBody>
+                    <a:bodyPr/>
+                    <a:lstStyle/>
+                    <a:p>
+                      <a:pPr>
+                        <a:defRPr sz="1050"/>
+                      </a:pPr>
+                      <a:r>
+                        <a:t>0.99</a:t>
+                      </a:r>
+                    </a:p>
+                  </a:txBody>
+                  <a:tcPr/>
+                </a:tc>
+                <a:tc>
+                  <a:txBody>
+                    <a:bodyPr/>
+                    <a:lstStyle/>
+                    <a:p>
+                      <a:pPr>
+                        <a:defRPr sz="1050"/>
+                      </a:pPr>
+                      <a:r>
+                        <a:t>derivative of thalidomide, which interacts with the ubiquitin E3 ligase cereblon, targeting this enzyme to degrade the Ikaros transcription factors IKZF1 and IKZF3. Used for multiple myeloma</a:t>
+                      </a:r>
+                    </a:p>
+                  </a:txBody>
+                  <a:tcPr/>
+                </a:tc>
+              </a:tr>
+              <a:tr h="195942">
+                <a:tc>
+                  <a:txBody>
+                    <a:bodyPr/>
+                    <a:lstStyle/>
+                    <a:p>
+                      <a:pPr>
+                        <a:defRPr sz="1050"/>
+                      </a:pPr>
+                      <a:r>
+                        <a:t>iobenguane</a:t>
+                      </a:r>
+                    </a:p>
+                  </a:txBody>
+                  <a:tcPr/>
+                </a:tc>
+                <a:tc>
+                  <a:txBody>
+                    <a:bodyPr/>
+                    <a:lstStyle/>
+                    <a:p>
+                      <a:pPr>
+                        <a:defRPr sz="1050"/>
+                      </a:pPr>
+                      <a:r>
+                        <a:t>0.99</a:t>
+                      </a:r>
+                    </a:p>
+                  </a:txBody>
+                  <a:tcPr/>
+                </a:tc>
+                <a:tc>
+                  <a:txBody>
+                    <a:bodyPr/>
+                    <a:lstStyle/>
+                    <a:p>
+                      <a:pPr>
+                        <a:defRPr sz="1050"/>
+                      </a:pPr>
+                      <a:r>
+                        <a:t>radiopharmaceutical, radiolabeled molecule similar to noradrenaline</a:t>
+                      </a:r>
+                    </a:p>
+                  </a:txBody>
+                  <a:tcPr/>
+                </a:tc>
+              </a:tr>
+              <a:tr h="195942">
+                <a:tc>
+                  <a:txBody>
+                    <a:bodyPr/>
+                    <a:lstStyle/>
+                    <a:p>
+                      <a:pPr>
+                        <a:defRPr sz="1050"/>
+                      </a:pPr>
+                      <a:r>
+                        <a:t>lapatinib</a:t>
+                      </a:r>
+                    </a:p>
+                  </a:txBody>
+                  <a:tcPr/>
+                </a:tc>
+                <a:tc>
+                  <a:txBody>
+                    <a:bodyPr/>
+                    <a:lstStyle/>
+                    <a:p>
+                      <a:pPr>
+                        <a:defRPr sz="1050"/>
+                      </a:pPr>
+                      <a:r>
+                        <a:t>0.98</a:t>
+                      </a:r>
+                    </a:p>
+                  </a:txBody>
+                  <a:tcPr/>
+                </a:tc>
+                <a:tc>
+                  <a:txBody>
+                    <a:bodyPr/>
+                    <a:lstStyle/>
+                    <a:p>
+                      <a:pPr>
+                        <a:defRPr sz="1050"/>
+                      </a:pPr>
+                      <a:r>
+                        <a:t>HER2/EGFR inhibitor</a:t>
+                      </a:r>
+                    </a:p>
+                  </a:txBody>
+                  <a:tcPr/>
+                </a:tc>
+              </a:tr>
+              <a:tr h="195942">
+                <a:tc>
+                  <a:txBody>
+                    <a:bodyPr/>
+                    <a:lstStyle/>
+                    <a:p>
+                      <a:pPr>
+                        <a:defRPr sz="1050"/>
+                      </a:pPr>
+                      <a:r>
+                        <a:t>sitagliptin</a:t>
+                      </a:r>
+                    </a:p>
+                  </a:txBody>
+                  <a:tcPr/>
+                </a:tc>
+                <a:tc>
+                  <a:txBody>
+                    <a:bodyPr/>
+                    <a:lstStyle/>
+                    <a:p>
+                      <a:pPr>
+                        <a:defRPr sz="1050"/>
+                      </a:pPr>
+                      <a:r>
+                        <a:t>0.97</a:t>
+                      </a:r>
+                    </a:p>
+                  </a:txBody>
+                  <a:tcPr/>
+                </a:tc>
+                <a:tc>
+                  <a:txBody>
+                    <a:bodyPr/>
+                    <a:lstStyle/>
+                    <a:p>
+                      <a:pPr>
+                        <a:defRPr sz="1050"/>
+                      </a:pPr>
+                      <a:r>
+                        <a:t>used for Treating type 2 diabetes, works by increasing the amount of insulin released by your body</a:t>
+                      </a:r>
+                    </a:p>
+                  </a:txBody>
+                  <a:tcPr/>
+                </a:tc>
+              </a:tr>
+              <a:tr h="195942">
+                <a:tc>
+                  <a:txBody>
+                    <a:bodyPr/>
+                    <a:lstStyle/>
+                    <a:p>
+                      <a:pPr>
+                        <a:defRPr sz="1050"/>
+                      </a:pPr>
+                      <a:r>
+                        <a:t>TG100-115</a:t>
+                      </a:r>
+                    </a:p>
+                  </a:txBody>
+                  <a:tcPr/>
+                </a:tc>
+                <a:tc>
+                  <a:txBody>
+                    <a:bodyPr/>
+                    <a:lstStyle/>
+                    <a:p>
+                      <a:pPr>
+                        <a:defRPr sz="1050"/>
+                      </a:pPr>
+                      <a:r>
+                        <a:t>0.96</a:t>
+                      </a:r>
+                    </a:p>
+                  </a:txBody>
+                  <a:tcPr/>
+                </a:tc>
+                <a:tc>
+                  <a:txBody>
+                    <a:bodyPr/>
+                    <a:lstStyle/>
+                    <a:p>
+                      <a:pPr>
+                        <a:defRPr sz="1050"/>
+                      </a:pPr>
+                      <a:r>
+                        <a:t>PI3Kγ/δ inhibitor</a:t>
+                      </a:r>
+                    </a:p>
+                  </a:txBody>
+                  <a:tcPr/>
+                </a:tc>
+              </a:tr>
+              <a:tr h="195942">
+                <a:tc>
+                  <a:txBody>
+                    <a:bodyPr/>
+                    <a:lstStyle/>
+                    <a:p>
+                      <a:pPr>
+                        <a:defRPr sz="1050"/>
+                      </a:pPr>
+                      <a:r>
+                        <a:t>hydrocortisone</a:t>
+                      </a:r>
+                    </a:p>
+                  </a:txBody>
+                  <a:tcPr/>
+                </a:tc>
+                <a:tc>
+                  <a:txBody>
+                    <a:bodyPr/>
+                    <a:lstStyle/>
+                    <a:p>
+                      <a:pPr>
+                        <a:defRPr sz="1050"/>
+                      </a:pPr>
+                      <a:r>
+                        <a:t>0.95</a:t>
+                      </a:r>
+                    </a:p>
+                  </a:txBody>
+                  <a:tcPr/>
+                </a:tc>
+                <a:tc>
+                  <a:txBody>
+                    <a:bodyPr/>
+                    <a:lstStyle/>
+                    <a:p>
+                      <a:pPr>
+                        <a:defRPr sz="1050"/>
+                      </a:pPr>
+                      <a:r>
+                        <a:t>Anti-inflammatory</a:t>
+                      </a:r>
+                    </a:p>
+                  </a:txBody>
+                  <a:tcPr/>
+                </a:tc>
+              </a:tr>
+              <a:tr h="195942">
+                <a:tc>
+                  <a:txBody>
+                    <a:bodyPr/>
+                    <a:lstStyle/>
+                    <a:p>
+                      <a:pPr>
+                        <a:defRPr sz="1050"/>
+                      </a:pPr>
+                      <a:r>
+                        <a:t>alisertib</a:t>
+                      </a:r>
+                    </a:p>
+                  </a:txBody>
+                  <a:tcPr/>
+                </a:tc>
+                <a:tc>
+                  <a:txBody>
+                    <a:bodyPr/>
+                    <a:lstStyle/>
+                    <a:p>
+                      <a:pPr>
+                        <a:defRPr sz="1050"/>
+                      </a:pPr>
+                      <a:r>
+                        <a:t>0.94</a:t>
+                      </a:r>
+                    </a:p>
+                  </a:txBody>
+                  <a:tcPr/>
+                </a:tc>
+                <a:tc>
+                  <a:txBody>
+                    <a:bodyPr/>
+                    <a:lstStyle/>
+                    <a:p>
+                      <a:pPr>
+                        <a:defRPr sz="1050"/>
+                      </a:pPr>
+                      <a:r>
+                        <a:t>Aurora A kinase inhibitor</a:t>
+                      </a:r>
+                    </a:p>
+                  </a:txBody>
+                  <a:tcPr/>
+                </a:tc>
+              </a:tr>
+              <a:tr h="195942">
+                <a:tc>
+                  <a:txBody>
+                    <a:bodyPr/>
+                    <a:lstStyle/>
+                    <a:p>
+                      <a:pPr>
+                        <a:defRPr sz="1050"/>
+                      </a:pPr>
+                      <a:r>
+                        <a:t>vinorelbine</a:t>
+                      </a:r>
+                    </a:p>
+                  </a:txBody>
+                  <a:tcPr/>
+                </a:tc>
+                <a:tc>
+                  <a:txBody>
+                    <a:bodyPr/>
+                    <a:lstStyle/>
+                    <a:p>
+                      <a:pPr>
+                        <a:defRPr sz="1050"/>
+                      </a:pPr>
+                      <a:r>
+                        <a:t>0.94</a:t>
+                      </a:r>
+                    </a:p>
+                  </a:txBody>
+                  <a:tcPr/>
+                </a:tc>
+                <a:tc>
+                  <a:txBody>
+                    <a:bodyPr/>
+                    <a:lstStyle/>
+                    <a:p>
+                      <a:pPr>
+                        <a:defRPr sz="1050"/>
+                      </a:pPr>
+                      <a:r>
+                        <a:t>disrupts microtubule dynamics; natural product</a:t>
+                      </a:r>
+                    </a:p>
+                  </a:txBody>
+                  <a:tcPr/>
+                </a:tc>
+              </a:tr>
+              <a:tr h="195942">
+                <a:tc>
+                  <a:txBody>
+                    <a:bodyPr/>
+                    <a:lstStyle/>
+                    <a:p>
+                      <a:pPr>
+                        <a:defRPr sz="1050"/>
+                      </a:pPr>
+                      <a:r>
+                        <a:t>tretinoin</a:t>
+                      </a:r>
+                    </a:p>
+                  </a:txBody>
+                  <a:tcPr/>
+                </a:tc>
+                <a:tc>
+                  <a:txBody>
+                    <a:bodyPr/>
+                    <a:lstStyle/>
+                    <a:p>
+                      <a:pPr>
+                        <a:defRPr sz="1050"/>
+                      </a:pPr>
+                      <a:r>
+                        <a:t>0.94</a:t>
+                      </a:r>
+                    </a:p>
+                  </a:txBody>
+                  <a:tcPr/>
+                </a:tc>
+                <a:tc>
+                  <a:txBody>
+                    <a:bodyPr/>
+                    <a:lstStyle/>
+                    <a:p>
+                      <a:pPr>
+                        <a:defRPr sz="1050"/>
+                      </a:pPr>
+                      <a:r>
+                        <a:t>Retinoid</a:t>
+                      </a:r>
+                    </a:p>
+                  </a:txBody>
+                  <a:tcPr/>
+                </a:tc>
+              </a:tr>
+              <a:tr h="195942">
+                <a:tc>
+                  <a:txBody>
+                    <a:bodyPr/>
+                    <a:lstStyle/>
+                    <a:p>
+                      <a:pPr>
+                        <a:defRPr sz="1050"/>
+                      </a:pPr>
+                      <a:r>
+                        <a:t>vincristine</a:t>
+                      </a:r>
+                    </a:p>
+                  </a:txBody>
+                  <a:tcPr/>
+                </a:tc>
+                <a:tc>
+                  <a:txBody>
+                    <a:bodyPr/>
+                    <a:lstStyle/>
+                    <a:p>
+                      <a:pPr>
+                        <a:defRPr sz="1050"/>
+                      </a:pPr>
+                      <a:r>
+                        <a:t>0.94</a:t>
+                      </a:r>
+                    </a:p>
+                  </a:txBody>
+                  <a:tcPr/>
+                </a:tc>
+                <a:tc>
+                  <a:txBody>
+                    <a:bodyPr/>
+                    <a:lstStyle/>
+                    <a:p>
+                      <a:pPr>
+                        <a:defRPr sz="1050"/>
+                      </a:pPr>
+                      <a:r>
+                        <a:t>binds tubulin, disrupts microtubule dynamics</a:t>
+                      </a:r>
+                    </a:p>
+                  </a:txBody>
+                  <a:tcPr/>
+                </a:tc>
+              </a:tr>
+              <a:tr h="195942">
+                <a:tc>
+                  <a:txBody>
+                    <a:bodyPr/>
+                    <a:lstStyle/>
+                    <a:p>
+                      <a:pPr>
+                        <a:defRPr sz="1050"/>
+                      </a:pPr>
+                      <a:r>
+                        <a:t>idarubicin</a:t>
+                      </a:r>
+                    </a:p>
+                  </a:txBody>
+                  <a:tcPr/>
+                </a:tc>
+                <a:tc>
+                  <a:txBody>
+                    <a:bodyPr/>
+                    <a:lstStyle/>
+                    <a:p>
+                      <a:pPr>
+                        <a:defRPr sz="1050"/>
+                      </a:pPr>
+                      <a:r>
+                        <a:t>0.93</a:t>
+                      </a:r>
+                    </a:p>
+                  </a:txBody>
+                  <a:tcPr/>
+                </a:tc>
+                <a:tc>
+                  <a:txBody>
+                    <a:bodyPr/>
+                    <a:lstStyle/>
+                    <a:p>
+                      <a:pPr>
+                        <a:defRPr sz="1050"/>
+                      </a:pPr>
+                      <a:r>
+                        <a:t>Topo II inhibitor, intercalates into DNA, anthracycline</a:t>
+                      </a:r>
+                    </a:p>
+                  </a:txBody>
+                  <a:tcPr/>
+                </a:tc>
+              </a:tr>
+              <a:tr h="195942">
+                <a:tc>
+                  <a:txBody>
+                    <a:bodyPr/>
+                    <a:lstStyle/>
+                    <a:p>
+                      <a:pPr>
+                        <a:defRPr sz="1050"/>
+                      </a:pPr>
+                      <a:r>
+                        <a:t>thiotepa</a:t>
+                      </a:r>
+                    </a:p>
+                  </a:txBody>
+                  <a:tcPr/>
+                </a:tc>
+                <a:tc>
+                  <a:txBody>
+                    <a:bodyPr/>
+                    <a:lstStyle/>
+                    <a:p>
+                      <a:pPr>
+                        <a:defRPr sz="1050"/>
+                      </a:pPr>
+                      <a:r>
+                        <a:t>0.93</a:t>
+                      </a:r>
+                    </a:p>
+                  </a:txBody>
+                  <a:tcPr/>
+                </a:tc>
+                <a:tc>
+                  <a:txBody>
+                    <a:bodyPr/>
+                    <a:lstStyle/>
+                    <a:p>
+                      <a:pPr>
+                        <a:defRPr sz="1050"/>
+                      </a:pPr>
+                      <a:r>
+                        <a:t>alkylating agent, ethylenimine family, causes crosslinks in DNA, which prevents DNA replication and DNA transcription</a:t>
+                      </a:r>
+                    </a:p>
+                  </a:txBody>
+                  <a:tcPr/>
+                </a:tc>
+              </a:tr>
+              <a:tr h="195942">
+                <a:tc>
+                  <a:txBody>
+                    <a:bodyPr/>
+                    <a:lstStyle/>
+                    <a:p>
+                      <a:pPr>
+                        <a:defRPr sz="1050"/>
+                      </a:pPr>
+                      <a:r>
+                        <a:t>mitotane</a:t>
+                      </a:r>
+                    </a:p>
+                  </a:txBody>
+                  <a:tcPr/>
+                </a:tc>
+                <a:tc>
+                  <a:txBody>
+                    <a:bodyPr/>
+                    <a:lstStyle/>
+                    <a:p>
+                      <a:pPr>
+                        <a:defRPr sz="1050"/>
+                      </a:pPr>
+                      <a:r>
+                        <a:t>0.91</a:t>
+                      </a:r>
+                    </a:p>
+                  </a:txBody>
+                  <a:tcPr/>
+                </a:tc>
+                <a:tc>
+                  <a:txBody>
+                    <a:bodyPr/>
+                    <a:lstStyle/>
+                    <a:p>
+                      <a:pPr>
+                        <a:defRPr sz="1050"/>
+                      </a:pPr>
+                      <a:r>
+                        <a:t>steroidogenesis inhibitor, cytostatic drug used in the treatment of adrenocortical carcinoma </a:t>
+                      </a:r>
+                    </a:p>
+                  </a:txBody>
+                  <a:tcPr/>
+                </a:tc>
+              </a:tr>
+              <a:tr h="195942">
+                <a:tc>
+                  <a:txBody>
+                    <a:bodyPr/>
+                    <a:lstStyle/>
+                    <a:p>
+                      <a:pPr>
+                        <a:defRPr sz="1050"/>
+                      </a:pPr>
+                      <a:r>
+                        <a:t>sorafenib</a:t>
+                      </a:r>
+                    </a:p>
+                  </a:txBody>
+                  <a:tcPr/>
+                </a:tc>
+                <a:tc>
+                  <a:txBody>
+                    <a:bodyPr/>
+                    <a:lstStyle/>
+                    <a:p>
+                      <a:pPr>
+                        <a:defRPr sz="1050"/>
+                      </a:pPr>
+                      <a:r>
+                        <a:t>0.91</a:t>
+                      </a:r>
+                    </a:p>
+                  </a:txBody>
+                  <a:tcPr/>
+                </a:tc>
+                <a:tc>
+                  <a:txBody>
+                    <a:bodyPr/>
+                    <a:lstStyle/>
+                    <a:p>
+                      <a:pPr>
+                        <a:defRPr sz="1050"/>
+                      </a:pPr>
+                      <a:r>
+                        <a:t>VEGFR, PDGFR and Raf (c-Raf) inhibitor</a:t>
+                      </a:r>
+                    </a:p>
+                  </a:txBody>
+                  <a:tcPr/>
+                </a:tc>
+              </a:tr>
+              <a:tr h="195942">
+                <a:tc>
+                  <a:txBody>
+                    <a:bodyPr/>
+                    <a:lstStyle/>
+                    <a:p>
+                      <a:pPr>
+                        <a:defRPr sz="1050"/>
+                      </a:pPr>
+                      <a:r>
+                        <a:t>GSK-461364</a:t>
+                      </a:r>
+                    </a:p>
+                  </a:txBody>
+                  <a:tcPr/>
+                </a:tc>
+                <a:tc>
+                  <a:txBody>
+                    <a:bodyPr/>
+                    <a:lstStyle/>
+                    <a:p>
+                      <a:pPr>
+                        <a:defRPr sz="1050"/>
+                      </a:pPr>
+                      <a:r>
+                        <a:t>0.91</a:t>
+                      </a:r>
+                    </a:p>
+                  </a:txBody>
+                  <a:tcPr/>
+                </a:tc>
+                <a:tc>
+                  <a:txBody>
+                    <a:bodyPr/>
+                    <a:lstStyle/>
+                    <a:p>
+                      <a:pPr>
+                        <a:defRPr sz="1050"/>
+                      </a:pPr>
+                      <a:r>
+                        <a:t>Plk1 inhibitor, less active against Plk2 and Plk3.</a:t>
+                      </a:r>
+                    </a:p>
+                  </a:txBody>
+                  <a:tcPr/>
+                </a:tc>
+              </a:tr>
+              <a:tr h="195942">
+                <a:tc>
+                  <a:txBody>
+                    <a:bodyPr/>
+                    <a:lstStyle/>
+                    <a:p>
+                      <a:pPr>
+                        <a:defRPr sz="1050"/>
+                      </a:pPr>
+                      <a:r>
+                        <a:t>cladribine</a:t>
+                      </a:r>
+                    </a:p>
+                  </a:txBody>
+                  <a:tcPr/>
+                </a:tc>
+                <a:tc>
+                  <a:txBody>
+                    <a:bodyPr/>
+                    <a:lstStyle/>
+                    <a:p>
+                      <a:pPr>
+                        <a:defRPr sz="1050"/>
+                      </a:pPr>
+                      <a:r>
+                        <a:t>0.9</a:t>
+                      </a:r>
+                    </a:p>
+                  </a:txBody>
+                  <a:tcPr/>
+                </a:tc>
+                <a:tc>
+                  <a:txBody>
+                    <a:bodyPr/>
+                    <a:lstStyle/>
+                    <a:p>
+                      <a:pPr>
+                        <a:defRPr sz="1050"/>
+                      </a:pPr>
+                      <a:r>
+                        <a:t>purine analog, inhibits adenosine deaminase, which interferes with DNA sythesis. Used for leukemia</a:t>
+                      </a:r>
+                    </a:p>
+                  </a:txBody>
+                  <a:tcPr/>
+                </a:tc>
+              </a:tr>
+              <a:tr h="195942">
+                <a:tc>
+                  <a:txBody>
+                    <a:bodyPr/>
+                    <a:lstStyle/>
+                    <a:p>
+                      <a:pPr>
+                        <a:defRPr sz="1050"/>
+                      </a:pPr>
+                      <a:r>
+                        <a:t>mercaptopurine</a:t>
+                      </a:r>
+                    </a:p>
+                  </a:txBody>
+                  <a:tcPr/>
+                </a:tc>
+                <a:tc>
+                  <a:txBody>
+                    <a:bodyPr/>
+                    <a:lstStyle/>
+                    <a:p>
+                      <a:pPr>
+                        <a:defRPr sz="1050"/>
+                      </a:pPr>
+                      <a:r>
+                        <a:t>0.87</a:t>
+                      </a:r>
+                    </a:p>
+                  </a:txBody>
+                  <a:tcPr/>
+                </a:tc>
+                <a:tc>
+                  <a:txBody>
+                    <a:bodyPr/>
+                    <a:lstStyle/>
+                    <a:p>
+                      <a:pPr>
+                        <a:defRPr sz="1050"/>
+                      </a:pPr>
+                      <a:r>
+                        <a:t>purine antagonist, competes with hypoxanthine and guanine for the enzyme HGPRT</a:t>
+                      </a:r>
+                    </a:p>
+                  </a:txBody>
+                  <a:tcPr/>
+                </a:tc>
+              </a:tr>
+              <a:tr h="195942">
+                <a:tc>
+                  <a:txBody>
+                    <a:bodyPr/>
+                    <a:lstStyle/>
+                    <a:p>
+                      <a:pPr>
+                        <a:defRPr sz="1050"/>
+                      </a:pPr>
+                      <a:r>
+                        <a:t>exemestane</a:t>
+                      </a:r>
+                    </a:p>
+                  </a:txBody>
+                  <a:tcPr/>
+                </a:tc>
+                <a:tc>
+                  <a:txBody>
+                    <a:bodyPr/>
+                    <a:lstStyle/>
+                    <a:p>
+                      <a:pPr>
+                        <a:defRPr sz="1050"/>
+                      </a:pPr>
+                      <a:r>
+                        <a:t>0.86</a:t>
+                      </a:r>
+                    </a:p>
+                  </a:txBody>
+                  <a:tcPr/>
+                </a:tc>
+                <a:tc>
+                  <a:txBody>
+                    <a:bodyPr/>
+                    <a:lstStyle/>
+                    <a:p>
+                      <a:pPr>
+                        <a:defRPr sz="1050"/>
+                      </a:pPr>
+                      <a:r>
+                        <a:t>aromatase inhibitor, blocks conversion of androgens to estrogens</a:t>
+                      </a:r>
+                    </a:p>
+                  </a:txBody>
+                  <a:tcPr/>
+                </a:tc>
+              </a:tr>
+              <a:tr h="195942">
+                <a:tc>
+                  <a:txBody>
+                    <a:bodyPr/>
+                    <a:lstStyle/>
+                    <a:p>
+                      <a:pPr>
+                        <a:defRPr sz="1050"/>
+                      </a:pPr>
+                      <a:r>
+                        <a:t>raltitrexed</a:t>
+                      </a:r>
+                    </a:p>
+                  </a:txBody>
+                  <a:tcPr/>
+                </a:tc>
+                <a:tc>
+                  <a:txBody>
+                    <a:bodyPr/>
+                    <a:lstStyle/>
+                    <a:p>
+                      <a:pPr>
+                        <a:defRPr sz="1050"/>
+                      </a:pPr>
+                      <a:r>
+                        <a:t>0.85</a:t>
+                      </a:r>
+                    </a:p>
+                  </a:txBody>
+                  <a:tcPr/>
+                </a:tc>
+                <a:tc>
+                  <a:txBody>
+                    <a:bodyPr/>
+                    <a:lstStyle/>
+                    <a:p>
+                      <a:pPr>
+                        <a:defRPr sz="1050"/>
+                      </a:pPr>
+                      <a:r>
+                        <a:t>antimetabolite,  inhibitor of thymidylate synthase</a:t>
+                      </a:r>
+                    </a:p>
+                  </a:txBody>
+                  <a:tcPr/>
+                </a:tc>
+              </a:tr>
+              <a:tr h="195960">
+                <a:tc>
+                  <a:txBody>
+                    <a:bodyPr/>
+                    <a:lstStyle/>
+                    <a:p>
+                      <a:pPr>
+                        <a:defRPr sz="1050"/>
+                      </a:pPr>
+                      <a:r>
+                        <a:t>barasertib</a:t>
+                      </a:r>
+                    </a:p>
+                  </a:txBody>
+                  <a:tcPr/>
+                </a:tc>
+                <a:tc>
+                  <a:txBody>
+                    <a:bodyPr/>
+                    <a:lstStyle/>
+                    <a:p>
+                      <a:pPr>
+                        <a:defRPr sz="1050"/>
+                      </a:pPr>
+                      <a:r>
+                        <a:t>0.83</a:t>
+                      </a:r>
+                    </a:p>
+                  </a:txBody>
+                  <a:tcPr/>
+                </a:tc>
+                <a:tc>
+                  <a:txBody>
+                    <a:bodyPr/>
+                    <a:lstStyle/>
+                    <a:p>
+                      <a:pPr>
+                        <a:defRPr sz="1050"/>
+                      </a:pPr>
+                      <a:r>
+                        <a:t>highly selective Aurora B kinase inhibitor</a:t>
+                      </a:r>
+                    </a:p>
+                  </a:txBody>
+                  <a:tcPr/>
+                </a:tc>
+              </a:tr>
+            </a:tbl>
+          </a:graphicData>
+        </a:graphic>
+      </p:graphicFrame>
+    </p:spTree>
+  </p:cSld>
+  <p:clrMapOvr>
+    <a:masterClrMapping/>
+  </p:clrMapOvr>
+</p:sld>
+</file>
+
+<file path=ppt/slides/slide16.xml><?xml version="1.0" encoding="utf-8"?>
+<p:sld xmlns:a="http://schemas.openxmlformats.org/drawingml/2006/main" xmlns:p="http://schemas.openxmlformats.org/presentationml/2006/main" xmlns:r="http://schemas.openxmlformats.org/officeDocument/2006/relationships">
+  <p:cSld>
+    <p:spTree>
+      <p:nvGrpSpPr>
+        <p:cNvPr id="1" name=""/>
+        <p:cNvGrpSpPr/>
+        <p:nvPr/>
+      </p:nvGrpSpPr>
+      <p:grpSpPr/>
+      <p:sp>
+        <p:nvSpPr>
+          <p:cNvPr id="2" name="TextBox 1"/>
+          <p:cNvSpPr txBox="1"/>
+          <p:nvPr/>
+        </p:nvSpPr>
+        <p:spPr>
+          <a:xfrm>
+            <a:off x="0" y="0"/>
+            <a:ext cx="9144000" cy="685800"/>
+          </a:xfrm>
+          <a:prstGeom prst="rect">
+            <a:avLst/>
+          </a:prstGeom>
+          <a:noFill/>
+        </p:spPr>
+        <p:txBody>
+          <a:bodyPr wrap="none">
+            <a:spAutoFit/>
+          </a:bodyPr>
+          <a:lstStyle/>
+          <a:p/>
+          <a:p>
+            <a:pPr>
+              <a:defRPr sz="2400"/>
+            </a:pPr>
+            <a:r>
+              <a:t>DiSCoVER ∩ CMap: top common drugs (cerebellar stem cell control)</a:t>
+            </a:r>
+          </a:p>
+        </p:txBody>
+      </p:sp>
+      <p:graphicFrame>
+        <p:nvGraphicFramePr>
+          <p:cNvPr id="3" name="Table 2"/>
+          <p:cNvGraphicFramePr>
+            <a:graphicFrameLocks noGrp="1"/>
+          </p:cNvGraphicFramePr>
+          <p:nvPr/>
+        </p:nvGraphicFramePr>
+        <p:xfrm>
+          <a:off x="411480" y="777240"/>
+          <a:ext cx="8503920" cy="4114800"/>
+        </p:xfrm>
+        <a:graphic>
+          <a:graphicData uri="http://schemas.openxmlformats.org/drawingml/2006/table">
+            <a:tbl>
+              <a:tblPr firstRow="1" bandRow="1">
+                <a:tableStyleId>{5C22544A-7EE6-4342-B048-85BDC9FD1C3A}</a:tableStyleId>
+              </a:tblPr>
+              <a:tblGrid>
+                <a:gridCol w="1005840"/>
+                <a:gridCol w="4114800"/>
+                <a:gridCol w="731520"/>
+                <a:gridCol w="1005840"/>
+                <a:gridCol w="914400"/>
+                <a:gridCol w="731520"/>
+              </a:tblGrid>
+              <a:tr h="195942">
+                <a:tc>
+                  <a:txBody>
+                    <a:bodyPr/>
+                    <a:lstStyle/>
+                    <a:p>
+                      <a:pPr>
+                        <a:defRPr sz="1100"/>
+                      </a:pPr>
+                      <a:r>
+                        <a:t>Drug</a:t>
+                      </a:r>
+                    </a:p>
+                  </a:txBody>
+                  <a:tcPr/>
+                </a:tc>
+                <a:tc>
+                  <a:txBody>
+                    <a:bodyPr/>
+                    <a:lstStyle/>
+                    <a:p>
+                      <a:pPr>
+                        <a:defRPr sz="1100"/>
+                      </a:pPr>
+                      <a:r>
+                        <a:t>Mechanism of action</a:t>
+                      </a:r>
+                    </a:p>
+                  </a:txBody>
+                  <a:tcPr/>
+                </a:tc>
+                <a:tc>
+                  <a:txBody>
+                    <a:bodyPr/>
+                    <a:lstStyle/>
+                    <a:p>
+                      <a:pPr>
+                        <a:defRPr sz="1100"/>
+                      </a:pPr>
+                      <a:r>
+                        <a:t>Evidence</a:t>
+                      </a:r>
+                    </a:p>
+                  </a:txBody>
+                  <a:tcPr/>
+                </a:tc>
+                <a:tc>
+                  <a:txBody>
+                    <a:bodyPr/>
+                    <a:lstStyle/>
+                    <a:p>
+                      <a:pPr>
+                        <a:defRPr sz="1100"/>
+                      </a:pPr>
+                      <a:r>
+                        <a:t>DiSCoVER Rank</a:t>
+                      </a:r>
+                    </a:p>
+                  </a:txBody>
+                  <a:tcPr/>
+                </a:tc>
+                <a:tc>
+                  <a:txBody>
+                    <a:bodyPr/>
+                    <a:lstStyle/>
+                    <a:p>
+                      <a:pPr>
+                        <a:defRPr sz="1100"/>
+                      </a:pPr>
+                      <a:r>
+                        <a:t>CMap Rank</a:t>
+                      </a:r>
+                    </a:p>
+                  </a:txBody>
+                  <a:tcPr/>
+                </a:tc>
+                <a:tc>
+                  <a:txBody>
+                    <a:bodyPr/>
+                    <a:lstStyle/>
+                    <a:p>
+                      <a:pPr>
+                        <a:defRPr sz="1100"/>
+                      </a:pPr>
+                      <a:r>
+                        <a:t>Average Rank</a:t>
+                      </a:r>
+                    </a:p>
+                  </a:txBody>
+                  <a:tcPr/>
+                </a:tc>
+              </a:tr>
+              <a:tr h="195942">
+                <a:tc>
+                  <a:txBody>
+                    <a:bodyPr/>
+                    <a:lstStyle/>
+                    <a:p>
+                      <a:pPr>
+                        <a:defRPr sz="1000"/>
+                      </a:pPr>
+                      <a:r>
+                        <a:t>tl-2-105</a:t>
+                      </a:r>
+                    </a:p>
+                  </a:txBody>
+                  <a:tcPr/>
+                </a:tc>
+                <a:tc>
+                  <a:txBody>
+                    <a:bodyPr/>
+                    <a:lstStyle/>
+                    <a:p>
+                      <a:pPr>
+                        <a:defRPr sz="1000"/>
+                      </a:pPr>
+                      <a:r>
+                        <a:t>Not Clinically Relevant</a:t>
+                      </a:r>
+                    </a:p>
+                  </a:txBody>
+                  <a:tcPr/>
+                </a:tc>
+                <a:tc>
+                  <a:txBody>
+                    <a:bodyPr/>
+                    <a:lstStyle/>
+                    <a:p>
+                      <a:pPr>
+                        <a:defRPr sz="1000"/>
+                      </a:pPr>
+                      <a:r>
+                        <a:t>+...</a:t>
+                      </a:r>
+                    </a:p>
+                  </a:txBody>
+                  <a:tcPr/>
+                </a:tc>
+                <a:tc>
+                  <a:txBody>
+                    <a:bodyPr/>
+                    <a:lstStyle/>
+                    <a:p>
+                      <a:pPr>
+                        <a:defRPr sz="1000"/>
+                      </a:pPr>
+                      <a:r>
+                        <a:t>1</a:t>
+                      </a:r>
+                    </a:p>
+                  </a:txBody>
+                  <a:tcPr/>
+                </a:tc>
+                <a:tc>
+                  <a:txBody>
+                    <a:bodyPr/>
+                    <a:lstStyle/>
+                    <a:p>
+                      <a:pPr>
+                        <a:defRPr sz="1000"/>
+                      </a:pPr>
+                      <a:r>
+                        <a:t>175</a:t>
+                      </a:r>
+                    </a:p>
+                  </a:txBody>
+                  <a:tcPr/>
+                </a:tc>
+                <a:tc>
+                  <a:txBody>
+                    <a:bodyPr/>
+                    <a:lstStyle/>
+                    <a:p>
+                      <a:pPr>
+                        <a:defRPr sz="1000"/>
+                      </a:pPr>
+                      <a:r>
+                        <a:t>1.0</a:t>
+                      </a:r>
+                    </a:p>
+                  </a:txBody>
+                  <a:tcPr/>
+                </a:tc>
+              </a:tr>
+              <a:tr h="195942">
+                <a:tc>
+                  <a:txBody>
+                    <a:bodyPr/>
+                    <a:lstStyle/>
+                    <a:p>
+                      <a:pPr>
+                        <a:defRPr sz="1000"/>
+                      </a:pPr>
+                      <a:r>
+                        <a:t>iobenguane</a:t>
+                      </a:r>
+                    </a:p>
+                  </a:txBody>
+                  <a:tcPr/>
+                </a:tc>
+                <a:tc>
+                  <a:txBody>
+                    <a:bodyPr/>
+                    <a:lstStyle/>
+                    <a:p>
+                      <a:pPr>
+                        <a:defRPr sz="1000"/>
+                      </a:pPr>
+                      <a:r>
+                        <a:t>radiopharmaceutical, radiolabeled molecule similar to noradrenaline</a:t>
+                      </a:r>
+                    </a:p>
+                  </a:txBody>
+                  <a:tcPr/>
+                </a:tc>
+                <a:tc>
+                  <a:txBody>
+                    <a:bodyPr/>
+                    <a:lstStyle/>
+                    <a:p>
+                      <a:pPr>
+                        <a:defRPr sz="1000"/>
+                      </a:pPr>
+                      <a:r>
+                        <a:t>...+</a:t>
+                      </a:r>
+                    </a:p>
+                  </a:txBody>
+                  <a:tcPr/>
+                </a:tc>
+                <a:tc>
+                  <a:txBody>
+                    <a:bodyPr/>
+                    <a:lstStyle/>
+                    <a:p>
+                      <a:pPr>
+                        <a:defRPr sz="1000"/>
+                      </a:pPr>
+                      <a:r>
+                        <a:t>673</a:t>
+                      </a:r>
+                    </a:p>
+                  </a:txBody>
+                  <a:tcPr/>
+                </a:tc>
+                <a:tc>
+                  <a:txBody>
+                    <a:bodyPr/>
+                    <a:lstStyle/>
+                    <a:p>
+                      <a:pPr>
+                        <a:defRPr sz="1000"/>
+                      </a:pPr>
+                      <a:r>
+                        <a:t>2</a:t>
+                      </a:r>
+                    </a:p>
+                  </a:txBody>
+                  <a:tcPr/>
+                </a:tc>
+                <a:tc>
+                  <a:txBody>
+                    <a:bodyPr/>
+                    <a:lstStyle/>
+                    <a:p>
+                      <a:pPr>
+                        <a:defRPr sz="1000"/>
+                      </a:pPr>
+                      <a:r>
+                        <a:t>2.0</a:t>
+                      </a:r>
+                    </a:p>
+                  </a:txBody>
+                  <a:tcPr/>
+                </a:tc>
+              </a:tr>
+              <a:tr h="195942">
+                <a:tc>
+                  <a:txBody>
+                    <a:bodyPr/>
+                    <a:lstStyle/>
+                    <a:p>
+                      <a:pPr>
+                        <a:defRPr sz="1000"/>
+                      </a:pPr>
+                      <a:r>
+                        <a:t>sb52334</a:t>
+                      </a:r>
+                    </a:p>
+                  </a:txBody>
+                  <a:tcPr/>
+                </a:tc>
+                <a:tc>
+                  <a:txBody>
+                    <a:bodyPr/>
+                    <a:lstStyle/>
+                    <a:p>
+                      <a:pPr>
+                        <a:defRPr sz="1000"/>
+                      </a:pPr>
+                      <a:r>
+                        <a:t>Not Clinically Relevant</a:t>
+                      </a:r>
+                    </a:p>
+                  </a:txBody>
+                  <a:tcPr/>
+                </a:tc>
+                <a:tc>
+                  <a:txBody>
+                    <a:bodyPr/>
+                    <a:lstStyle/>
+                    <a:p>
+                      <a:pPr>
+                        <a:defRPr sz="1000"/>
+                      </a:pPr>
+                      <a:r>
+                        <a:t>+...</a:t>
+                      </a:r>
+                    </a:p>
+                  </a:txBody>
+                  <a:tcPr/>
+                </a:tc>
+                <a:tc>
+                  <a:txBody>
+                    <a:bodyPr/>
+                    <a:lstStyle/>
+                    <a:p>
+                      <a:pPr>
+                        <a:defRPr sz="1000"/>
+                      </a:pPr>
+                      <a:r>
+                        <a:t>2</a:t>
+                      </a:r>
+                    </a:p>
+                  </a:txBody>
+                  <a:tcPr/>
+                </a:tc>
+                <a:tc>
+                  <a:txBody>
+                    <a:bodyPr/>
+                    <a:lstStyle/>
+                    <a:p>
+                      <a:pPr>
+                        <a:defRPr sz="1000"/>
+                      </a:pPr>
+                      <a:r>
+                        <a:t>176</a:t>
+                      </a:r>
+                    </a:p>
+                  </a:txBody>
+                  <a:tcPr/>
+                </a:tc>
+                <a:tc>
+                  <a:txBody>
+                    <a:bodyPr/>
+                    <a:lstStyle/>
+                    <a:p>
+                      <a:pPr>
+                        <a:defRPr sz="1000"/>
+                      </a:pPr>
+                      <a:r>
+                        <a:t>2.0</a:t>
+                      </a:r>
+                    </a:p>
+                  </a:txBody>
+                  <a:tcPr/>
+                </a:tc>
+              </a:tr>
+              <a:tr h="195942">
+                <a:tc>
+                  <a:txBody>
+                    <a:bodyPr/>
+                    <a:lstStyle/>
+                    <a:p>
+                      <a:pPr>
+                        <a:defRPr sz="1000"/>
+                      </a:pPr>
+                      <a:r>
+                        <a:t>gsk1070916</a:t>
+                      </a:r>
+                    </a:p>
+                  </a:txBody>
+                  <a:tcPr/>
+                </a:tc>
+                <a:tc>
+                  <a:txBody>
+                    <a:bodyPr/>
+                    <a:lstStyle/>
+                    <a:p>
+                      <a:pPr>
+                        <a:defRPr sz="1000"/>
+                      </a:pPr>
+                      <a:r>
+                        <a:t>Not Clinically Relevant</a:t>
+                      </a:r>
+                    </a:p>
+                  </a:txBody>
+                  <a:tcPr/>
+                </a:tc>
+                <a:tc>
+                  <a:txBody>
+                    <a:bodyPr/>
+                    <a:lstStyle/>
+                    <a:p>
+                      <a:pPr>
+                        <a:defRPr sz="1000"/>
+                      </a:pPr>
+                      <a:r>
+                        <a:t>+...</a:t>
+                      </a:r>
+                    </a:p>
+                  </a:txBody>
+                  <a:tcPr/>
+                </a:tc>
+                <a:tc>
+                  <a:txBody>
+                    <a:bodyPr/>
+                    <a:lstStyle/>
+                    <a:p>
+                      <a:pPr>
+                        <a:defRPr sz="1000"/>
+                      </a:pPr>
+                      <a:r>
+                        <a:t>3</a:t>
+                      </a:r>
+                    </a:p>
+                  </a:txBody>
+                  <a:tcPr/>
+                </a:tc>
+                <a:tc>
+                  <a:txBody>
+                    <a:bodyPr/>
+                    <a:lstStyle/>
+                    <a:p>
+                      <a:pPr>
+                        <a:defRPr sz="1000"/>
+                      </a:pPr>
+                      <a:r>
+                        <a:t>177</a:t>
+                      </a:r>
+                    </a:p>
+                  </a:txBody>
+                  <a:tcPr/>
+                </a:tc>
+                <a:tc>
+                  <a:txBody>
+                    <a:bodyPr/>
+                    <a:lstStyle/>
+                    <a:p>
+                      <a:pPr>
+                        <a:defRPr sz="1000"/>
+                      </a:pPr>
+                      <a:r>
+                        <a:t>3.0</a:t>
+                      </a:r>
+                    </a:p>
+                  </a:txBody>
+                  <a:tcPr/>
+                </a:tc>
+              </a:tr>
+              <a:tr h="195942">
+                <a:tc>
+                  <a:txBody>
+                    <a:bodyPr/>
+                    <a:lstStyle/>
+                    <a:p>
+                      <a:pPr>
+                        <a:defRPr sz="1000"/>
+                      </a:pPr>
+                      <a:r>
+                        <a:t>gw-2580</a:t>
+                      </a:r>
+                    </a:p>
+                  </a:txBody>
+                  <a:tcPr/>
+                </a:tc>
+                <a:tc>
+                  <a:txBody>
+                    <a:bodyPr/>
+                    <a:lstStyle/>
+                    <a:p>
+                      <a:pPr>
+                        <a:defRPr sz="1000"/>
+                      </a:pPr>
+                      <a:r>
+                        <a:t>Not Clinically Relevant</a:t>
+                      </a:r>
+                    </a:p>
+                  </a:txBody>
+                  <a:tcPr/>
+                </a:tc>
+                <a:tc>
+                  <a:txBody>
+                    <a:bodyPr/>
+                    <a:lstStyle/>
+                    <a:p>
+                      <a:pPr>
+                        <a:defRPr sz="1000"/>
+                      </a:pPr>
+                      <a:r>
+                        <a:t>+...</a:t>
+                      </a:r>
+                    </a:p>
+                  </a:txBody>
+                  <a:tcPr/>
+                </a:tc>
+                <a:tc>
+                  <a:txBody>
+                    <a:bodyPr/>
+                    <a:lstStyle/>
+                    <a:p>
+                      <a:pPr>
+                        <a:defRPr sz="1000"/>
+                      </a:pPr>
+                      <a:r>
+                        <a:t>4</a:t>
+                      </a:r>
+                    </a:p>
+                  </a:txBody>
+                  <a:tcPr/>
+                </a:tc>
+                <a:tc>
+                  <a:txBody>
+                    <a:bodyPr/>
+                    <a:lstStyle/>
+                    <a:p>
+                      <a:pPr>
+                        <a:defRPr sz="1000"/>
+                      </a:pPr>
+                      <a:r>
+                        <a:t>178</a:t>
+                      </a:r>
+                    </a:p>
+                  </a:txBody>
+                  <a:tcPr/>
+                </a:tc>
+                <a:tc>
+                  <a:txBody>
+                    <a:bodyPr/>
+                    <a:lstStyle/>
+                    <a:p>
+                      <a:pPr>
+                        <a:defRPr sz="1000"/>
+                      </a:pPr>
+                      <a:r>
+                        <a:t>4.0</a:t>
+                      </a:r>
+                    </a:p>
+                  </a:txBody>
+                  <a:tcPr/>
+                </a:tc>
+              </a:tr>
+              <a:tr h="195942">
+                <a:tc>
+                  <a:txBody>
+                    <a:bodyPr/>
+                    <a:lstStyle/>
+                    <a:p>
+                      <a:pPr>
+                        <a:defRPr sz="1000"/>
+                      </a:pPr>
+                      <a:r>
+                        <a:t>tg100-115</a:t>
+                      </a:r>
+                    </a:p>
+                  </a:txBody>
+                  <a:tcPr/>
+                </a:tc>
+                <a:tc>
+                  <a:txBody>
+                    <a:bodyPr/>
+                    <a:lstStyle/>
+                    <a:p>
+                      <a:pPr>
+                        <a:defRPr sz="1000"/>
+                      </a:pPr>
+                      <a:r>
+                        <a:t>PI3Kγ/δ inhibitor</a:t>
+                      </a:r>
+                    </a:p>
+                  </a:txBody>
+                  <a:tcPr/>
+                </a:tc>
+                <a:tc>
+                  <a:txBody>
+                    <a:bodyPr/>
+                    <a:lstStyle/>
+                    <a:p>
+                      <a:pPr>
+                        <a:defRPr sz="1000"/>
+                      </a:pPr>
+                      <a:r>
+                        <a:t>...+</a:t>
+                      </a:r>
+                    </a:p>
+                  </a:txBody>
+                  <a:tcPr/>
+                </a:tc>
+                <a:tc>
+                  <a:txBody>
+                    <a:bodyPr/>
+                    <a:lstStyle/>
+                    <a:p>
+                      <a:pPr>
+                        <a:defRPr sz="1000"/>
+                      </a:pPr>
+                      <a:r>
+                        <a:t>674</a:t>
+                      </a:r>
+                    </a:p>
+                  </a:txBody>
+                  <a:tcPr/>
+                </a:tc>
+                <a:tc>
+                  <a:txBody>
+                    <a:bodyPr/>
+                    <a:lstStyle/>
+                    <a:p>
+                      <a:pPr>
+                        <a:defRPr sz="1000"/>
+                      </a:pPr>
+                      <a:r>
+                        <a:t>4</a:t>
+                      </a:r>
+                    </a:p>
+                  </a:txBody>
+                  <a:tcPr/>
+                </a:tc>
+                <a:tc>
+                  <a:txBody>
+                    <a:bodyPr/>
+                    <a:lstStyle/>
+                    <a:p>
+                      <a:pPr>
+                        <a:defRPr sz="1000"/>
+                      </a:pPr>
+                      <a:r>
+                        <a:t>4.0</a:t>
+                      </a:r>
+                    </a:p>
+                  </a:txBody>
+                  <a:tcPr/>
+                </a:tc>
+              </a:tr>
+              <a:tr h="195942">
+                <a:tc>
+                  <a:txBody>
+                    <a:bodyPr/>
+                    <a:lstStyle/>
+                    <a:p>
+                      <a:pPr>
+                        <a:defRPr sz="1000"/>
+                      </a:pPr>
+                      <a:r>
+                        <a:t>thiotepa</a:t>
+                      </a:r>
+                    </a:p>
+                  </a:txBody>
+                  <a:tcPr/>
+                </a:tc>
+                <a:tc>
+                  <a:txBody>
+                    <a:bodyPr/>
+                    <a:lstStyle/>
+                    <a:p>
+                      <a:pPr>
+                        <a:defRPr sz="1000"/>
+                      </a:pPr>
+                      <a:r>
+                        <a:t>alkylating agent, ethylenimine family, causes crosslinks in DNA, which prevents DNA replication and DNA transcription</a:t>
+                      </a:r>
+                    </a:p>
+                  </a:txBody>
+                  <a:tcPr/>
+                </a:tc>
+                <a:tc>
+                  <a:txBody>
+                    <a:bodyPr/>
+                    <a:lstStyle/>
+                    <a:p>
+                      <a:pPr>
+                        <a:defRPr sz="1000"/>
+                      </a:pPr>
+                      <a:r>
+                        <a:t>...+</a:t>
+                      </a:r>
+                    </a:p>
+                  </a:txBody>
+                  <a:tcPr/>
+                </a:tc>
+                <a:tc>
+                  <a:txBody>
+                    <a:bodyPr/>
+                    <a:lstStyle/>
+                    <a:p>
+                      <a:pPr>
+                        <a:defRPr sz="1000"/>
+                      </a:pPr>
+                      <a:r>
+                        <a:t>677</a:t>
+                      </a:r>
+                    </a:p>
+                  </a:txBody>
+                  <a:tcPr/>
+                </a:tc>
+                <a:tc>
+                  <a:txBody>
+                    <a:bodyPr/>
+                    <a:lstStyle/>
+                    <a:p>
+                      <a:pPr>
+                        <a:defRPr sz="1000"/>
+                      </a:pPr>
+                      <a:r>
+                        <a:t>6</a:t>
+                      </a:r>
+                    </a:p>
+                  </a:txBody>
+                  <a:tcPr/>
+                </a:tc>
+                <a:tc>
+                  <a:txBody>
+                    <a:bodyPr/>
+                    <a:lstStyle/>
+                    <a:p>
+                      <a:pPr>
+                        <a:defRPr sz="1000"/>
+                      </a:pPr>
+                      <a:r>
+                        <a:t>6.0</a:t>
+                      </a:r>
+                    </a:p>
+                  </a:txBody>
+                  <a:tcPr/>
+                </a:tc>
+              </a:tr>
+              <a:tr h="195942">
+                <a:tc>
+                  <a:txBody>
+                    <a:bodyPr/>
+                    <a:lstStyle/>
+                    <a:p>
+                      <a:pPr>
+                        <a:defRPr sz="1000"/>
+                      </a:pPr>
+                      <a:r>
+                        <a:t>vx-702</a:t>
+                      </a:r>
+                    </a:p>
+                  </a:txBody>
+                  <a:tcPr/>
+                </a:tc>
+                <a:tc>
+                  <a:txBody>
+                    <a:bodyPr/>
+                    <a:lstStyle/>
+                    <a:p>
+                      <a:pPr>
+                        <a:defRPr sz="1000"/>
+                      </a:pPr>
+                      <a:r>
+                        <a:t>Not Clinically Relevant</a:t>
+                      </a:r>
+                    </a:p>
+                  </a:txBody>
+                  <a:tcPr/>
+                </a:tc>
+                <a:tc>
+                  <a:txBody>
+                    <a:bodyPr/>
+                    <a:lstStyle/>
+                    <a:p>
+                      <a:pPr>
+                        <a:defRPr sz="1000"/>
+                      </a:pPr>
+                      <a:r>
+                        <a:t>+...</a:t>
+                      </a:r>
+                    </a:p>
+                  </a:txBody>
+                  <a:tcPr/>
+                </a:tc>
+                <a:tc>
+                  <a:txBody>
+                    <a:bodyPr/>
+                    <a:lstStyle/>
+                    <a:p>
+                      <a:pPr>
+                        <a:defRPr sz="1000"/>
+                      </a:pPr>
+                      <a:r>
+                        <a:t>6</a:t>
+                      </a:r>
+                    </a:p>
+                  </a:txBody>
+                  <a:tcPr/>
+                </a:tc>
+                <a:tc>
+                  <a:txBody>
+                    <a:bodyPr/>
+                    <a:lstStyle/>
+                    <a:p>
+                      <a:pPr>
+                        <a:defRPr sz="1000"/>
+                      </a:pPr>
+                      <a:r>
+                        <a:t>179</a:t>
+                      </a:r>
+                    </a:p>
+                  </a:txBody>
+                  <a:tcPr/>
+                </a:tc>
+                <a:tc>
+                  <a:txBody>
+                    <a:bodyPr/>
+                    <a:lstStyle/>
+                    <a:p>
+                      <a:pPr>
+                        <a:defRPr sz="1000"/>
+                      </a:pPr>
+                      <a:r>
+                        <a:t>6.0</a:t>
+                      </a:r>
+                    </a:p>
+                  </a:txBody>
+                  <a:tcPr/>
+                </a:tc>
+              </a:tr>
+              <a:tr h="195942">
+                <a:tc>
+                  <a:txBody>
+                    <a:bodyPr/>
+                    <a:lstStyle/>
+                    <a:p>
+                      <a:pPr>
+                        <a:defRPr sz="1000"/>
+                      </a:pPr>
+                      <a:r>
+                        <a:t>mitotane</a:t>
+                      </a:r>
+                    </a:p>
+                  </a:txBody>
+                  <a:tcPr/>
+                </a:tc>
+                <a:tc>
+                  <a:txBody>
+                    <a:bodyPr/>
+                    <a:lstStyle/>
+                    <a:p>
+                      <a:pPr>
+                        <a:defRPr sz="1000"/>
+                      </a:pPr>
+                      <a:r>
+                        <a:t>steroidogenesis inhibitor, cytostatic drug used in the treatment of adrenocortical carcinoma </a:t>
+                      </a:r>
+                    </a:p>
+                  </a:txBody>
+                  <a:tcPr/>
+                </a:tc>
+                <a:tc>
+                  <a:txBody>
+                    <a:bodyPr/>
+                    <a:lstStyle/>
+                    <a:p>
+                      <a:pPr>
+                        <a:defRPr sz="1000"/>
+                      </a:pPr>
+                      <a:r>
+                        <a:t>...+</a:t>
+                      </a:r>
+                    </a:p>
+                  </a:txBody>
+                  <a:tcPr/>
+                </a:tc>
+                <a:tc>
+                  <a:txBody>
+                    <a:bodyPr/>
+                    <a:lstStyle/>
+                    <a:p>
+                      <a:pPr>
+                        <a:defRPr sz="1000"/>
+                      </a:pPr>
+                      <a:r>
+                        <a:t>678</a:t>
+                      </a:r>
+                    </a:p>
+                  </a:txBody>
+                  <a:tcPr/>
+                </a:tc>
+                <a:tc>
+                  <a:txBody>
+                    <a:bodyPr/>
+                    <a:lstStyle/>
+                    <a:p>
+                      <a:pPr>
+                        <a:defRPr sz="1000"/>
+                      </a:pPr>
+                      <a:r>
+                        <a:t>7</a:t>
+                      </a:r>
+                    </a:p>
+                  </a:txBody>
+                  <a:tcPr/>
+                </a:tc>
+                <a:tc>
+                  <a:txBody>
+                    <a:bodyPr/>
+                    <a:lstStyle/>
+                    <a:p>
+                      <a:pPr>
+                        <a:defRPr sz="1000"/>
+                      </a:pPr>
+                      <a:r>
+                        <a:t>7.0</a:t>
+                      </a:r>
+                    </a:p>
+                  </a:txBody>
+                  <a:tcPr/>
+                </a:tc>
+              </a:tr>
+              <a:tr h="195942">
+                <a:tc>
+                  <a:txBody>
+                    <a:bodyPr/>
+                    <a:lstStyle/>
+                    <a:p>
+                      <a:pPr>
+                        <a:defRPr sz="1000"/>
+                      </a:pPr>
+                      <a:r>
+                        <a:t>bx-912</a:t>
+                      </a:r>
+                    </a:p>
+                  </a:txBody>
+                  <a:tcPr/>
+                </a:tc>
+                <a:tc>
+                  <a:txBody>
+                    <a:bodyPr/>
+                    <a:lstStyle/>
+                    <a:p>
+                      <a:pPr>
+                        <a:defRPr sz="1000"/>
+                      </a:pPr>
+                      <a:r>
+                        <a:t>Not Clinically Relevant</a:t>
+                      </a:r>
+                    </a:p>
+                  </a:txBody>
+                  <a:tcPr/>
+                </a:tc>
+                <a:tc>
+                  <a:txBody>
+                    <a:bodyPr/>
+                    <a:lstStyle/>
+                    <a:p>
+                      <a:pPr>
+                        <a:defRPr sz="1000"/>
+                      </a:pPr>
+                      <a:r>
+                        <a:t>+...</a:t>
+                      </a:r>
+                    </a:p>
+                  </a:txBody>
+                  <a:tcPr/>
+                </a:tc>
+                <a:tc>
+                  <a:txBody>
+                    <a:bodyPr/>
+                    <a:lstStyle/>
+                    <a:p>
+                      <a:pPr>
+                        <a:defRPr sz="1000"/>
+                      </a:pPr>
+                      <a:r>
+                        <a:t>7</a:t>
+                      </a:r>
+                    </a:p>
+                  </a:txBody>
+                  <a:tcPr/>
+                </a:tc>
+                <a:tc>
+                  <a:txBody>
+                    <a:bodyPr/>
+                    <a:lstStyle/>
+                    <a:p>
+                      <a:pPr>
+                        <a:defRPr sz="1000"/>
+                      </a:pPr>
+                      <a:r>
+                        <a:t>180</a:t>
+                      </a:r>
+                    </a:p>
+                  </a:txBody>
+                  <a:tcPr/>
+                </a:tc>
+                <a:tc>
+                  <a:txBody>
+                    <a:bodyPr/>
+                    <a:lstStyle/>
+                    <a:p>
+                      <a:pPr>
+                        <a:defRPr sz="1000"/>
+                      </a:pPr>
+                      <a:r>
+                        <a:t>7.0</a:t>
+                      </a:r>
+                    </a:p>
+                  </a:txBody>
+                  <a:tcPr/>
+                </a:tc>
+              </a:tr>
+              <a:tr h="195942">
+                <a:tc>
+                  <a:txBody>
+                    <a:bodyPr/>
+                    <a:lstStyle/>
+                    <a:p>
+                      <a:pPr>
+                        <a:defRPr sz="1000"/>
+                      </a:pPr>
+                      <a:r>
+                        <a:t>gsk-461364</a:t>
+                      </a:r>
+                    </a:p>
+                  </a:txBody>
+                  <a:tcPr/>
+                </a:tc>
+                <a:tc>
+                  <a:txBody>
+                    <a:bodyPr/>
+                    <a:lstStyle/>
+                    <a:p>
+                      <a:pPr>
+                        <a:defRPr sz="1000"/>
+                      </a:pPr>
+                      <a:r>
+                        <a:t>Plk1 inhibitor, less active against Plk2 and Plk3.</a:t>
+                      </a:r>
+                    </a:p>
+                  </a:txBody>
+                  <a:tcPr/>
+                </a:tc>
+                <a:tc>
+                  <a:txBody>
+                    <a:bodyPr/>
+                    <a:lstStyle/>
+                    <a:p>
+                      <a:pPr>
+                        <a:defRPr sz="1000"/>
+                      </a:pPr>
+                      <a:r>
+                        <a:t>...+</a:t>
+                      </a:r>
+                    </a:p>
+                  </a:txBody>
+                  <a:tcPr/>
+                </a:tc>
+                <a:tc>
+                  <a:txBody>
+                    <a:bodyPr/>
+                    <a:lstStyle/>
+                    <a:p>
+                      <a:pPr>
+                        <a:defRPr sz="1000"/>
+                      </a:pPr>
+                      <a:r>
+                        <a:t>679</a:t>
+                      </a:r>
+                    </a:p>
+                  </a:txBody>
+                  <a:tcPr/>
+                </a:tc>
+                <a:tc>
+                  <a:txBody>
+                    <a:bodyPr/>
+                    <a:lstStyle/>
+                    <a:p>
+                      <a:pPr>
+                        <a:defRPr sz="1000"/>
+                      </a:pPr>
+                      <a:r>
+                        <a:t>8</a:t>
+                      </a:r>
+                    </a:p>
+                  </a:txBody>
+                  <a:tcPr/>
+                </a:tc>
+                <a:tc>
+                  <a:txBody>
+                    <a:bodyPr/>
+                    <a:lstStyle/>
+                    <a:p>
+                      <a:pPr>
+                        <a:defRPr sz="1000"/>
+                      </a:pPr>
+                      <a:r>
+                        <a:t>8.0</a:t>
+                      </a:r>
+                    </a:p>
+                  </a:txBody>
+                  <a:tcPr/>
+                </a:tc>
+              </a:tr>
+              <a:tr h="195942">
+                <a:tc>
+                  <a:txBody>
+                    <a:bodyPr/>
+                    <a:lstStyle/>
+                    <a:p>
+                      <a:pPr>
+                        <a:defRPr sz="1000"/>
+                      </a:pPr>
+                      <a:r>
+                        <a:t>tubastatin a</a:t>
+                      </a:r>
+                    </a:p>
+                  </a:txBody>
+                  <a:tcPr/>
+                </a:tc>
+                <a:tc>
+                  <a:txBody>
+                    <a:bodyPr/>
+                    <a:lstStyle/>
+                    <a:p>
+                      <a:pPr>
+                        <a:defRPr sz="1000"/>
+                      </a:pPr>
+                      <a:r>
+                        <a:t>Not Clinically Relevant</a:t>
+                      </a:r>
+                    </a:p>
+                  </a:txBody>
+                  <a:tcPr/>
+                </a:tc>
+                <a:tc>
+                  <a:txBody>
+                    <a:bodyPr/>
+                    <a:lstStyle/>
+                    <a:p>
+                      <a:pPr>
+                        <a:defRPr sz="1000"/>
+                      </a:pPr>
+                      <a:r>
+                        <a:t>++..</a:t>
+                      </a:r>
+                    </a:p>
+                  </a:txBody>
+                  <a:tcPr/>
+                </a:tc>
+                <a:tc>
+                  <a:txBody>
+                    <a:bodyPr/>
+                    <a:lstStyle/>
+                    <a:p>
+                      <a:pPr>
+                        <a:defRPr sz="1000"/>
+                      </a:pPr>
+                      <a:r>
+                        <a:t>8</a:t>
+                      </a:r>
+                    </a:p>
+                  </a:txBody>
+                  <a:tcPr/>
+                </a:tc>
+                <a:tc>
+                  <a:txBody>
+                    <a:bodyPr/>
+                    <a:lstStyle/>
+                    <a:p>
+                      <a:pPr>
+                        <a:defRPr sz="1000"/>
+                      </a:pPr>
+                      <a:r>
+                        <a:t>181</a:t>
+                      </a:r>
+                    </a:p>
+                  </a:txBody>
+                  <a:tcPr/>
+                </a:tc>
+                <a:tc>
+                  <a:txBody>
+                    <a:bodyPr/>
+                    <a:lstStyle/>
+                    <a:p>
+                      <a:pPr>
+                        <a:defRPr sz="1000"/>
+                      </a:pPr>
+                      <a:r>
+                        <a:t>8.0</a:t>
+                      </a:r>
+                    </a:p>
+                  </a:txBody>
+                  <a:tcPr/>
+                </a:tc>
+              </a:tr>
+              <a:tr h="195942">
+                <a:tc>
+                  <a:txBody>
+                    <a:bodyPr/>
+                    <a:lstStyle/>
+                    <a:p>
+                      <a:pPr>
+                        <a:defRPr sz="1000"/>
+                      </a:pPr>
+                      <a:r>
+                        <a:t>cladribine</a:t>
+                      </a:r>
+                    </a:p>
+                  </a:txBody>
+                  <a:tcPr/>
+                </a:tc>
+                <a:tc>
+                  <a:txBody>
+                    <a:bodyPr/>
+                    <a:lstStyle/>
+                    <a:p>
+                      <a:pPr>
+                        <a:defRPr sz="1000"/>
+                      </a:pPr>
+                      <a:r>
+                        <a:t>purine analog, inhibits adenosine deaminase, which interferes with DNA sythesis. Used for leukemia</a:t>
+                      </a:r>
+                    </a:p>
+                  </a:txBody>
+                  <a:tcPr/>
+                </a:tc>
+                <a:tc>
+                  <a:txBody>
+                    <a:bodyPr/>
+                    <a:lstStyle/>
+                    <a:p>
+                      <a:pPr>
+                        <a:defRPr sz="1000"/>
+                      </a:pPr>
+                      <a:r>
+                        <a:t>...+</a:t>
+                      </a:r>
+                    </a:p>
+                  </a:txBody>
+                  <a:tcPr/>
+                </a:tc>
+                <a:tc>
+                  <a:txBody>
+                    <a:bodyPr/>
+                    <a:lstStyle/>
+                    <a:p>
+                      <a:pPr>
+                        <a:defRPr sz="1000"/>
+                      </a:pPr>
+                      <a:r>
+                        <a:t>680</a:t>
+                      </a:r>
+                    </a:p>
+                  </a:txBody>
+                  <a:tcPr/>
+                </a:tc>
+                <a:tc>
+                  <a:txBody>
+                    <a:bodyPr/>
+                    <a:lstStyle/>
+                    <a:p>
+                      <a:pPr>
+                        <a:defRPr sz="1000"/>
+                      </a:pPr>
+                      <a:r>
+                        <a:t>9</a:t>
+                      </a:r>
+                    </a:p>
+                  </a:txBody>
+                  <a:tcPr/>
+                </a:tc>
+                <a:tc>
+                  <a:txBody>
+                    <a:bodyPr/>
+                    <a:lstStyle/>
+                    <a:p>
+                      <a:pPr>
+                        <a:defRPr sz="1000"/>
+                      </a:pPr>
+                      <a:r>
+                        <a:t>9.0</a:t>
+                      </a:r>
+                    </a:p>
+                  </a:txBody>
+                  <a:tcPr/>
+                </a:tc>
+              </a:tr>
+              <a:tr h="195942">
+                <a:tc>
+                  <a:txBody>
+                    <a:bodyPr/>
+                    <a:lstStyle/>
+                    <a:p>
+                      <a:pPr>
+                        <a:defRPr sz="1000"/>
+                      </a:pPr>
+                      <a:r>
+                        <a:t>mercaptopurine</a:t>
+                      </a:r>
+                    </a:p>
+                  </a:txBody>
+                  <a:tcPr/>
+                </a:tc>
+                <a:tc>
+                  <a:txBody>
+                    <a:bodyPr/>
+                    <a:lstStyle/>
+                    <a:p>
+                      <a:pPr>
+                        <a:defRPr sz="1000"/>
+                      </a:pPr>
+                      <a:r>
+                        <a:t>purine antagonist, competes with hypoxanthine and guanine for the enzyme HGPRT</a:t>
+                      </a:r>
+                    </a:p>
+                  </a:txBody>
+                  <a:tcPr/>
+                </a:tc>
+                <a:tc>
+                  <a:txBody>
+                    <a:bodyPr/>
+                    <a:lstStyle/>
+                    <a:p>
+                      <a:pPr>
+                        <a:defRPr sz="1000"/>
+                      </a:pPr>
+                      <a:r>
+                        <a:t>...+</a:t>
+                      </a:r>
+                    </a:p>
+                  </a:txBody>
+                  <a:tcPr/>
+                </a:tc>
+                <a:tc>
+                  <a:txBody>
+                    <a:bodyPr/>
+                    <a:lstStyle/>
+                    <a:p>
+                      <a:pPr>
+                        <a:defRPr sz="1000"/>
+                      </a:pPr>
+                      <a:r>
+                        <a:t>681</a:t>
+                      </a:r>
+                    </a:p>
+                  </a:txBody>
+                  <a:tcPr/>
+                </a:tc>
+                <a:tc>
+                  <a:txBody>
+                    <a:bodyPr/>
+                    <a:lstStyle/>
+                    <a:p>
+                      <a:pPr>
+                        <a:defRPr sz="1000"/>
+                      </a:pPr>
+                      <a:r>
+                        <a:t>10</a:t>
+                      </a:r>
+                    </a:p>
+                  </a:txBody>
+                  <a:tcPr/>
+                </a:tc>
+                <a:tc>
+                  <a:txBody>
+                    <a:bodyPr/>
+                    <a:lstStyle/>
+                    <a:p>
+                      <a:pPr>
+                        <a:defRPr sz="1000"/>
+                      </a:pPr>
+                      <a:r>
+                        <a:t>10.0</a:t>
+                      </a:r>
+                    </a:p>
+                  </a:txBody>
+                  <a:tcPr/>
+                </a:tc>
+              </a:tr>
+              <a:tr h="195942">
+                <a:tc>
+                  <a:txBody>
+                    <a:bodyPr/>
+                    <a:lstStyle/>
+                    <a:p>
+                      <a:pPr>
+                        <a:defRPr sz="1000"/>
+                      </a:pPr>
+                      <a:r>
+                        <a:t>amuvatinib</a:t>
+                      </a:r>
+                    </a:p>
+                  </a:txBody>
+                  <a:tcPr/>
+                </a:tc>
+                <a:tc>
+                  <a:txBody>
+                    <a:bodyPr/>
+                    <a:lstStyle/>
+                    <a:p>
+                      <a:pPr>
+                        <a:defRPr sz="1000"/>
+                      </a:pPr>
+                      <a:r>
+                        <a:t>Not Clinically Relevant</a:t>
+                      </a:r>
+                    </a:p>
+                  </a:txBody>
+                  <a:tcPr/>
+                </a:tc>
+                <a:tc>
+                  <a:txBody>
+                    <a:bodyPr/>
+                    <a:lstStyle/>
+                    <a:p>
+                      <a:pPr>
+                        <a:defRPr sz="1000"/>
+                      </a:pPr>
+                      <a:r>
+                        <a:t>+...</a:t>
+                      </a:r>
+                    </a:p>
+                  </a:txBody>
+                  <a:tcPr/>
+                </a:tc>
+                <a:tc>
+                  <a:txBody>
+                    <a:bodyPr/>
+                    <a:lstStyle/>
+                    <a:p>
+                      <a:pPr>
+                        <a:defRPr sz="1000"/>
+                      </a:pPr>
+                      <a:r>
+                        <a:t>10</a:t>
+                      </a:r>
+                    </a:p>
+                  </a:txBody>
+                  <a:tcPr/>
+                </a:tc>
+                <a:tc>
+                  <a:txBody>
+                    <a:bodyPr/>
+                    <a:lstStyle/>
+                    <a:p>
+                      <a:pPr>
+                        <a:defRPr sz="1000"/>
+                      </a:pPr>
+                      <a:r>
+                        <a:t>182</a:t>
+                      </a:r>
+                    </a:p>
+                  </a:txBody>
+                  <a:tcPr/>
+                </a:tc>
+                <a:tc>
+                  <a:txBody>
+                    <a:bodyPr/>
+                    <a:lstStyle/>
+                    <a:p>
+                      <a:pPr>
+                        <a:defRPr sz="1000"/>
+                      </a:pPr>
+                      <a:r>
+                        <a:t>10.0</a:t>
+                      </a:r>
+                    </a:p>
+                  </a:txBody>
+                  <a:tcPr/>
+                </a:tc>
+              </a:tr>
+              <a:tr h="195942">
+                <a:tc>
+                  <a:txBody>
+                    <a:bodyPr/>
+                    <a:lstStyle/>
+                    <a:p>
+                      <a:pPr>
+                        <a:defRPr sz="1000"/>
+                      </a:pPr>
+                      <a:r>
+                        <a:t>raltitrexed</a:t>
+                      </a:r>
+                    </a:p>
+                  </a:txBody>
+                  <a:tcPr/>
+                </a:tc>
+                <a:tc>
+                  <a:txBody>
+                    <a:bodyPr/>
+                    <a:lstStyle/>
+                    <a:p>
+                      <a:pPr>
+                        <a:defRPr sz="1000"/>
+                      </a:pPr>
+                      <a:r>
+                        <a:t>antimetabolite,  inhibitor of thymidylate synthase</a:t>
+                      </a:r>
+                    </a:p>
+                  </a:txBody>
+                  <a:tcPr/>
+                </a:tc>
+                <a:tc>
+                  <a:txBody>
+                    <a:bodyPr/>
+                    <a:lstStyle/>
+                    <a:p>
+                      <a:pPr>
+                        <a:defRPr sz="1000"/>
+                      </a:pPr>
+                      <a:r>
+                        <a:t>...+</a:t>
+                      </a:r>
+                    </a:p>
+                  </a:txBody>
+                  <a:tcPr/>
+                </a:tc>
+                <a:tc>
+                  <a:txBody>
+                    <a:bodyPr/>
+                    <a:lstStyle/>
+                    <a:p>
+                      <a:pPr>
+                        <a:defRPr sz="1000"/>
+                      </a:pPr>
+                      <a:r>
+                        <a:t>683</a:t>
+                      </a:r>
+                    </a:p>
+                  </a:txBody>
+                  <a:tcPr/>
+                </a:tc>
+                <a:tc>
+                  <a:txBody>
+                    <a:bodyPr/>
+                    <a:lstStyle/>
+                    <a:p>
+                      <a:pPr>
+                        <a:defRPr sz="1000"/>
+                      </a:pPr>
+                      <a:r>
+                        <a:t>11</a:t>
+                      </a:r>
+                    </a:p>
+                  </a:txBody>
+                  <a:tcPr/>
+                </a:tc>
+                <a:tc>
+                  <a:txBody>
+                    <a:bodyPr/>
+                    <a:lstStyle/>
+                    <a:p>
+                      <a:pPr>
+                        <a:defRPr sz="1000"/>
+                      </a:pPr>
+                      <a:r>
+                        <a:t>11.0</a:t>
+                      </a:r>
+                    </a:p>
+                  </a:txBody>
+                  <a:tcPr/>
+                </a:tc>
+              </a:tr>
+              <a:tr h="195942">
+                <a:tc>
+                  <a:txBody>
+                    <a:bodyPr/>
+                    <a:lstStyle/>
+                    <a:p>
+                      <a:pPr>
+                        <a:defRPr sz="1000"/>
+                      </a:pPr>
+                      <a:r>
+                        <a:t>avrainvillamide</a:t>
+                      </a:r>
+                    </a:p>
+                  </a:txBody>
+                  <a:tcPr/>
+                </a:tc>
+                <a:tc>
+                  <a:txBody>
+                    <a:bodyPr/>
+                    <a:lstStyle/>
+                    <a:p>
+                      <a:pPr>
+                        <a:defRPr sz="1000"/>
+                      </a:pPr>
+                      <a:r>
+                        <a:t>Not Clinically Relevant</a:t>
+                      </a:r>
+                    </a:p>
+                  </a:txBody>
+                  <a:tcPr/>
+                </a:tc>
+                <a:tc>
+                  <a:txBody>
+                    <a:bodyPr/>
+                    <a:lstStyle/>
+                    <a:p>
+                      <a:pPr>
+                        <a:defRPr sz="1000"/>
+                      </a:pPr>
+                      <a:r>
+                        <a:t>.+..</a:t>
+                      </a:r>
+                    </a:p>
+                  </a:txBody>
+                  <a:tcPr/>
+                </a:tc>
+                <a:tc>
+                  <a:txBody>
+                    <a:bodyPr/>
+                    <a:lstStyle/>
+                    <a:p>
+                      <a:pPr>
+                        <a:defRPr sz="1000"/>
+                      </a:pPr>
+                      <a:r>
+                        <a:t>12</a:t>
+                      </a:r>
+                    </a:p>
+                  </a:txBody>
+                  <a:tcPr/>
+                </a:tc>
+                <a:tc>
+                  <a:txBody>
+                    <a:bodyPr/>
+                    <a:lstStyle/>
+                    <a:p>
+                      <a:pPr>
+                        <a:defRPr sz="1000"/>
+                      </a:pPr>
+                      <a:r>
+                        <a:t>183</a:t>
+                      </a:r>
+                    </a:p>
+                  </a:txBody>
+                  <a:tcPr/>
+                </a:tc>
+                <a:tc>
+                  <a:txBody>
+                    <a:bodyPr/>
+                    <a:lstStyle/>
+                    <a:p>
+                      <a:pPr>
+                        <a:defRPr sz="1000"/>
+                      </a:pPr>
+                      <a:r>
+                        <a:t>12.0</a:t>
+                      </a:r>
+                    </a:p>
+                  </a:txBody>
+                  <a:tcPr/>
+                </a:tc>
+              </a:tr>
+              <a:tr h="195942">
+                <a:tc>
+                  <a:txBody>
+                    <a:bodyPr/>
+                    <a:lstStyle/>
+                    <a:p>
+                      <a:pPr>
+                        <a:defRPr sz="1000"/>
+                      </a:pPr>
+                      <a:r>
+                        <a:t>gsk319347a</a:t>
+                      </a:r>
+                    </a:p>
+                  </a:txBody>
+                  <a:tcPr/>
+                </a:tc>
+                <a:tc>
+                  <a:txBody>
+                    <a:bodyPr/>
+                    <a:lstStyle/>
+                    <a:p>
+                      <a:pPr>
+                        <a:defRPr sz="1000"/>
+                      </a:pPr>
+                      <a:r>
+                        <a:t>Not Clinically Relevant</a:t>
+                      </a:r>
+                    </a:p>
+                  </a:txBody>
+                  <a:tcPr/>
+                </a:tc>
+                <a:tc>
+                  <a:txBody>
+                    <a:bodyPr/>
+                    <a:lstStyle/>
+                    <a:p>
+                      <a:pPr>
+                        <a:defRPr sz="1000"/>
+                      </a:pPr>
+                      <a:r>
+                        <a:t>+...</a:t>
+                      </a:r>
+                    </a:p>
+                  </a:txBody>
+                  <a:tcPr/>
+                </a:tc>
+                <a:tc>
+                  <a:txBody>
+                    <a:bodyPr/>
+                    <a:lstStyle/>
+                    <a:p>
+                      <a:pPr>
+                        <a:defRPr sz="1000"/>
+                      </a:pPr>
+                      <a:r>
+                        <a:t>13</a:t>
+                      </a:r>
+                    </a:p>
+                  </a:txBody>
+                  <a:tcPr/>
+                </a:tc>
+                <a:tc>
+                  <a:txBody>
+                    <a:bodyPr/>
+                    <a:lstStyle/>
+                    <a:p>
+                      <a:pPr>
+                        <a:defRPr sz="1000"/>
+                      </a:pPr>
+                      <a:r>
+                        <a:t>184</a:t>
+                      </a:r>
+                    </a:p>
+                  </a:txBody>
+                  <a:tcPr/>
+                </a:tc>
+                <a:tc>
+                  <a:txBody>
+                    <a:bodyPr/>
+                    <a:lstStyle/>
+                    <a:p>
+                      <a:pPr>
+                        <a:defRPr sz="1000"/>
+                      </a:pPr>
+                      <a:r>
+                        <a:t>13.0</a:t>
+                      </a:r>
+                    </a:p>
+                  </a:txBody>
+                  <a:tcPr/>
+                </a:tc>
+              </a:tr>
+              <a:tr h="195942">
+                <a:tc>
+                  <a:txBody>
+                    <a:bodyPr/>
+                    <a:lstStyle/>
+                    <a:p>
+                      <a:pPr>
+                        <a:defRPr sz="1000"/>
+                      </a:pPr>
+                      <a:r>
+                        <a:t>semaxanib</a:t>
+                      </a:r>
+                    </a:p>
+                  </a:txBody>
+                  <a:tcPr/>
+                </a:tc>
+                <a:tc>
+                  <a:txBody>
+                    <a:bodyPr/>
+                    <a:lstStyle/>
+                    <a:p>
+                      <a:pPr>
+                        <a:defRPr sz="1000"/>
+                      </a:pPr>
+                      <a:r>
+                        <a:t>fusion protein analog of thrombopoietin, used to treat chronic immune thrombocytopenia</a:t>
+                      </a:r>
+                    </a:p>
+                  </a:txBody>
+                  <a:tcPr/>
+                </a:tc>
+                <a:tc>
+                  <a:txBody>
+                    <a:bodyPr/>
+                    <a:lstStyle/>
+                    <a:p>
+                      <a:pPr>
+                        <a:defRPr sz="1000"/>
+                      </a:pPr>
+                      <a:r>
+                        <a:t>...+</a:t>
+                      </a:r>
+                    </a:p>
+                  </a:txBody>
+                  <a:tcPr/>
+                </a:tc>
+                <a:tc>
+                  <a:txBody>
+                    <a:bodyPr/>
+                    <a:lstStyle/>
+                    <a:p>
+                      <a:pPr>
+                        <a:defRPr sz="1000"/>
+                      </a:pPr>
+                      <a:r>
+                        <a:t>684</a:t>
+                      </a:r>
+                    </a:p>
+                  </a:txBody>
+                  <a:tcPr/>
+                </a:tc>
+                <a:tc>
+                  <a:txBody>
+                    <a:bodyPr/>
+                    <a:lstStyle/>
+                    <a:p>
+                      <a:pPr>
+                        <a:defRPr sz="1000"/>
+                      </a:pPr>
+                      <a:r>
+                        <a:t>14</a:t>
+                      </a:r>
+                    </a:p>
+                  </a:txBody>
+                  <a:tcPr/>
+                </a:tc>
+                <a:tc>
+                  <a:txBody>
+                    <a:bodyPr/>
+                    <a:lstStyle/>
+                    <a:p>
+                      <a:pPr>
+                        <a:defRPr sz="1000"/>
+                      </a:pPr>
+                      <a:r>
+                        <a:t>14.0</a:t>
+                      </a:r>
+                    </a:p>
+                  </a:txBody>
+                  <a:tcPr/>
+                </a:tc>
+              </a:tr>
+              <a:tr h="195960">
+                <a:tc>
+                  <a:txBody>
+                    <a:bodyPr/>
+                    <a:lstStyle/>
+                    <a:p>
+                      <a:pPr>
+                        <a:defRPr sz="1000"/>
+                      </a:pPr>
+                      <a:r>
+                        <a:t>nsc-87877</a:t>
+                      </a:r>
+                    </a:p>
+                  </a:txBody>
+                  <a:tcPr/>
+                </a:tc>
+                <a:tc>
+                  <a:txBody>
+                    <a:bodyPr/>
+                    <a:lstStyle/>
+                    <a:p>
+                      <a:pPr>
+                        <a:defRPr sz="1000"/>
+                      </a:pPr>
+                      <a:r>
+                        <a:t>Not Clinically Relevant</a:t>
+                      </a:r>
+                    </a:p>
+                  </a:txBody>
+                  <a:tcPr/>
+                </a:tc>
+                <a:tc>
+                  <a:txBody>
+                    <a:bodyPr/>
+                    <a:lstStyle/>
+                    <a:p>
+                      <a:pPr>
+                        <a:defRPr sz="1000"/>
+                      </a:pPr>
+                      <a:r>
+                        <a:t>+...</a:t>
+                      </a:r>
+                    </a:p>
+                  </a:txBody>
+                  <a:tcPr/>
+                </a:tc>
+                <a:tc>
+                  <a:txBody>
+                    <a:bodyPr/>
+                    <a:lstStyle/>
+                    <a:p>
+                      <a:pPr>
+                        <a:defRPr sz="1000"/>
+                      </a:pPr>
+                      <a:r>
+                        <a:t>14</a:t>
+                      </a:r>
+                    </a:p>
+                  </a:txBody>
+                  <a:tcPr/>
+                </a:tc>
+                <a:tc>
+                  <a:txBody>
+                    <a:bodyPr/>
+                    <a:lstStyle/>
+                    <a:p>
+                      <a:pPr>
+                        <a:defRPr sz="1000"/>
+                      </a:pPr>
+                      <a:r>
+                        <a:t>185</a:t>
+                      </a:r>
+                    </a:p>
+                  </a:txBody>
+                  <a:tcPr/>
+                </a:tc>
+                <a:tc>
+                  <a:txBody>
+                    <a:bodyPr/>
+                    <a:lstStyle/>
+                    <a:p>
+                      <a:pPr>
+                        <a:defRPr sz="1000"/>
+                      </a:pPr>
+                      <a:r>
+                        <a:t>14.0</a:t>
+                      </a:r>
+                    </a:p>
+                  </a:txBody>
+                  <a:tcPr/>
+                </a:tc>
+              </a:tr>
+            </a:tbl>
+          </a:graphicData>
+        </a:graphic>
+      </p:graphicFrame>
+    </p:spTree>
+  </p:cSld>
+  <p:clrMapOvr>
+    <a:masterClrMapping/>
+  </p:clrMapOvr>
+</p:sld>
+</file>
+
 <file path=ppt/slides/slide2.xml><?xml version="1.0" encoding="utf-8"?>
 <p:sld xmlns:a="http://schemas.openxmlformats.org/drawingml/2006/main" xmlns:p="http://schemas.openxmlformats.org/presentationml/2006/main" xmlns:r="http://schemas.openxmlformats.org/officeDocument/2006/relationships">
   <p:cSld>

</xml_diff>